<commit_message>
Update documentation to reflect changes in the Agent Control Plane. Renamed sections for clarity, enhanced the introduction and features overview, and improved the architecture description. Added details on centralized governance, orchestration, and monitoring capabilities. Updated navigation links for better accessibility to key topics.
</commit_message>
<xml_diff>
--- a/docs/assets/illustrations.pptx
+++ b/docs/assets/illustrations.pptx
@@ -7,6 +7,7 @@
   <p:sldIdLst>
     <p:sldId id="256" r:id="rId2"/>
     <p:sldId id="257" r:id="rId3"/>
+    <p:sldId id="258" r:id="rId4"/>
   </p:sldIdLst>
   <p:sldSz cx="12192000" cy="6858000"/>
   <p:notesSz cx="6858000" cy="9144000"/>
@@ -105,6 +106,11 @@
       </a:defRPr>
     </a:lvl9pPr>
   </p:defaultTextStyle>
+  <p:extLst>
+    <p:ext uri="{EFAFB233-063F-42B5-8137-9DF3F51BA10A}">
+      <p15:sldGuideLst xmlns:p15="http://schemas.microsoft.com/office/powerpoint/2012/main"/>
+    </p:ext>
+  </p:extLst>
 </p:presentation>
 </file>
 
@@ -255,7 +261,7 @@
           <a:p>
             <a:fld id="{B6EBD849-BF62-3E41-9392-B52349D77D8A}" type="datetimeFigureOut">
               <a:rPr lang="en-US" smtClean="0"/>
-              <a:t>1/1/26</a:t>
+              <a:t>1/21/26</a:t>
             </a:fld>
             <a:endParaRPr lang="en-US"/>
           </a:p>
@@ -453,7 +459,7 @@
           <a:p>
             <a:fld id="{B6EBD849-BF62-3E41-9392-B52349D77D8A}" type="datetimeFigureOut">
               <a:rPr lang="en-US" smtClean="0"/>
-              <a:t>1/1/26</a:t>
+              <a:t>1/21/26</a:t>
             </a:fld>
             <a:endParaRPr lang="en-US"/>
           </a:p>
@@ -661,7 +667,7 @@
           <a:p>
             <a:fld id="{B6EBD849-BF62-3E41-9392-B52349D77D8A}" type="datetimeFigureOut">
               <a:rPr lang="en-US" smtClean="0"/>
-              <a:t>1/1/26</a:t>
+              <a:t>1/21/26</a:t>
             </a:fld>
             <a:endParaRPr lang="en-US"/>
           </a:p>
@@ -859,7 +865,7 @@
           <a:p>
             <a:fld id="{B6EBD849-BF62-3E41-9392-B52349D77D8A}" type="datetimeFigureOut">
               <a:rPr lang="en-US" smtClean="0"/>
-              <a:t>1/1/26</a:t>
+              <a:t>1/21/26</a:t>
             </a:fld>
             <a:endParaRPr lang="en-US"/>
           </a:p>
@@ -1134,7 +1140,7 @@
           <a:p>
             <a:fld id="{B6EBD849-BF62-3E41-9392-B52349D77D8A}" type="datetimeFigureOut">
               <a:rPr lang="en-US" smtClean="0"/>
-              <a:t>1/1/26</a:t>
+              <a:t>1/21/26</a:t>
             </a:fld>
             <a:endParaRPr lang="en-US"/>
           </a:p>
@@ -1399,7 +1405,7 @@
           <a:p>
             <a:fld id="{B6EBD849-BF62-3E41-9392-B52349D77D8A}" type="datetimeFigureOut">
               <a:rPr lang="en-US" smtClean="0"/>
-              <a:t>1/1/26</a:t>
+              <a:t>1/21/26</a:t>
             </a:fld>
             <a:endParaRPr lang="en-US"/>
           </a:p>
@@ -1811,7 +1817,7 @@
           <a:p>
             <a:fld id="{B6EBD849-BF62-3E41-9392-B52349D77D8A}" type="datetimeFigureOut">
               <a:rPr lang="en-US" smtClean="0"/>
-              <a:t>1/1/26</a:t>
+              <a:t>1/21/26</a:t>
             </a:fld>
             <a:endParaRPr lang="en-US"/>
           </a:p>
@@ -1952,7 +1958,7 @@
           <a:p>
             <a:fld id="{B6EBD849-BF62-3E41-9392-B52349D77D8A}" type="datetimeFigureOut">
               <a:rPr lang="en-US" smtClean="0"/>
-              <a:t>1/1/26</a:t>
+              <a:t>1/21/26</a:t>
             </a:fld>
             <a:endParaRPr lang="en-US"/>
           </a:p>
@@ -2065,7 +2071,7 @@
           <a:p>
             <a:fld id="{B6EBD849-BF62-3E41-9392-B52349D77D8A}" type="datetimeFigureOut">
               <a:rPr lang="en-US" smtClean="0"/>
-              <a:t>1/1/26</a:t>
+              <a:t>1/21/26</a:t>
             </a:fld>
             <a:endParaRPr lang="en-US"/>
           </a:p>
@@ -2376,7 +2382,7 @@
           <a:p>
             <a:fld id="{B6EBD849-BF62-3E41-9392-B52349D77D8A}" type="datetimeFigureOut">
               <a:rPr lang="en-US" smtClean="0"/>
-              <a:t>1/1/26</a:t>
+              <a:t>1/21/26</a:t>
             </a:fld>
             <a:endParaRPr lang="en-US"/>
           </a:p>
@@ -2664,7 +2670,7 @@
           <a:p>
             <a:fld id="{B6EBD849-BF62-3E41-9392-B52349D77D8A}" type="datetimeFigureOut">
               <a:rPr lang="en-US" smtClean="0"/>
-              <a:t>1/1/26</a:t>
+              <a:t>1/21/26</a:t>
             </a:fld>
             <a:endParaRPr lang="en-US"/>
           </a:p>
@@ -2905,7 +2911,7 @@
           <a:p>
             <a:fld id="{B6EBD849-BF62-3E41-9392-B52349D77D8A}" type="datetimeFigureOut">
               <a:rPr lang="en-US" smtClean="0"/>
-              <a:t>1/1/26</a:t>
+              <a:t>1/21/26</a:t>
             </a:fld>
             <a:endParaRPr lang="en-US"/>
           </a:p>
@@ -4217,7 +4223,7 @@
         </p:blipFill>
         <p:spPr>
           <a:xfrm>
-            <a:off x="2917934" y="1264256"/>
+            <a:off x="2917934" y="1997909"/>
             <a:ext cx="678524" cy="678524"/>
           </a:xfrm>
           <a:prstGeom prst="rect">
@@ -4253,7 +4259,7 @@
         </p:blipFill>
         <p:spPr>
           <a:xfrm>
-            <a:off x="4750330" y="1324215"/>
+            <a:off x="4750330" y="2057868"/>
             <a:ext cx="1237130" cy="1237130"/>
           </a:xfrm>
           <a:prstGeom prst="rect">
@@ -4289,7 +4295,7 @@
         </p:blipFill>
         <p:spPr>
           <a:xfrm>
-            <a:off x="7664393" y="1483705"/>
+            <a:off x="7664393" y="1887747"/>
             <a:ext cx="926974" cy="926974"/>
           </a:xfrm>
           <a:prstGeom prst="rect">
@@ -4325,7 +4331,7 @@
         </p:blipFill>
         <p:spPr>
           <a:xfrm>
-            <a:off x="7693202" y="3288678"/>
+            <a:off x="7693202" y="3692720"/>
             <a:ext cx="926974" cy="926974"/>
           </a:xfrm>
           <a:prstGeom prst="rect">
@@ -4361,7 +4367,7 @@
         </p:blipFill>
         <p:spPr>
           <a:xfrm>
-            <a:off x="7706925" y="5021579"/>
+            <a:off x="7706925" y="5425621"/>
             <a:ext cx="926974" cy="926974"/>
           </a:xfrm>
           <a:prstGeom prst="rect">
@@ -4383,7 +4389,7 @@
         </p:nvSpPr>
         <p:spPr>
           <a:xfrm>
-            <a:off x="6941941" y="2390829"/>
+            <a:off x="6941941" y="2794871"/>
             <a:ext cx="2344432" cy="369332"/>
           </a:xfrm>
           <a:prstGeom prst="rect">
@@ -4427,7 +4433,7 @@
         </p:nvSpPr>
         <p:spPr>
           <a:xfrm>
-            <a:off x="6984473" y="4202206"/>
+            <a:off x="6984473" y="4606248"/>
             <a:ext cx="2344432" cy="369332"/>
           </a:xfrm>
           <a:prstGeom prst="rect">
@@ -4470,7 +4476,7 @@
         </p:nvSpPr>
         <p:spPr>
           <a:xfrm>
-            <a:off x="6984473" y="5896074"/>
+            <a:off x="6984473" y="6300116"/>
             <a:ext cx="2344432" cy="369332"/>
           </a:xfrm>
           <a:prstGeom prst="rect">
@@ -4515,7 +4521,7 @@
         </p:nvCxnSpPr>
         <p:spPr>
           <a:xfrm>
-            <a:off x="5932007" y="1926772"/>
+            <a:off x="5932007" y="2660425"/>
             <a:ext cx="1128012" cy="0"/>
           </a:xfrm>
           <a:prstGeom prst="straightConnector1">
@@ -4560,7 +4566,7 @@
         </p:nvCxnSpPr>
         <p:spPr>
           <a:xfrm>
-            <a:off x="9186530" y="2097313"/>
+            <a:off x="9186530" y="2501355"/>
             <a:ext cx="691117" cy="0"/>
           </a:xfrm>
           <a:prstGeom prst="straightConnector1">
@@ -4617,7 +4623,7 @@
         </p:blipFill>
         <p:spPr>
           <a:xfrm>
-            <a:off x="10508827" y="1438092"/>
+            <a:off x="10508827" y="1842134"/>
             <a:ext cx="914400" cy="914400"/>
           </a:xfrm>
           <a:prstGeom prst="rect">
@@ -4653,7 +4659,7 @@
         </p:blipFill>
         <p:spPr>
           <a:xfrm>
-            <a:off x="10661227" y="1590492"/>
+            <a:off x="10661227" y="1994534"/>
             <a:ext cx="914400" cy="914400"/>
           </a:xfrm>
           <a:prstGeom prst="rect">
@@ -4675,7 +4681,7 @@
         </p:nvSpPr>
         <p:spPr>
           <a:xfrm>
-            <a:off x="10327211" y="2572128"/>
+            <a:off x="10494219" y="2979537"/>
             <a:ext cx="1248416" cy="646331"/>
           </a:xfrm>
           <a:prstGeom prst="rect">
@@ -4697,7 +4703,7 @@
                 </a:solidFill>
                 <a:latin typeface="Avenir Book" panose="02000503020000020003" pitchFamily="2" charset="0"/>
               </a:rPr>
-              <a:t>Your Agents</a:t>
+              <a:t>Your AI Agents</a:t>
             </a:r>
           </a:p>
         </p:txBody>
@@ -4718,7 +4724,7 @@
         </p:nvCxnSpPr>
         <p:spPr>
           <a:xfrm>
-            <a:off x="5987460" y="2378850"/>
+            <a:off x="5987460" y="3112503"/>
             <a:ext cx="1516000" cy="1373315"/>
           </a:xfrm>
           <a:prstGeom prst="straightConnector1">
@@ -4764,7 +4770,7 @@
         </p:nvCxnSpPr>
         <p:spPr>
           <a:xfrm>
-            <a:off x="5706104" y="2635287"/>
+            <a:off x="5706104" y="3368940"/>
             <a:ext cx="1797356" cy="2849779"/>
           </a:xfrm>
           <a:prstGeom prst="straightConnector1">
@@ -4808,7 +4814,7 @@
         </p:nvSpPr>
         <p:spPr>
           <a:xfrm>
-            <a:off x="2245259" y="2009518"/>
+            <a:off x="2245259" y="2743171"/>
             <a:ext cx="1936376" cy="369332"/>
           </a:xfrm>
           <a:prstGeom prst="rect">
@@ -4851,7 +4857,7 @@
         </p:nvSpPr>
         <p:spPr>
           <a:xfrm>
-            <a:off x="4400707" y="1063492"/>
+            <a:off x="4400707" y="1797145"/>
             <a:ext cx="1936376" cy="369332"/>
           </a:xfrm>
           <a:prstGeom prst="rect">
@@ -4892,7 +4898,7 @@
         </p:nvSpPr>
         <p:spPr>
           <a:xfrm rot="5400000">
-            <a:off x="9478334" y="1875926"/>
+            <a:off x="9478334" y="2279968"/>
             <a:ext cx="1514417" cy="410995"/>
           </a:xfrm>
           <a:prstGeom prst="roundRect">
@@ -4957,8 +4963,8 @@
         </p:nvSpPr>
         <p:spPr>
           <a:xfrm>
-            <a:off x="7455747" y="292940"/>
-            <a:ext cx="1380618" cy="410995"/>
+            <a:off x="7455747" y="445702"/>
+            <a:ext cx="1380618" cy="662275"/>
           </a:xfrm>
           <a:prstGeom prst="roundRect">
             <a:avLst/>
@@ -5003,7 +5009,7 @@
                   </a:schemeClr>
                 </a:solidFill>
               </a:rPr>
-              <a:t>Xians UI</a:t>
+              <a:t>Xians Dev Portal</a:t>
             </a:r>
           </a:p>
         </p:txBody>
@@ -5024,7 +5030,7 @@
         </p:nvCxnSpPr>
         <p:spPr>
           <a:xfrm>
-            <a:off x="8142838" y="787509"/>
+            <a:off x="8142838" y="1191551"/>
             <a:ext cx="0" cy="483541"/>
           </a:xfrm>
           <a:prstGeom prst="straightConnector1">
@@ -5070,7 +5076,7 @@
         </p:nvCxnSpPr>
         <p:spPr>
           <a:xfrm>
-            <a:off x="2048438" y="1942780"/>
+            <a:off x="2048438" y="2676433"/>
             <a:ext cx="2701892" cy="0"/>
           </a:xfrm>
           <a:prstGeom prst="straightConnector1">
@@ -5127,7 +5133,7 @@
         </p:blipFill>
         <p:spPr>
           <a:xfrm>
-            <a:off x="590705" y="1361356"/>
+            <a:off x="590705" y="2095009"/>
             <a:ext cx="1237130" cy="1237130"/>
           </a:xfrm>
           <a:prstGeom prst="rect">
@@ -5149,8 +5155,8 @@
         </p:nvSpPr>
         <p:spPr>
           <a:xfrm>
-            <a:off x="241082" y="2561344"/>
-            <a:ext cx="1936376" cy="369332"/>
+            <a:off x="241082" y="3294997"/>
+            <a:ext cx="1936376" cy="276999"/>
           </a:xfrm>
           <a:prstGeom prst="rect">
             <a:avLst/>
@@ -5165,7 +5171,7 @@
           <a:p>
             <a:pPr algn="ctr"/>
             <a:r>
-              <a:rPr lang="en-US" dirty="0">
+              <a:rPr lang="en-US" sz="1200" dirty="0">
                 <a:solidFill>
                   <a:schemeClr val="bg1"/>
                 </a:solidFill>
@@ -5190,7 +5196,7 @@
         </p:nvSpPr>
         <p:spPr>
           <a:xfrm>
-            <a:off x="7276915" y="1358831"/>
+            <a:off x="7276915" y="1762873"/>
             <a:ext cx="1757193" cy="1479801"/>
           </a:xfrm>
           <a:prstGeom prst="roundRect">
@@ -5240,10 +5246,1089 @@
           </a:p>
         </p:txBody>
       </p:sp>
+      <p:sp>
+        <p:nvSpPr>
+          <p:cNvPr id="2" name="Rounded Rectangle 1">
+            <a:extLst>
+              <a:ext uri="{FF2B5EF4-FFF2-40B4-BE49-F238E27FC236}">
+                <a16:creationId xmlns:a16="http://schemas.microsoft.com/office/drawing/2014/main" id="{2AF94583-50B7-15DF-FF90-51C9C688B054}"/>
+              </a:ext>
+            </a:extLst>
+          </p:cNvPr>
+          <p:cNvSpPr/>
+          <p:nvPr/>
+        </p:nvSpPr>
+        <p:spPr>
+          <a:xfrm>
+            <a:off x="527440" y="445701"/>
+            <a:ext cx="1586753" cy="662275"/>
+          </a:xfrm>
+          <a:prstGeom prst="roundRect">
+            <a:avLst/>
+          </a:prstGeom>
+          <a:noFill/>
+          <a:ln>
+            <a:solidFill>
+              <a:schemeClr val="tx2">
+                <a:lumMod val="25000"/>
+                <a:lumOff val="75000"/>
+              </a:schemeClr>
+            </a:solidFill>
+          </a:ln>
+        </p:spPr>
+        <p:style>
+          <a:lnRef idx="2">
+            <a:schemeClr val="accent1">
+              <a:shade val="15000"/>
+            </a:schemeClr>
+          </a:lnRef>
+          <a:fillRef idx="1">
+            <a:schemeClr val="accent1"/>
+          </a:fillRef>
+          <a:effectRef idx="0">
+            <a:schemeClr val="accent1"/>
+          </a:effectRef>
+          <a:fontRef idx="minor">
+            <a:schemeClr val="lt1"/>
+          </a:fontRef>
+        </p:style>
+        <p:txBody>
+          <a:bodyPr rtlCol="0" anchor="ctr"/>
+          <a:lstStyle/>
+          <a:p>
+            <a:pPr algn="ctr"/>
+            <a:r>
+              <a:rPr lang="en-US" dirty="0">
+                <a:solidFill>
+                  <a:schemeClr val="tx2">
+                    <a:lumMod val="25000"/>
+                    <a:lumOff val="75000"/>
+                  </a:schemeClr>
+                </a:solidFill>
+              </a:rPr>
+              <a:t>Xians Agent Studio</a:t>
+            </a:r>
+          </a:p>
+        </p:txBody>
+      </p:sp>
+      <p:sp>
+        <p:nvSpPr>
+          <p:cNvPr id="6" name="TextBox 5">
+            <a:extLst>
+              <a:ext uri="{FF2B5EF4-FFF2-40B4-BE49-F238E27FC236}">
+                <a16:creationId xmlns:a16="http://schemas.microsoft.com/office/drawing/2014/main" id="{23BAF62D-7F71-6BEA-067C-D5F86BCC424F}"/>
+              </a:ext>
+            </a:extLst>
+          </p:cNvPr>
+          <p:cNvSpPr txBox="1"/>
+          <p:nvPr/>
+        </p:nvSpPr>
+        <p:spPr>
+          <a:xfrm>
+            <a:off x="-114268" y="1201749"/>
+            <a:ext cx="2870171" cy="461665"/>
+          </a:xfrm>
+          <a:prstGeom prst="rect">
+            <a:avLst/>
+          </a:prstGeom>
+          <a:noFill/>
+        </p:spPr>
+        <p:txBody>
+          <a:bodyPr wrap="square" rtlCol="0">
+            <a:spAutoFit/>
+          </a:bodyPr>
+          <a:lstStyle/>
+          <a:p>
+            <a:pPr algn="ctr"/>
+            <a:r>
+              <a:rPr lang="en-US" sz="1200" dirty="0">
+                <a:solidFill>
+                  <a:schemeClr val="bg1"/>
+                </a:solidFill>
+                <a:latin typeface="Avenir Book" panose="02000503020000020003" pitchFamily="2" charset="0"/>
+              </a:rPr>
+              <a:t>Optional UI for </a:t>
+            </a:r>
+          </a:p>
+          <a:p>
+            <a:pPr algn="ctr"/>
+            <a:r>
+              <a:rPr lang="en-US" sz="1200" dirty="0">
+                <a:solidFill>
+                  <a:schemeClr val="bg1"/>
+                </a:solidFill>
+                <a:latin typeface="Avenir Book" panose="02000503020000020003" pitchFamily="2" charset="0"/>
+              </a:rPr>
+              <a:t>user-agent interaction</a:t>
+            </a:r>
+          </a:p>
+        </p:txBody>
+      </p:sp>
+      <p:cxnSp>
+        <p:nvCxnSpPr>
+          <p:cNvPr id="19" name="Elbow Connector 18">
+            <a:extLst>
+              <a:ext uri="{FF2B5EF4-FFF2-40B4-BE49-F238E27FC236}">
+                <a16:creationId xmlns:a16="http://schemas.microsoft.com/office/drawing/2014/main" id="{EB6C7087-6ED9-C0E9-AD7F-9B2FFC4E769F}"/>
+              </a:ext>
+            </a:extLst>
+          </p:cNvPr>
+          <p:cNvCxnSpPr>
+            <a:cxnSpLocks/>
+          </p:cNvCxnSpPr>
+          <p:nvPr/>
+        </p:nvCxnSpPr>
+        <p:spPr>
+          <a:xfrm>
+            <a:off x="2352720" y="767110"/>
+            <a:ext cx="4771773" cy="1384248"/>
+          </a:xfrm>
+          <a:prstGeom prst="bentConnector3">
+            <a:avLst>
+              <a:gd name="adj1" fmla="val 90776"/>
+            </a:avLst>
+          </a:prstGeom>
+          <a:ln>
+            <a:solidFill>
+              <a:schemeClr val="tx2">
+                <a:lumMod val="25000"/>
+                <a:lumOff val="75000"/>
+              </a:schemeClr>
+            </a:solidFill>
+            <a:headEnd type="triangle"/>
+            <a:tailEnd type="triangle"/>
+          </a:ln>
+        </p:spPr>
+        <p:style>
+          <a:lnRef idx="2">
+            <a:schemeClr val="accent1"/>
+          </a:lnRef>
+          <a:fillRef idx="0">
+            <a:schemeClr val="accent1"/>
+          </a:fillRef>
+          <a:effectRef idx="1">
+            <a:schemeClr val="accent1"/>
+          </a:effectRef>
+          <a:fontRef idx="minor">
+            <a:schemeClr val="tx1"/>
+          </a:fontRef>
+        </p:style>
+      </p:cxnSp>
     </p:spTree>
     <p:extLst>
       <p:ext uri="{BB962C8B-B14F-4D97-AF65-F5344CB8AC3E}">
         <p14:creationId xmlns:p14="http://schemas.microsoft.com/office/powerpoint/2010/main" val="556708516"/>
+      </p:ext>
+    </p:extLst>
+  </p:cSld>
+  <p:clrMapOvr>
+    <a:masterClrMapping/>
+  </p:clrMapOvr>
+</p:sld>
+</file>
+
+<file path=ppt/slides/slide3.xml><?xml version="1.0" encoding="utf-8"?>
+<p:sld xmlns:a="http://schemas.openxmlformats.org/drawingml/2006/main" xmlns:r="http://schemas.openxmlformats.org/officeDocument/2006/relationships" xmlns:p="http://schemas.openxmlformats.org/presentationml/2006/main">
+  <p:cSld>
+    <p:bg>
+      <p:bgPr>
+        <a:solidFill>
+          <a:schemeClr val="tx1">
+            <a:lumMod val="85000"/>
+            <a:lumOff val="15000"/>
+          </a:schemeClr>
+        </a:solidFill>
+        <a:effectLst/>
+      </p:bgPr>
+    </p:bg>
+    <p:spTree>
+      <p:nvGrpSpPr>
+        <p:cNvPr id="1" name="">
+          <a:extLst>
+            <a:ext uri="{FF2B5EF4-FFF2-40B4-BE49-F238E27FC236}">
+              <a16:creationId xmlns:a16="http://schemas.microsoft.com/office/drawing/2014/main" id="{CCFF001B-96E2-8702-077A-3D5236B2A731}"/>
+            </a:ext>
+          </a:extLst>
+        </p:cNvPr>
+        <p:cNvGrpSpPr/>
+        <p:nvPr/>
+      </p:nvGrpSpPr>
+      <p:grpSpPr>
+        <a:xfrm>
+          <a:off x="0" y="0"/>
+          <a:ext cx="0" cy="0"/>
+          <a:chOff x="0" y="0"/>
+          <a:chExt cx="0" cy="0"/>
+        </a:xfrm>
+      </p:grpSpPr>
+      <p:sp>
+        <p:nvSpPr>
+          <p:cNvPr id="9" name="Rounded Rectangle 8">
+            <a:extLst>
+              <a:ext uri="{FF2B5EF4-FFF2-40B4-BE49-F238E27FC236}">
+                <a16:creationId xmlns:a16="http://schemas.microsoft.com/office/drawing/2014/main" id="{69AA2EB6-B33F-5F73-450A-361C3092D41A}"/>
+              </a:ext>
+            </a:extLst>
+          </p:cNvPr>
+          <p:cNvSpPr/>
+          <p:nvPr/>
+        </p:nvSpPr>
+        <p:spPr>
+          <a:xfrm rot="16200000">
+            <a:off x="5766544" y="4044164"/>
+            <a:ext cx="2546702" cy="662275"/>
+          </a:xfrm>
+          <a:prstGeom prst="roundRect">
+            <a:avLst/>
+          </a:prstGeom>
+          <a:noFill/>
+          <a:ln>
+            <a:solidFill>
+              <a:schemeClr val="tx2">
+                <a:lumMod val="25000"/>
+                <a:lumOff val="75000"/>
+              </a:schemeClr>
+            </a:solidFill>
+          </a:ln>
+        </p:spPr>
+        <p:style>
+          <a:lnRef idx="2">
+            <a:schemeClr val="accent1">
+              <a:shade val="15000"/>
+            </a:schemeClr>
+          </a:lnRef>
+          <a:fillRef idx="1">
+            <a:schemeClr val="accent1"/>
+          </a:fillRef>
+          <a:effectRef idx="0">
+            <a:schemeClr val="accent1"/>
+          </a:effectRef>
+          <a:fontRef idx="minor">
+            <a:schemeClr val="lt1"/>
+          </a:fontRef>
+        </p:style>
+        <p:txBody>
+          <a:bodyPr rtlCol="0" anchor="ctr"/>
+          <a:lstStyle/>
+          <a:p>
+            <a:pPr algn="ctr"/>
+            <a:r>
+              <a:rPr lang="en-US" dirty="0">
+                <a:solidFill>
+                  <a:schemeClr val="tx2">
+                    <a:lumMod val="25000"/>
+                    <a:lumOff val="75000"/>
+                  </a:schemeClr>
+                </a:solidFill>
+              </a:rPr>
+              <a:t>Agent A</a:t>
+            </a:r>
+          </a:p>
+        </p:txBody>
+      </p:sp>
+      <p:sp>
+        <p:nvSpPr>
+          <p:cNvPr id="2" name="Rounded Rectangle 1">
+            <a:extLst>
+              <a:ext uri="{FF2B5EF4-FFF2-40B4-BE49-F238E27FC236}">
+                <a16:creationId xmlns:a16="http://schemas.microsoft.com/office/drawing/2014/main" id="{E046861A-2C95-3BE1-2A05-9BF66C4E3BA5}"/>
+              </a:ext>
+            </a:extLst>
+          </p:cNvPr>
+          <p:cNvSpPr/>
+          <p:nvPr/>
+        </p:nvSpPr>
+        <p:spPr>
+          <a:xfrm rot="16200000">
+            <a:off x="1981303" y="3618862"/>
+            <a:ext cx="3397308" cy="662275"/>
+          </a:xfrm>
+          <a:prstGeom prst="roundRect">
+            <a:avLst/>
+          </a:prstGeom>
+          <a:noFill/>
+          <a:ln>
+            <a:solidFill>
+              <a:schemeClr val="tx2">
+                <a:lumMod val="25000"/>
+                <a:lumOff val="75000"/>
+              </a:schemeClr>
+            </a:solidFill>
+          </a:ln>
+        </p:spPr>
+        <p:style>
+          <a:lnRef idx="2">
+            <a:schemeClr val="accent1">
+              <a:shade val="15000"/>
+            </a:schemeClr>
+          </a:lnRef>
+          <a:fillRef idx="1">
+            <a:schemeClr val="accent1"/>
+          </a:fillRef>
+          <a:effectRef idx="0">
+            <a:schemeClr val="accent1"/>
+          </a:effectRef>
+          <a:fontRef idx="minor">
+            <a:schemeClr val="lt1"/>
+          </a:fontRef>
+        </p:style>
+        <p:txBody>
+          <a:bodyPr rtlCol="0" anchor="ctr"/>
+          <a:lstStyle/>
+          <a:p>
+            <a:pPr algn="ctr"/>
+            <a:r>
+              <a:rPr lang="en-US" dirty="0">
+                <a:solidFill>
+                  <a:schemeClr val="tx2">
+                    <a:lumMod val="25000"/>
+                    <a:lumOff val="75000"/>
+                  </a:schemeClr>
+                </a:solidFill>
+              </a:rPr>
+              <a:t>Agent-Human Collaboration UI</a:t>
+            </a:r>
+          </a:p>
+        </p:txBody>
+      </p:sp>
+      <p:sp>
+        <p:nvSpPr>
+          <p:cNvPr id="3" name="Rounded Rectangle 2">
+            <a:extLst>
+              <a:ext uri="{FF2B5EF4-FFF2-40B4-BE49-F238E27FC236}">
+                <a16:creationId xmlns:a16="http://schemas.microsoft.com/office/drawing/2014/main" id="{8CD89C02-5794-8DBB-2DEA-D1349365628A}"/>
+              </a:ext>
+            </a:extLst>
+          </p:cNvPr>
+          <p:cNvSpPr/>
+          <p:nvPr/>
+        </p:nvSpPr>
+        <p:spPr>
+          <a:xfrm rot="16200000">
+            <a:off x="3118521" y="3097866"/>
+            <a:ext cx="4439297" cy="662275"/>
+          </a:xfrm>
+          <a:prstGeom prst="roundRect">
+            <a:avLst/>
+          </a:prstGeom>
+          <a:noFill/>
+          <a:ln>
+            <a:solidFill>
+              <a:schemeClr val="tx2">
+                <a:lumMod val="25000"/>
+                <a:lumOff val="75000"/>
+              </a:schemeClr>
+            </a:solidFill>
+          </a:ln>
+        </p:spPr>
+        <p:style>
+          <a:lnRef idx="2">
+            <a:schemeClr val="accent1">
+              <a:shade val="15000"/>
+            </a:schemeClr>
+          </a:lnRef>
+          <a:fillRef idx="1">
+            <a:schemeClr val="accent1"/>
+          </a:fillRef>
+          <a:effectRef idx="0">
+            <a:schemeClr val="accent1"/>
+          </a:effectRef>
+          <a:fontRef idx="minor">
+            <a:schemeClr val="lt1"/>
+          </a:fontRef>
+        </p:style>
+        <p:txBody>
+          <a:bodyPr rtlCol="0" anchor="ctr"/>
+          <a:lstStyle/>
+          <a:p>
+            <a:pPr algn="ctr"/>
+            <a:r>
+              <a:rPr lang="en-US" dirty="0">
+                <a:solidFill>
+                  <a:schemeClr val="tx2">
+                    <a:lumMod val="25000"/>
+                    <a:lumOff val="75000"/>
+                  </a:schemeClr>
+                </a:solidFill>
+              </a:rPr>
+              <a:t>Agent Control Plane (ACP) – E.g., Xians</a:t>
+            </a:r>
+          </a:p>
+        </p:txBody>
+      </p:sp>
+      <p:sp>
+        <p:nvSpPr>
+          <p:cNvPr id="5" name="Rounded Rectangle 4">
+            <a:extLst>
+              <a:ext uri="{FF2B5EF4-FFF2-40B4-BE49-F238E27FC236}">
+                <a16:creationId xmlns:a16="http://schemas.microsoft.com/office/drawing/2014/main" id="{EB7978B9-370A-8B9E-1650-A64BC34DA0EC}"/>
+              </a:ext>
+            </a:extLst>
+          </p:cNvPr>
+          <p:cNvSpPr/>
+          <p:nvPr/>
+        </p:nvSpPr>
+        <p:spPr>
+          <a:xfrm rot="16200000">
+            <a:off x="6205158" y="1712955"/>
+            <a:ext cx="1669477" cy="662275"/>
+          </a:xfrm>
+          <a:prstGeom prst="roundRect">
+            <a:avLst/>
+          </a:prstGeom>
+          <a:noFill/>
+          <a:ln>
+            <a:solidFill>
+              <a:schemeClr val="tx2">
+                <a:lumMod val="25000"/>
+                <a:lumOff val="75000"/>
+              </a:schemeClr>
+            </a:solidFill>
+          </a:ln>
+        </p:spPr>
+        <p:style>
+          <a:lnRef idx="2">
+            <a:schemeClr val="accent1">
+              <a:shade val="15000"/>
+            </a:schemeClr>
+          </a:lnRef>
+          <a:fillRef idx="1">
+            <a:schemeClr val="accent1"/>
+          </a:fillRef>
+          <a:effectRef idx="0">
+            <a:schemeClr val="accent1"/>
+          </a:effectRef>
+          <a:fontRef idx="minor">
+            <a:schemeClr val="lt1"/>
+          </a:fontRef>
+        </p:style>
+        <p:txBody>
+          <a:bodyPr rtlCol="0" anchor="ctr"/>
+          <a:lstStyle/>
+          <a:p>
+            <a:pPr algn="ctr"/>
+            <a:r>
+              <a:rPr lang="en-US" dirty="0">
+                <a:solidFill>
+                  <a:schemeClr val="tx2">
+                    <a:lumMod val="25000"/>
+                    <a:lumOff val="75000"/>
+                  </a:schemeClr>
+                </a:solidFill>
+              </a:rPr>
+              <a:t>Agent B</a:t>
+            </a:r>
+          </a:p>
+        </p:txBody>
+      </p:sp>
+      <p:sp>
+        <p:nvSpPr>
+          <p:cNvPr id="18" name="Rounded Rectangle 17">
+            <a:extLst>
+              <a:ext uri="{FF2B5EF4-FFF2-40B4-BE49-F238E27FC236}">
+                <a16:creationId xmlns:a16="http://schemas.microsoft.com/office/drawing/2014/main" id="{440785FA-6B73-96E1-6617-FF1D98C0411C}"/>
+              </a:ext>
+            </a:extLst>
+          </p:cNvPr>
+          <p:cNvSpPr/>
+          <p:nvPr/>
+        </p:nvSpPr>
+        <p:spPr>
+          <a:xfrm rot="16200000">
+            <a:off x="5748825" y="3097863"/>
+            <a:ext cx="4439298" cy="662275"/>
+          </a:xfrm>
+          <a:prstGeom prst="roundRect">
+            <a:avLst/>
+          </a:prstGeom>
+          <a:noFill/>
+          <a:ln>
+            <a:solidFill>
+              <a:schemeClr val="tx2">
+                <a:lumMod val="25000"/>
+                <a:lumOff val="75000"/>
+              </a:schemeClr>
+            </a:solidFill>
+          </a:ln>
+        </p:spPr>
+        <p:style>
+          <a:lnRef idx="2">
+            <a:schemeClr val="accent1">
+              <a:shade val="15000"/>
+            </a:schemeClr>
+          </a:lnRef>
+          <a:fillRef idx="1">
+            <a:schemeClr val="accent1"/>
+          </a:fillRef>
+          <a:effectRef idx="0">
+            <a:schemeClr val="accent1"/>
+          </a:effectRef>
+          <a:fontRef idx="minor">
+            <a:schemeClr val="lt1"/>
+          </a:fontRef>
+        </p:style>
+        <p:txBody>
+          <a:bodyPr rtlCol="0" anchor="ctr"/>
+          <a:lstStyle/>
+          <a:p>
+            <a:pPr algn="ctr"/>
+            <a:r>
+              <a:rPr lang="en-US" dirty="0">
+                <a:solidFill>
+                  <a:schemeClr val="tx2">
+                    <a:lumMod val="25000"/>
+                    <a:lumOff val="75000"/>
+                  </a:schemeClr>
+                </a:solidFill>
+              </a:rPr>
+              <a:t>Tools &amp; MCPs</a:t>
+            </a:r>
+          </a:p>
+        </p:txBody>
+      </p:sp>
+      <p:sp>
+        <p:nvSpPr>
+          <p:cNvPr id="31" name="Rounded Rectangle 30">
+            <a:extLst>
+              <a:ext uri="{FF2B5EF4-FFF2-40B4-BE49-F238E27FC236}">
+                <a16:creationId xmlns:a16="http://schemas.microsoft.com/office/drawing/2014/main" id="{F970CC0E-109F-D554-DDE5-95E8BA004D5A}"/>
+              </a:ext>
+            </a:extLst>
+          </p:cNvPr>
+          <p:cNvSpPr/>
+          <p:nvPr/>
+        </p:nvSpPr>
+        <p:spPr>
+          <a:xfrm rot="16200000">
+            <a:off x="9090993" y="4044162"/>
+            <a:ext cx="2546701" cy="662275"/>
+          </a:xfrm>
+          <a:prstGeom prst="roundRect">
+            <a:avLst/>
+          </a:prstGeom>
+          <a:noFill/>
+          <a:ln>
+            <a:solidFill>
+              <a:schemeClr val="tx2">
+                <a:lumMod val="25000"/>
+                <a:lumOff val="75000"/>
+              </a:schemeClr>
+            </a:solidFill>
+          </a:ln>
+        </p:spPr>
+        <p:style>
+          <a:lnRef idx="2">
+            <a:schemeClr val="accent1">
+              <a:shade val="15000"/>
+            </a:schemeClr>
+          </a:lnRef>
+          <a:fillRef idx="1">
+            <a:schemeClr val="accent1"/>
+          </a:fillRef>
+          <a:effectRef idx="0">
+            <a:schemeClr val="accent1"/>
+          </a:effectRef>
+          <a:fontRef idx="minor">
+            <a:schemeClr val="lt1"/>
+          </a:fontRef>
+        </p:style>
+        <p:txBody>
+          <a:bodyPr rtlCol="0" anchor="ctr"/>
+          <a:lstStyle/>
+          <a:p>
+            <a:pPr algn="ctr"/>
+            <a:r>
+              <a:rPr lang="en-US" dirty="0">
+                <a:solidFill>
+                  <a:schemeClr val="tx2">
+                    <a:lumMod val="25000"/>
+                    <a:lumOff val="75000"/>
+                  </a:schemeClr>
+                </a:solidFill>
+              </a:rPr>
+              <a:t>Back Office Systems/APIs</a:t>
+            </a:r>
+          </a:p>
+        </p:txBody>
+      </p:sp>
+      <p:pic>
+        <p:nvPicPr>
+          <p:cNvPr id="33" name="Graphic 32" descr="Internet Of Things outline">
+            <a:extLst>
+              <a:ext uri="{FF2B5EF4-FFF2-40B4-BE49-F238E27FC236}">
+                <a16:creationId xmlns:a16="http://schemas.microsoft.com/office/drawing/2014/main" id="{D234726E-8D13-499F-CA4A-7283082D142B}"/>
+              </a:ext>
+            </a:extLst>
+          </p:cNvPr>
+          <p:cNvPicPr>
+            <a:picLocks noChangeAspect="1"/>
+          </p:cNvPicPr>
+          <p:nvPr/>
+        </p:nvPicPr>
+        <p:blipFill>
+          <a:blip r:embed="rId2">
+            <a:extLst>
+              <a:ext uri="{96DAC541-7B7A-43D3-8B79-37D633B846F1}">
+                <asvg:svgBlip xmlns:asvg="http://schemas.microsoft.com/office/drawing/2016/SVG/main" r:embed="rId3"/>
+              </a:ext>
+            </a:extLst>
+          </a:blip>
+          <a:stretch>
+            <a:fillRect/>
+          </a:stretch>
+        </p:blipFill>
+        <p:spPr>
+          <a:xfrm rot="16200000">
+            <a:off x="1100368" y="1129413"/>
+            <a:ext cx="914400" cy="914400"/>
+          </a:xfrm>
+          <a:prstGeom prst="rect">
+            <a:avLst/>
+          </a:prstGeom>
+        </p:spPr>
+      </p:pic>
+      <p:pic>
+        <p:nvPicPr>
+          <p:cNvPr id="37" name="Graphic 36" descr="Artificial Intelligence outline">
+            <a:extLst>
+              <a:ext uri="{FF2B5EF4-FFF2-40B4-BE49-F238E27FC236}">
+                <a16:creationId xmlns:a16="http://schemas.microsoft.com/office/drawing/2014/main" id="{4EA3E6CE-081F-DD5C-5674-F56A40AFD7D4}"/>
+              </a:ext>
+            </a:extLst>
+          </p:cNvPr>
+          <p:cNvPicPr>
+            <a:picLocks noChangeAspect="1"/>
+          </p:cNvPicPr>
+          <p:nvPr/>
+        </p:nvPicPr>
+        <p:blipFill>
+          <a:blip r:embed="rId4">
+            <a:extLst>
+              <a:ext uri="{96DAC541-7B7A-43D3-8B79-37D633B846F1}">
+                <asvg:svgBlip xmlns:asvg="http://schemas.microsoft.com/office/drawing/2016/SVG/main" r:embed="rId5"/>
+              </a:ext>
+            </a:extLst>
+          </a:blip>
+          <a:stretch>
+            <a:fillRect/>
+          </a:stretch>
+        </p:blipFill>
+        <p:spPr>
+          <a:xfrm rot="16200000">
+            <a:off x="6764757" y="4963961"/>
+            <a:ext cx="550275" cy="550275"/>
+          </a:xfrm>
+          <a:prstGeom prst="rect">
+            <a:avLst/>
+          </a:prstGeom>
+        </p:spPr>
+      </p:pic>
+      <p:pic>
+        <p:nvPicPr>
+          <p:cNvPr id="39" name="Graphic 38" descr="Users outline">
+            <a:extLst>
+              <a:ext uri="{FF2B5EF4-FFF2-40B4-BE49-F238E27FC236}">
+                <a16:creationId xmlns:a16="http://schemas.microsoft.com/office/drawing/2014/main" id="{0EB11630-1E93-8BD6-60A8-7392D2E9C298}"/>
+              </a:ext>
+            </a:extLst>
+          </p:cNvPr>
+          <p:cNvPicPr>
+            <a:picLocks noChangeAspect="1"/>
+          </p:cNvPicPr>
+          <p:nvPr/>
+        </p:nvPicPr>
+        <p:blipFill>
+          <a:blip r:embed="rId6">
+            <a:extLst>
+              <a:ext uri="{96DAC541-7B7A-43D3-8B79-37D633B846F1}">
+                <asvg:svgBlip xmlns:asvg="http://schemas.microsoft.com/office/drawing/2016/SVG/main" r:embed="rId7"/>
+              </a:ext>
+            </a:extLst>
+          </a:blip>
+          <a:stretch>
+            <a:fillRect/>
+          </a:stretch>
+        </p:blipFill>
+        <p:spPr>
+          <a:xfrm rot="16200000">
+            <a:off x="1223333" y="3949999"/>
+            <a:ext cx="914400" cy="914400"/>
+          </a:xfrm>
+          <a:prstGeom prst="rect">
+            <a:avLst/>
+          </a:prstGeom>
+        </p:spPr>
+      </p:pic>
+      <p:cxnSp>
+        <p:nvCxnSpPr>
+          <p:cNvPr id="42" name="Straight Arrow Connector 41">
+            <a:extLst>
+              <a:ext uri="{FF2B5EF4-FFF2-40B4-BE49-F238E27FC236}">
+                <a16:creationId xmlns:a16="http://schemas.microsoft.com/office/drawing/2014/main" id="{B91607F9-96CF-7B21-E214-F5EA72D99C9B}"/>
+              </a:ext>
+            </a:extLst>
+          </p:cNvPr>
+          <p:cNvCxnSpPr/>
+          <p:nvPr/>
+        </p:nvCxnSpPr>
+        <p:spPr>
+          <a:xfrm>
+            <a:off x="2479964" y="4367227"/>
+            <a:ext cx="554182" cy="0"/>
+          </a:xfrm>
+          <a:prstGeom prst="straightConnector1">
+            <a:avLst/>
+          </a:prstGeom>
+          <a:ln>
+            <a:solidFill>
+              <a:schemeClr val="tx2">
+                <a:lumMod val="10000"/>
+                <a:lumOff val="90000"/>
+              </a:schemeClr>
+            </a:solidFill>
+            <a:headEnd type="triangle"/>
+            <a:tailEnd type="triangle"/>
+          </a:ln>
+        </p:spPr>
+        <p:style>
+          <a:lnRef idx="2">
+            <a:schemeClr val="accent1"/>
+          </a:lnRef>
+          <a:fillRef idx="0">
+            <a:schemeClr val="accent1"/>
+          </a:fillRef>
+          <a:effectRef idx="1">
+            <a:schemeClr val="accent1"/>
+          </a:effectRef>
+          <a:fontRef idx="minor">
+            <a:schemeClr val="tx1"/>
+          </a:fontRef>
+        </p:style>
+      </p:cxnSp>
+      <p:cxnSp>
+        <p:nvCxnSpPr>
+          <p:cNvPr id="43" name="Straight Arrow Connector 42">
+            <a:extLst>
+              <a:ext uri="{FF2B5EF4-FFF2-40B4-BE49-F238E27FC236}">
+                <a16:creationId xmlns:a16="http://schemas.microsoft.com/office/drawing/2014/main" id="{288D71DF-BB98-33B9-CFE8-58681ADEC4B0}"/>
+              </a:ext>
+            </a:extLst>
+          </p:cNvPr>
+          <p:cNvCxnSpPr>
+            <a:cxnSpLocks/>
+          </p:cNvCxnSpPr>
+          <p:nvPr/>
+        </p:nvCxnSpPr>
+        <p:spPr>
+          <a:xfrm>
+            <a:off x="2479964" y="1610172"/>
+            <a:ext cx="2355273" cy="0"/>
+          </a:xfrm>
+          <a:prstGeom prst="straightConnector1">
+            <a:avLst/>
+          </a:prstGeom>
+          <a:ln>
+            <a:solidFill>
+              <a:schemeClr val="tx2">
+                <a:lumMod val="10000"/>
+                <a:lumOff val="90000"/>
+              </a:schemeClr>
+            </a:solidFill>
+            <a:headEnd type="triangle"/>
+            <a:tailEnd type="triangle"/>
+          </a:ln>
+        </p:spPr>
+        <p:style>
+          <a:lnRef idx="2">
+            <a:schemeClr val="accent1"/>
+          </a:lnRef>
+          <a:fillRef idx="0">
+            <a:schemeClr val="accent1"/>
+          </a:fillRef>
+          <a:effectRef idx="1">
+            <a:schemeClr val="accent1"/>
+          </a:effectRef>
+          <a:fontRef idx="minor">
+            <a:schemeClr val="tx1"/>
+          </a:fontRef>
+        </p:style>
+      </p:cxnSp>
+      <p:cxnSp>
+        <p:nvCxnSpPr>
+          <p:cNvPr id="45" name="Straight Arrow Connector 44">
+            <a:extLst>
+              <a:ext uri="{FF2B5EF4-FFF2-40B4-BE49-F238E27FC236}">
+                <a16:creationId xmlns:a16="http://schemas.microsoft.com/office/drawing/2014/main" id="{6FFA2BE1-E153-F2A2-37D8-9057916BD8BA}"/>
+              </a:ext>
+            </a:extLst>
+          </p:cNvPr>
+          <p:cNvCxnSpPr/>
+          <p:nvPr/>
+        </p:nvCxnSpPr>
+        <p:spPr>
+          <a:xfrm>
+            <a:off x="4281055" y="4394937"/>
+            <a:ext cx="554182" cy="0"/>
+          </a:xfrm>
+          <a:prstGeom prst="straightConnector1">
+            <a:avLst/>
+          </a:prstGeom>
+          <a:ln>
+            <a:solidFill>
+              <a:schemeClr val="tx2">
+                <a:lumMod val="10000"/>
+                <a:lumOff val="90000"/>
+              </a:schemeClr>
+            </a:solidFill>
+            <a:headEnd type="triangle"/>
+            <a:tailEnd type="triangle"/>
+          </a:ln>
+        </p:spPr>
+        <p:style>
+          <a:lnRef idx="2">
+            <a:schemeClr val="accent1"/>
+          </a:lnRef>
+          <a:fillRef idx="0">
+            <a:schemeClr val="accent1"/>
+          </a:fillRef>
+          <a:effectRef idx="1">
+            <a:schemeClr val="accent1"/>
+          </a:effectRef>
+          <a:fontRef idx="minor">
+            <a:schemeClr val="tx1"/>
+          </a:fontRef>
+        </p:style>
+      </p:cxnSp>
+      <p:cxnSp>
+        <p:nvCxnSpPr>
+          <p:cNvPr id="46" name="Straight Arrow Connector 45">
+            <a:extLst>
+              <a:ext uri="{FF2B5EF4-FFF2-40B4-BE49-F238E27FC236}">
+                <a16:creationId xmlns:a16="http://schemas.microsoft.com/office/drawing/2014/main" id="{1B1E3879-FF5D-4DEA-887B-8B89D1F18399}"/>
+              </a:ext>
+            </a:extLst>
+          </p:cNvPr>
+          <p:cNvCxnSpPr/>
+          <p:nvPr/>
+        </p:nvCxnSpPr>
+        <p:spPr>
+          <a:xfrm>
+            <a:off x="5874327" y="3646791"/>
+            <a:ext cx="554182" cy="0"/>
+          </a:xfrm>
+          <a:prstGeom prst="straightConnector1">
+            <a:avLst/>
+          </a:prstGeom>
+          <a:ln>
+            <a:solidFill>
+              <a:schemeClr val="tx2">
+                <a:lumMod val="10000"/>
+                <a:lumOff val="90000"/>
+              </a:schemeClr>
+            </a:solidFill>
+            <a:headEnd type="triangle"/>
+            <a:tailEnd type="triangle"/>
+          </a:ln>
+        </p:spPr>
+        <p:style>
+          <a:lnRef idx="2">
+            <a:schemeClr val="accent1"/>
+          </a:lnRef>
+          <a:fillRef idx="0">
+            <a:schemeClr val="accent1"/>
+          </a:fillRef>
+          <a:effectRef idx="1">
+            <a:schemeClr val="accent1"/>
+          </a:effectRef>
+          <a:fontRef idx="minor">
+            <a:schemeClr val="tx1"/>
+          </a:fontRef>
+        </p:style>
+      </p:cxnSp>
+      <p:cxnSp>
+        <p:nvCxnSpPr>
+          <p:cNvPr id="47" name="Straight Arrow Connector 46">
+            <a:extLst>
+              <a:ext uri="{FF2B5EF4-FFF2-40B4-BE49-F238E27FC236}">
+                <a16:creationId xmlns:a16="http://schemas.microsoft.com/office/drawing/2014/main" id="{41BB7736-669F-46AC-F17F-F90A0F152698}"/>
+              </a:ext>
+            </a:extLst>
+          </p:cNvPr>
+          <p:cNvCxnSpPr/>
+          <p:nvPr/>
+        </p:nvCxnSpPr>
+        <p:spPr>
+          <a:xfrm>
+            <a:off x="5874327" y="2358318"/>
+            <a:ext cx="554182" cy="0"/>
+          </a:xfrm>
+          <a:prstGeom prst="straightConnector1">
+            <a:avLst/>
+          </a:prstGeom>
+          <a:ln>
+            <a:solidFill>
+              <a:schemeClr val="tx2">
+                <a:lumMod val="10000"/>
+                <a:lumOff val="90000"/>
+              </a:schemeClr>
+            </a:solidFill>
+            <a:headEnd type="triangle"/>
+            <a:tailEnd type="triangle"/>
+          </a:ln>
+        </p:spPr>
+        <p:style>
+          <a:lnRef idx="2">
+            <a:schemeClr val="accent1"/>
+          </a:lnRef>
+          <a:fillRef idx="0">
+            <a:schemeClr val="accent1"/>
+          </a:fillRef>
+          <a:effectRef idx="1">
+            <a:schemeClr val="accent1"/>
+          </a:effectRef>
+          <a:fontRef idx="minor">
+            <a:schemeClr val="tx1"/>
+          </a:fontRef>
+        </p:style>
+      </p:cxnSp>
+      <p:cxnSp>
+        <p:nvCxnSpPr>
+          <p:cNvPr id="48" name="Straight Arrow Connector 47">
+            <a:extLst>
+              <a:ext uri="{FF2B5EF4-FFF2-40B4-BE49-F238E27FC236}">
+                <a16:creationId xmlns:a16="http://schemas.microsoft.com/office/drawing/2014/main" id="{D6034F23-26D5-0F3C-516D-F0D6CB87B810}"/>
+              </a:ext>
+            </a:extLst>
+          </p:cNvPr>
+          <p:cNvCxnSpPr>
+            <a:cxnSpLocks/>
+          </p:cNvCxnSpPr>
+          <p:nvPr/>
+        </p:nvCxnSpPr>
+        <p:spPr>
+          <a:xfrm>
+            <a:off x="8520545" y="4325664"/>
+            <a:ext cx="1233056" cy="0"/>
+          </a:xfrm>
+          <a:prstGeom prst="straightConnector1">
+            <a:avLst/>
+          </a:prstGeom>
+          <a:ln>
+            <a:solidFill>
+              <a:schemeClr val="tx2">
+                <a:lumMod val="10000"/>
+                <a:lumOff val="90000"/>
+              </a:schemeClr>
+            </a:solidFill>
+            <a:headEnd type="triangle"/>
+            <a:tailEnd type="triangle"/>
+          </a:ln>
+        </p:spPr>
+        <p:style>
+          <a:lnRef idx="2">
+            <a:schemeClr val="accent1"/>
+          </a:lnRef>
+          <a:fillRef idx="0">
+            <a:schemeClr val="accent1"/>
+          </a:fillRef>
+          <a:effectRef idx="1">
+            <a:schemeClr val="accent1"/>
+          </a:effectRef>
+          <a:fontRef idx="minor">
+            <a:schemeClr val="tx1"/>
+          </a:fontRef>
+        </p:style>
+      </p:cxnSp>
+      <p:sp>
+        <p:nvSpPr>
+          <p:cNvPr id="51" name="TextBox 50">
+            <a:extLst>
+              <a:ext uri="{FF2B5EF4-FFF2-40B4-BE49-F238E27FC236}">
+                <a16:creationId xmlns:a16="http://schemas.microsoft.com/office/drawing/2014/main" id="{1A7D9758-DBD8-1C3C-C254-E03AF654CAD9}"/>
+              </a:ext>
+            </a:extLst>
+          </p:cNvPr>
+          <p:cNvSpPr txBox="1"/>
+          <p:nvPr/>
+        </p:nvSpPr>
+        <p:spPr>
+          <a:xfrm rot="16200000">
+            <a:off x="1734673" y="4008895"/>
+            <a:ext cx="1093541" cy="369332"/>
+          </a:xfrm>
+          <a:prstGeom prst="rect">
+            <a:avLst/>
+          </a:prstGeom>
+          <a:noFill/>
+        </p:spPr>
+        <p:txBody>
+          <a:bodyPr wrap="square">
+            <a:spAutoFit/>
+          </a:bodyPr>
+          <a:lstStyle/>
+          <a:p>
+            <a:r>
+              <a:rPr lang="en-US" dirty="0">
+                <a:solidFill>
+                  <a:schemeClr val="tx2">
+                    <a:lumMod val="25000"/>
+                    <a:lumOff val="75000"/>
+                  </a:schemeClr>
+                </a:solidFill>
+              </a:rPr>
+              <a:t>Users</a:t>
+            </a:r>
+            <a:endParaRPr lang="en-US" dirty="0"/>
+          </a:p>
+        </p:txBody>
+      </p:sp>
+      <p:sp>
+        <p:nvSpPr>
+          <p:cNvPr id="52" name="TextBox 51">
+            <a:extLst>
+              <a:ext uri="{FF2B5EF4-FFF2-40B4-BE49-F238E27FC236}">
+                <a16:creationId xmlns:a16="http://schemas.microsoft.com/office/drawing/2014/main" id="{99E0157B-2DF5-DD52-90DE-A229798E18B8}"/>
+              </a:ext>
+            </a:extLst>
+          </p:cNvPr>
+          <p:cNvSpPr txBox="1"/>
+          <p:nvPr/>
+        </p:nvSpPr>
+        <p:spPr>
+          <a:xfrm rot="16200000">
+            <a:off x="1800043" y="1293266"/>
+            <a:ext cx="1093541" cy="369332"/>
+          </a:xfrm>
+          <a:prstGeom prst="rect">
+            <a:avLst/>
+          </a:prstGeom>
+          <a:noFill/>
+        </p:spPr>
+        <p:txBody>
+          <a:bodyPr wrap="square">
+            <a:spAutoFit/>
+          </a:bodyPr>
+          <a:lstStyle/>
+          <a:p>
+            <a:r>
+              <a:rPr lang="en-US" dirty="0">
+                <a:solidFill>
+                  <a:schemeClr val="tx2">
+                    <a:lumMod val="25000"/>
+                    <a:lumOff val="75000"/>
+                  </a:schemeClr>
+                </a:solidFill>
+              </a:rPr>
+              <a:t>Systems</a:t>
+            </a:r>
+            <a:endParaRPr lang="en-US" dirty="0"/>
+          </a:p>
+        </p:txBody>
+      </p:sp>
+    </p:spTree>
+    <p:extLst>
+      <p:ext uri="{BB962C8B-B14F-4D97-AF65-F5344CB8AC3E}">
+        <p14:creationId xmlns:p14="http://schemas.microsoft.com/office/powerpoint/2010/main" val="2184043765"/>
       </p:ext>
     </p:extLst>
   </p:cSld>

</xml_diff>

<commit_message>
Update mkdocs.yml navigation and copyright year, enhance documentation on environment variable management, and remove outdated illustration file. Added new sections for 'Replying to User' and 'Proactive Messaging' in the overview, and improved security practices in the quick start guide by recommending the use of a .env file for API keys.
</commit_message>
<xml_diff>
--- a/docs/assets/illustrations.pptx
+++ b/docs/assets/illustrations.pptx
@@ -261,7 +261,7 @@
           <a:p>
             <a:fld id="{B6EBD849-BF62-3E41-9392-B52349D77D8A}" type="datetimeFigureOut">
               <a:rPr lang="en-US" smtClean="0"/>
-              <a:t>1/21/26</a:t>
+              <a:t>1/22/26</a:t>
             </a:fld>
             <a:endParaRPr lang="en-US"/>
           </a:p>
@@ -459,7 +459,7 @@
           <a:p>
             <a:fld id="{B6EBD849-BF62-3E41-9392-B52349D77D8A}" type="datetimeFigureOut">
               <a:rPr lang="en-US" smtClean="0"/>
-              <a:t>1/21/26</a:t>
+              <a:t>1/22/26</a:t>
             </a:fld>
             <a:endParaRPr lang="en-US"/>
           </a:p>
@@ -667,7 +667,7 @@
           <a:p>
             <a:fld id="{B6EBD849-BF62-3E41-9392-B52349D77D8A}" type="datetimeFigureOut">
               <a:rPr lang="en-US" smtClean="0"/>
-              <a:t>1/21/26</a:t>
+              <a:t>1/22/26</a:t>
             </a:fld>
             <a:endParaRPr lang="en-US"/>
           </a:p>
@@ -865,7 +865,7 @@
           <a:p>
             <a:fld id="{B6EBD849-BF62-3E41-9392-B52349D77D8A}" type="datetimeFigureOut">
               <a:rPr lang="en-US" smtClean="0"/>
-              <a:t>1/21/26</a:t>
+              <a:t>1/22/26</a:t>
             </a:fld>
             <a:endParaRPr lang="en-US"/>
           </a:p>
@@ -1140,7 +1140,7 @@
           <a:p>
             <a:fld id="{B6EBD849-BF62-3E41-9392-B52349D77D8A}" type="datetimeFigureOut">
               <a:rPr lang="en-US" smtClean="0"/>
-              <a:t>1/21/26</a:t>
+              <a:t>1/22/26</a:t>
             </a:fld>
             <a:endParaRPr lang="en-US"/>
           </a:p>
@@ -1405,7 +1405,7 @@
           <a:p>
             <a:fld id="{B6EBD849-BF62-3E41-9392-B52349D77D8A}" type="datetimeFigureOut">
               <a:rPr lang="en-US" smtClean="0"/>
-              <a:t>1/21/26</a:t>
+              <a:t>1/22/26</a:t>
             </a:fld>
             <a:endParaRPr lang="en-US"/>
           </a:p>
@@ -1817,7 +1817,7 @@
           <a:p>
             <a:fld id="{B6EBD849-BF62-3E41-9392-B52349D77D8A}" type="datetimeFigureOut">
               <a:rPr lang="en-US" smtClean="0"/>
-              <a:t>1/21/26</a:t>
+              <a:t>1/22/26</a:t>
             </a:fld>
             <a:endParaRPr lang="en-US"/>
           </a:p>
@@ -1958,7 +1958,7 @@
           <a:p>
             <a:fld id="{B6EBD849-BF62-3E41-9392-B52349D77D8A}" type="datetimeFigureOut">
               <a:rPr lang="en-US" smtClean="0"/>
-              <a:t>1/21/26</a:t>
+              <a:t>1/22/26</a:t>
             </a:fld>
             <a:endParaRPr lang="en-US"/>
           </a:p>
@@ -2071,7 +2071,7 @@
           <a:p>
             <a:fld id="{B6EBD849-BF62-3E41-9392-B52349D77D8A}" type="datetimeFigureOut">
               <a:rPr lang="en-US" smtClean="0"/>
-              <a:t>1/21/26</a:t>
+              <a:t>1/22/26</a:t>
             </a:fld>
             <a:endParaRPr lang="en-US"/>
           </a:p>
@@ -2382,7 +2382,7 @@
           <a:p>
             <a:fld id="{B6EBD849-BF62-3E41-9392-B52349D77D8A}" type="datetimeFigureOut">
               <a:rPr lang="en-US" smtClean="0"/>
-              <a:t>1/21/26</a:t>
+              <a:t>1/22/26</a:t>
             </a:fld>
             <a:endParaRPr lang="en-US"/>
           </a:p>
@@ -2670,7 +2670,7 @@
           <a:p>
             <a:fld id="{B6EBD849-BF62-3E41-9392-B52349D77D8A}" type="datetimeFigureOut">
               <a:rPr lang="en-US" smtClean="0"/>
-              <a:t>1/21/26</a:t>
+              <a:t>1/22/26</a:t>
             </a:fld>
             <a:endParaRPr lang="en-US"/>
           </a:p>
@@ -2911,7 +2911,7 @@
           <a:p>
             <a:fld id="{B6EBD849-BF62-3E41-9392-B52349D77D8A}" type="datetimeFigureOut">
               <a:rPr lang="en-US" smtClean="0"/>
-              <a:t>1/21/26</a:t>
+              <a:t>1/22/26</a:t>
             </a:fld>
             <a:endParaRPr lang="en-US"/>
           </a:p>
@@ -3945,8 +3945,8 @@
         </p:nvSpPr>
         <p:spPr>
           <a:xfrm>
-            <a:off x="10284679" y="2598486"/>
-            <a:ext cx="1248416" cy="646331"/>
+            <a:off x="10284678" y="2598486"/>
+            <a:ext cx="1666239" cy="646331"/>
           </a:xfrm>
           <a:prstGeom prst="rect">
             <a:avLst/>
@@ -3967,7 +3967,7 @@
                 </a:solidFill>
                 <a:latin typeface="Avenir Book" panose="02000503020000020003" pitchFamily="2" charset="0"/>
               </a:rPr>
-              <a:t>Your Agents</a:t>
+              <a:t>Your/Partner Agents</a:t>
             </a:r>
           </a:p>
         </p:txBody>
@@ -4148,6 +4148,104 @@
           </a:p>
         </p:txBody>
       </p:sp>
+      <p:cxnSp>
+        <p:nvCxnSpPr>
+          <p:cNvPr id="3" name="Elbow Connector 2">
+            <a:extLst>
+              <a:ext uri="{FF2B5EF4-FFF2-40B4-BE49-F238E27FC236}">
+                <a16:creationId xmlns:a16="http://schemas.microsoft.com/office/drawing/2014/main" id="{B5074EB8-0491-742A-5320-4925E4B4F95C}"/>
+              </a:ext>
+            </a:extLst>
+          </p:cNvPr>
+          <p:cNvCxnSpPr>
+            <a:cxnSpLocks/>
+          </p:cNvCxnSpPr>
+          <p:nvPr/>
+        </p:nvCxnSpPr>
+        <p:spPr>
+          <a:xfrm rot="10800000" flipV="1">
+            <a:off x="8801223" y="3378355"/>
+            <a:ext cx="2107664" cy="2080470"/>
+          </a:xfrm>
+          <a:prstGeom prst="bentConnector3">
+            <a:avLst>
+              <a:gd name="adj1" fmla="val 57"/>
+            </a:avLst>
+          </a:prstGeom>
+          <a:ln>
+            <a:solidFill>
+              <a:schemeClr val="bg1">
+                <a:lumMod val="85000"/>
+              </a:schemeClr>
+            </a:solidFill>
+            <a:headEnd type="triangle"/>
+            <a:tailEnd type="triangle"/>
+          </a:ln>
+        </p:spPr>
+        <p:style>
+          <a:lnRef idx="2">
+            <a:schemeClr val="accent1"/>
+          </a:lnRef>
+          <a:fillRef idx="0">
+            <a:schemeClr val="accent1"/>
+          </a:fillRef>
+          <a:effectRef idx="1">
+            <a:schemeClr val="accent1"/>
+          </a:effectRef>
+          <a:fontRef idx="minor">
+            <a:schemeClr val="tx1"/>
+          </a:fontRef>
+        </p:style>
+      </p:cxnSp>
+      <p:cxnSp>
+        <p:nvCxnSpPr>
+          <p:cNvPr id="18" name="Elbow Connector 17">
+            <a:extLst>
+              <a:ext uri="{FF2B5EF4-FFF2-40B4-BE49-F238E27FC236}">
+                <a16:creationId xmlns:a16="http://schemas.microsoft.com/office/drawing/2014/main" id="{015C926B-A91A-DC11-2039-ED3E15929550}"/>
+              </a:ext>
+            </a:extLst>
+          </p:cNvPr>
+          <p:cNvCxnSpPr>
+            <a:cxnSpLocks/>
+          </p:cNvCxnSpPr>
+          <p:nvPr/>
+        </p:nvCxnSpPr>
+        <p:spPr>
+          <a:xfrm rot="10800000" flipV="1">
+            <a:off x="9086976" y="3444777"/>
+            <a:ext cx="1520298" cy="907043"/>
+          </a:xfrm>
+          <a:prstGeom prst="bentConnector3">
+            <a:avLst>
+              <a:gd name="adj1" fmla="val -355"/>
+            </a:avLst>
+          </a:prstGeom>
+          <a:ln>
+            <a:solidFill>
+              <a:schemeClr val="bg1">
+                <a:lumMod val="85000"/>
+              </a:schemeClr>
+            </a:solidFill>
+            <a:headEnd type="triangle"/>
+            <a:tailEnd type="triangle"/>
+          </a:ln>
+        </p:spPr>
+        <p:style>
+          <a:lnRef idx="2">
+            <a:schemeClr val="accent1"/>
+          </a:lnRef>
+          <a:fillRef idx="0">
+            <a:schemeClr val="accent1"/>
+          </a:fillRef>
+          <a:effectRef idx="1">
+            <a:schemeClr val="accent1"/>
+          </a:effectRef>
+          <a:fontRef idx="minor">
+            <a:schemeClr val="tx1"/>
+          </a:fontRef>
+        </p:style>
+      </p:cxnSp>
     </p:spTree>
     <p:extLst>
       <p:ext uri="{BB962C8B-B14F-4D97-AF65-F5344CB8AC3E}">
@@ -5586,7 +5684,7 @@
                   </a:schemeClr>
                 </a:solidFill>
               </a:rPr>
-              <a:t>Agent-Human Collaboration UI</a:t>
+              <a:t>Agent  -  Human UI</a:t>
             </a:r>
           </a:p>
         </p:txBody>
@@ -5651,7 +5749,7 @@
                   </a:schemeClr>
                 </a:solidFill>
               </a:rPr>
-              <a:t>Agent Control Plane (ACP) – E.g., Xians</a:t>
+              <a:t>Agent Control Plane  (ACP) </a:t>
             </a:r>
           </a:p>
         </p:txBody>

</xml_diff>

<commit_message>
Enhance documentation by adding new sections to mkdocs.yml for 'Operating Context' and 'Logging'. Update README.md for formatting consistency. Modify agent registration examples in multiple documentation files to replace 'SystemScoped' with 'IsTemplate' for clarity. Remove outdated 'Scaling' and 'Scheduling SDK' documentation files to streamline content. Revise 'Knowledge' and 'Multitenancy' sections for improved accuracy and readability.
</commit_message>
<xml_diff>
--- a/docs/assets/illustrations.pptx
+++ b/docs/assets/illustrations.pptx
@@ -8,6 +8,10 @@
     <p:sldId id="256" r:id="rId2"/>
     <p:sldId id="257" r:id="rId3"/>
     <p:sldId id="258" r:id="rId4"/>
+    <p:sldId id="260" r:id="rId5"/>
+    <p:sldId id="259" r:id="rId6"/>
+    <p:sldId id="262" r:id="rId7"/>
+    <p:sldId id="263" r:id="rId8"/>
   </p:sldIdLst>
   <p:sldSz cx="12192000" cy="6858000"/>
   <p:notesSz cx="6858000" cy="9144000"/>
@@ -261,7 +265,7 @@
           <a:p>
             <a:fld id="{B6EBD849-BF62-3E41-9392-B52349D77D8A}" type="datetimeFigureOut">
               <a:rPr lang="en-US" smtClean="0"/>
-              <a:t>1/22/26</a:t>
+              <a:t>1/23/26</a:t>
             </a:fld>
             <a:endParaRPr lang="en-US"/>
           </a:p>
@@ -459,7 +463,7 @@
           <a:p>
             <a:fld id="{B6EBD849-BF62-3E41-9392-B52349D77D8A}" type="datetimeFigureOut">
               <a:rPr lang="en-US" smtClean="0"/>
-              <a:t>1/22/26</a:t>
+              <a:t>1/23/26</a:t>
             </a:fld>
             <a:endParaRPr lang="en-US"/>
           </a:p>
@@ -667,7 +671,7 @@
           <a:p>
             <a:fld id="{B6EBD849-BF62-3E41-9392-B52349D77D8A}" type="datetimeFigureOut">
               <a:rPr lang="en-US" smtClean="0"/>
-              <a:t>1/22/26</a:t>
+              <a:t>1/23/26</a:t>
             </a:fld>
             <a:endParaRPr lang="en-US"/>
           </a:p>
@@ -865,7 +869,7 @@
           <a:p>
             <a:fld id="{B6EBD849-BF62-3E41-9392-B52349D77D8A}" type="datetimeFigureOut">
               <a:rPr lang="en-US" smtClean="0"/>
-              <a:t>1/22/26</a:t>
+              <a:t>1/23/26</a:t>
             </a:fld>
             <a:endParaRPr lang="en-US"/>
           </a:p>
@@ -1140,7 +1144,7 @@
           <a:p>
             <a:fld id="{B6EBD849-BF62-3E41-9392-B52349D77D8A}" type="datetimeFigureOut">
               <a:rPr lang="en-US" smtClean="0"/>
-              <a:t>1/22/26</a:t>
+              <a:t>1/23/26</a:t>
             </a:fld>
             <a:endParaRPr lang="en-US"/>
           </a:p>
@@ -1405,7 +1409,7 @@
           <a:p>
             <a:fld id="{B6EBD849-BF62-3E41-9392-B52349D77D8A}" type="datetimeFigureOut">
               <a:rPr lang="en-US" smtClean="0"/>
-              <a:t>1/22/26</a:t>
+              <a:t>1/23/26</a:t>
             </a:fld>
             <a:endParaRPr lang="en-US"/>
           </a:p>
@@ -1817,7 +1821,7 @@
           <a:p>
             <a:fld id="{B6EBD849-BF62-3E41-9392-B52349D77D8A}" type="datetimeFigureOut">
               <a:rPr lang="en-US" smtClean="0"/>
-              <a:t>1/22/26</a:t>
+              <a:t>1/23/26</a:t>
             </a:fld>
             <a:endParaRPr lang="en-US"/>
           </a:p>
@@ -1958,7 +1962,7 @@
           <a:p>
             <a:fld id="{B6EBD849-BF62-3E41-9392-B52349D77D8A}" type="datetimeFigureOut">
               <a:rPr lang="en-US" smtClean="0"/>
-              <a:t>1/22/26</a:t>
+              <a:t>1/23/26</a:t>
             </a:fld>
             <a:endParaRPr lang="en-US"/>
           </a:p>
@@ -2071,7 +2075,7 @@
           <a:p>
             <a:fld id="{B6EBD849-BF62-3E41-9392-B52349D77D8A}" type="datetimeFigureOut">
               <a:rPr lang="en-US" smtClean="0"/>
-              <a:t>1/22/26</a:t>
+              <a:t>1/23/26</a:t>
             </a:fld>
             <a:endParaRPr lang="en-US"/>
           </a:p>
@@ -2382,7 +2386,7 @@
           <a:p>
             <a:fld id="{B6EBD849-BF62-3E41-9392-B52349D77D8A}" type="datetimeFigureOut">
               <a:rPr lang="en-US" smtClean="0"/>
-              <a:t>1/22/26</a:t>
+              <a:t>1/23/26</a:t>
             </a:fld>
             <a:endParaRPr lang="en-US"/>
           </a:p>
@@ -2670,7 +2674,7 @@
           <a:p>
             <a:fld id="{B6EBD849-BF62-3E41-9392-B52349D77D8A}" type="datetimeFigureOut">
               <a:rPr lang="en-US" smtClean="0"/>
-              <a:t>1/22/26</a:t>
+              <a:t>1/23/26</a:t>
             </a:fld>
             <a:endParaRPr lang="en-US"/>
           </a:p>
@@ -2911,7 +2915,7 @@
           <a:p>
             <a:fld id="{B6EBD849-BF62-3E41-9392-B52349D77D8A}" type="datetimeFigureOut">
               <a:rPr lang="en-US" smtClean="0"/>
-              <a:t>1/22/26</a:t>
+              <a:t>1/23/26</a:t>
             </a:fld>
             <a:endParaRPr lang="en-US"/>
           </a:p>
@@ -6436,6 +6440,3330 @@
 </p:sld>
 </file>
 
+<file path=ppt/slides/slide4.xml><?xml version="1.0" encoding="utf-8"?>
+<p:sld xmlns:a="http://schemas.openxmlformats.org/drawingml/2006/main" xmlns:r="http://schemas.openxmlformats.org/officeDocument/2006/relationships" xmlns:p="http://schemas.openxmlformats.org/presentationml/2006/main">
+  <p:cSld>
+    <p:spTree>
+      <p:nvGrpSpPr>
+        <p:cNvPr id="1" name=""/>
+        <p:cNvGrpSpPr/>
+        <p:nvPr/>
+      </p:nvGrpSpPr>
+      <p:grpSpPr>
+        <a:xfrm>
+          <a:off x="0" y="0"/>
+          <a:ext cx="0" cy="0"/>
+          <a:chOff x="0" y="0"/>
+          <a:chExt cx="0" cy="0"/>
+        </a:xfrm>
+      </p:grpSpPr>
+      <p:sp>
+        <p:nvSpPr>
+          <p:cNvPr id="2" name="Title 1">
+            <a:extLst>
+              <a:ext uri="{FF2B5EF4-FFF2-40B4-BE49-F238E27FC236}">
+                <a16:creationId xmlns:a16="http://schemas.microsoft.com/office/drawing/2014/main" id="{6BC84D04-C73A-E890-119E-690D52C94234}"/>
+              </a:ext>
+            </a:extLst>
+          </p:cNvPr>
+          <p:cNvSpPr>
+            <a:spLocks noGrp="1"/>
+          </p:cNvSpPr>
+          <p:nvPr>
+            <p:ph type="title"/>
+          </p:nvPr>
+        </p:nvSpPr>
+        <p:spPr>
+          <a:xfrm>
+            <a:off x="838200" y="2766218"/>
+            <a:ext cx="10515600" cy="1325563"/>
+          </a:xfrm>
+        </p:spPr>
+        <p:txBody>
+          <a:bodyPr/>
+          <a:lstStyle/>
+          <a:p>
+            <a:r>
+              <a:rPr lang="en-US" dirty="0"/>
+              <a:t>Gture platform</a:t>
+            </a:r>
+          </a:p>
+        </p:txBody>
+      </p:sp>
+    </p:spTree>
+    <p:extLst>
+      <p:ext uri="{BB962C8B-B14F-4D97-AF65-F5344CB8AC3E}">
+        <p14:creationId xmlns:p14="http://schemas.microsoft.com/office/powerpoint/2010/main" val="3353922584"/>
+      </p:ext>
+    </p:extLst>
+  </p:cSld>
+  <p:clrMapOvr>
+    <a:masterClrMapping/>
+  </p:clrMapOvr>
+</p:sld>
+</file>
+
+<file path=ppt/slides/slide5.xml><?xml version="1.0" encoding="utf-8"?>
+<p:sld xmlns:a="http://schemas.openxmlformats.org/drawingml/2006/main" xmlns:r="http://schemas.openxmlformats.org/officeDocument/2006/relationships" xmlns:p="http://schemas.openxmlformats.org/presentationml/2006/main">
+  <p:cSld>
+    <p:bg>
+      <p:bgPr>
+        <a:solidFill>
+          <a:schemeClr val="tx1">
+            <a:lumMod val="85000"/>
+            <a:lumOff val="15000"/>
+          </a:schemeClr>
+        </a:solidFill>
+        <a:effectLst/>
+      </p:bgPr>
+    </p:bg>
+    <p:spTree>
+      <p:nvGrpSpPr>
+        <p:cNvPr id="1" name="">
+          <a:extLst>
+            <a:ext uri="{FF2B5EF4-FFF2-40B4-BE49-F238E27FC236}">
+              <a16:creationId xmlns:a16="http://schemas.microsoft.com/office/drawing/2014/main" id="{84D52D84-3C61-5BF2-EC63-D296DE7DAF2D}"/>
+            </a:ext>
+          </a:extLst>
+        </p:cNvPr>
+        <p:cNvGrpSpPr/>
+        <p:nvPr/>
+      </p:nvGrpSpPr>
+      <p:grpSpPr>
+        <a:xfrm>
+          <a:off x="0" y="0"/>
+          <a:ext cx="0" cy="0"/>
+          <a:chOff x="0" y="0"/>
+          <a:chExt cx="0" cy="0"/>
+        </a:xfrm>
+      </p:grpSpPr>
+      <p:pic>
+        <p:nvPicPr>
+          <p:cNvPr id="12" name="Graphic 11" descr="Server with solid fill">
+            <a:extLst>
+              <a:ext uri="{FF2B5EF4-FFF2-40B4-BE49-F238E27FC236}">
+                <a16:creationId xmlns:a16="http://schemas.microsoft.com/office/drawing/2014/main" id="{1AE68B3B-5B02-9FEB-4233-2283C123109B}"/>
+              </a:ext>
+            </a:extLst>
+          </p:cNvPr>
+          <p:cNvPicPr>
+            <a:picLocks noChangeAspect="1"/>
+          </p:cNvPicPr>
+          <p:nvPr/>
+        </p:nvPicPr>
+        <p:blipFill>
+          <a:blip r:embed="rId2">
+            <a:extLst>
+              <a:ext uri="{96DAC541-7B7A-43D3-8B79-37D633B846F1}">
+                <asvg:svgBlip xmlns:asvg="http://schemas.microsoft.com/office/drawing/2016/SVG/main" r:embed="rId3"/>
+              </a:ext>
+            </a:extLst>
+          </a:blip>
+          <a:stretch>
+            <a:fillRect/>
+          </a:stretch>
+        </p:blipFill>
+        <p:spPr>
+          <a:xfrm>
+            <a:off x="7664393" y="3233071"/>
+            <a:ext cx="926974" cy="926974"/>
+          </a:xfrm>
+          <a:prstGeom prst="rect">
+            <a:avLst/>
+          </a:prstGeom>
+        </p:spPr>
+      </p:pic>
+      <p:sp>
+        <p:nvSpPr>
+          <p:cNvPr id="15" name="TextBox 14">
+            <a:extLst>
+              <a:ext uri="{FF2B5EF4-FFF2-40B4-BE49-F238E27FC236}">
+                <a16:creationId xmlns:a16="http://schemas.microsoft.com/office/drawing/2014/main" id="{EE7EA5B7-A6E6-DBB4-F907-FE864A2F7DE8}"/>
+              </a:ext>
+            </a:extLst>
+          </p:cNvPr>
+          <p:cNvSpPr txBox="1"/>
+          <p:nvPr/>
+        </p:nvSpPr>
+        <p:spPr>
+          <a:xfrm>
+            <a:off x="7276915" y="4140195"/>
+            <a:ext cx="1757193" cy="646331"/>
+          </a:xfrm>
+          <a:prstGeom prst="rect">
+            <a:avLst/>
+          </a:prstGeom>
+          <a:noFill/>
+        </p:spPr>
+        <p:txBody>
+          <a:bodyPr wrap="square" rtlCol="0">
+            <a:spAutoFit/>
+          </a:bodyPr>
+          <a:lstStyle/>
+          <a:p>
+            <a:pPr algn="ctr"/>
+            <a:r>
+              <a:rPr lang="en-US" dirty="0">
+                <a:solidFill>
+                  <a:schemeClr val="tx2">
+                    <a:lumMod val="25000"/>
+                    <a:lumOff val="75000"/>
+                  </a:schemeClr>
+                </a:solidFill>
+                <a:latin typeface="Avenir Book" panose="02000503020000020003" pitchFamily="2" charset="0"/>
+              </a:rPr>
+              <a:t>Gture platform server</a:t>
+            </a:r>
+          </a:p>
+        </p:txBody>
+      </p:sp>
+      <p:cxnSp>
+        <p:nvCxnSpPr>
+          <p:cNvPr id="22" name="Straight Arrow Connector 21">
+            <a:extLst>
+              <a:ext uri="{FF2B5EF4-FFF2-40B4-BE49-F238E27FC236}">
+                <a16:creationId xmlns:a16="http://schemas.microsoft.com/office/drawing/2014/main" id="{08C11838-834A-4E69-F87E-909C42DA98F7}"/>
+              </a:ext>
+            </a:extLst>
+          </p:cNvPr>
+          <p:cNvCxnSpPr>
+            <a:cxnSpLocks/>
+          </p:cNvCxnSpPr>
+          <p:nvPr/>
+        </p:nvCxnSpPr>
+        <p:spPr>
+          <a:xfrm>
+            <a:off x="9186530" y="3846679"/>
+            <a:ext cx="691117" cy="0"/>
+          </a:xfrm>
+          <a:prstGeom prst="straightConnector1">
+            <a:avLst/>
+          </a:prstGeom>
+          <a:ln>
+            <a:solidFill>
+              <a:schemeClr val="bg1"/>
+            </a:solidFill>
+            <a:headEnd type="triangle"/>
+            <a:tailEnd type="triangle"/>
+          </a:ln>
+        </p:spPr>
+        <p:style>
+          <a:lnRef idx="2">
+            <a:schemeClr val="accent1"/>
+          </a:lnRef>
+          <a:fillRef idx="0">
+            <a:schemeClr val="accent1"/>
+          </a:fillRef>
+          <a:effectRef idx="1">
+            <a:schemeClr val="accent1"/>
+          </a:effectRef>
+          <a:fontRef idx="minor">
+            <a:schemeClr val="tx1"/>
+          </a:fontRef>
+        </p:style>
+      </p:cxnSp>
+      <p:pic>
+        <p:nvPicPr>
+          <p:cNvPr id="24" name="Graphic 23" descr="Artificial Intelligence with solid fill">
+            <a:extLst>
+              <a:ext uri="{FF2B5EF4-FFF2-40B4-BE49-F238E27FC236}">
+                <a16:creationId xmlns:a16="http://schemas.microsoft.com/office/drawing/2014/main" id="{010FF37F-EDC4-F1DC-A3D9-E9C4017860B0}"/>
+              </a:ext>
+            </a:extLst>
+          </p:cNvPr>
+          <p:cNvPicPr>
+            <a:picLocks noChangeAspect="1"/>
+          </p:cNvPicPr>
+          <p:nvPr/>
+        </p:nvPicPr>
+        <p:blipFill>
+          <a:blip r:embed="rId4">
+            <a:extLst>
+              <a:ext uri="{96DAC541-7B7A-43D3-8B79-37D633B846F1}">
+                <asvg:svgBlip xmlns:asvg="http://schemas.microsoft.com/office/drawing/2016/SVG/main" r:embed="rId5"/>
+              </a:ext>
+            </a:extLst>
+          </a:blip>
+          <a:stretch>
+            <a:fillRect/>
+          </a:stretch>
+        </p:blipFill>
+        <p:spPr>
+          <a:xfrm>
+            <a:off x="10635715" y="3371570"/>
+            <a:ext cx="549643" cy="549643"/>
+          </a:xfrm>
+          <a:prstGeom prst="rect">
+            <a:avLst/>
+          </a:prstGeom>
+        </p:spPr>
+      </p:pic>
+      <p:pic>
+        <p:nvPicPr>
+          <p:cNvPr id="25" name="Graphic 24" descr="Artificial Intelligence with solid fill">
+            <a:extLst>
+              <a:ext uri="{FF2B5EF4-FFF2-40B4-BE49-F238E27FC236}">
+                <a16:creationId xmlns:a16="http://schemas.microsoft.com/office/drawing/2014/main" id="{F7A9243E-3412-CEAE-3475-FEBAF287DA74}"/>
+              </a:ext>
+            </a:extLst>
+          </p:cNvPr>
+          <p:cNvPicPr>
+            <a:picLocks noChangeAspect="1"/>
+          </p:cNvPicPr>
+          <p:nvPr/>
+        </p:nvPicPr>
+        <p:blipFill>
+          <a:blip r:embed="rId4">
+            <a:extLst>
+              <a:ext uri="{96DAC541-7B7A-43D3-8B79-37D633B846F1}">
+                <asvg:svgBlip xmlns:asvg="http://schemas.microsoft.com/office/drawing/2016/SVG/main" r:embed="rId5"/>
+              </a:ext>
+            </a:extLst>
+          </a:blip>
+          <a:stretch>
+            <a:fillRect/>
+          </a:stretch>
+        </p:blipFill>
+        <p:spPr>
+          <a:xfrm>
+            <a:off x="10788115" y="3523970"/>
+            <a:ext cx="549643" cy="549643"/>
+          </a:xfrm>
+          <a:prstGeom prst="rect">
+            <a:avLst/>
+          </a:prstGeom>
+        </p:spPr>
+      </p:pic>
+      <p:sp>
+        <p:nvSpPr>
+          <p:cNvPr id="26" name="TextBox 25">
+            <a:extLst>
+              <a:ext uri="{FF2B5EF4-FFF2-40B4-BE49-F238E27FC236}">
+                <a16:creationId xmlns:a16="http://schemas.microsoft.com/office/drawing/2014/main" id="{CB762A28-4C61-EAF9-799F-5D679C05A716}"/>
+              </a:ext>
+            </a:extLst>
+          </p:cNvPr>
+          <p:cNvSpPr txBox="1"/>
+          <p:nvPr/>
+        </p:nvSpPr>
+        <p:spPr>
+          <a:xfrm>
+            <a:off x="10494219" y="4160045"/>
+            <a:ext cx="1248416" cy="461665"/>
+          </a:xfrm>
+          <a:prstGeom prst="rect">
+            <a:avLst/>
+          </a:prstGeom>
+          <a:noFill/>
+        </p:spPr>
+        <p:txBody>
+          <a:bodyPr wrap="square" rtlCol="0">
+            <a:spAutoFit/>
+          </a:bodyPr>
+          <a:lstStyle/>
+          <a:p>
+            <a:pPr algn="ctr"/>
+            <a:r>
+              <a:rPr lang="en-US" sz="1200" dirty="0">
+                <a:solidFill>
+                  <a:schemeClr val="bg1"/>
+                </a:solidFill>
+                <a:latin typeface="Avenir Book" panose="02000503020000020003" pitchFamily="2" charset="0"/>
+              </a:rPr>
+              <a:t>Company A</a:t>
+            </a:r>
+          </a:p>
+          <a:p>
+            <a:pPr algn="ctr"/>
+            <a:r>
+              <a:rPr lang="en-US" sz="1200" dirty="0">
+                <a:solidFill>
+                  <a:schemeClr val="bg1"/>
+                </a:solidFill>
+                <a:latin typeface="Avenir Book" panose="02000503020000020003" pitchFamily="2" charset="0"/>
+              </a:rPr>
+              <a:t> AI Agents</a:t>
+            </a:r>
+          </a:p>
+        </p:txBody>
+      </p:sp>
+      <p:sp>
+        <p:nvSpPr>
+          <p:cNvPr id="7" name="Rounded Rectangle 6">
+            <a:extLst>
+              <a:ext uri="{FF2B5EF4-FFF2-40B4-BE49-F238E27FC236}">
+                <a16:creationId xmlns:a16="http://schemas.microsoft.com/office/drawing/2014/main" id="{5B4F8494-CECC-8A1C-3B95-EEBF4398F1A6}"/>
+              </a:ext>
+            </a:extLst>
+          </p:cNvPr>
+          <p:cNvSpPr/>
+          <p:nvPr/>
+        </p:nvSpPr>
+        <p:spPr>
+          <a:xfrm rot="5400000">
+            <a:off x="9478334" y="3625292"/>
+            <a:ext cx="1514417" cy="410995"/>
+          </a:xfrm>
+          <a:prstGeom prst="roundRect">
+            <a:avLst/>
+          </a:prstGeom>
+          <a:noFill/>
+          <a:ln>
+            <a:solidFill>
+              <a:schemeClr val="tx2">
+                <a:lumMod val="25000"/>
+                <a:lumOff val="75000"/>
+              </a:schemeClr>
+            </a:solidFill>
+          </a:ln>
+        </p:spPr>
+        <p:style>
+          <a:lnRef idx="2">
+            <a:schemeClr val="accent1">
+              <a:shade val="15000"/>
+            </a:schemeClr>
+          </a:lnRef>
+          <a:fillRef idx="1">
+            <a:schemeClr val="accent1"/>
+          </a:fillRef>
+          <a:effectRef idx="0">
+            <a:schemeClr val="accent1"/>
+          </a:effectRef>
+          <a:fontRef idx="minor">
+            <a:schemeClr val="lt1"/>
+          </a:fontRef>
+        </p:style>
+        <p:txBody>
+          <a:bodyPr rtlCol="0" anchor="ctr"/>
+          <a:lstStyle/>
+          <a:p>
+            <a:pPr algn="ctr"/>
+            <a:r>
+              <a:rPr lang="en-US" dirty="0">
+                <a:solidFill>
+                  <a:schemeClr val="tx2">
+                    <a:lumMod val="25000"/>
+                    <a:lumOff val="75000"/>
+                  </a:schemeClr>
+                </a:solidFill>
+              </a:rPr>
+              <a:t>Lib </a:t>
+            </a:r>
+          </a:p>
+        </p:txBody>
+      </p:sp>
+      <p:sp>
+        <p:nvSpPr>
+          <p:cNvPr id="9" name="Rounded Rectangle 8">
+            <a:extLst>
+              <a:ext uri="{FF2B5EF4-FFF2-40B4-BE49-F238E27FC236}">
+                <a16:creationId xmlns:a16="http://schemas.microsoft.com/office/drawing/2014/main" id="{F75E1856-4911-7970-D783-ACE1A4098EB0}"/>
+              </a:ext>
+            </a:extLst>
+          </p:cNvPr>
+          <p:cNvSpPr/>
+          <p:nvPr/>
+        </p:nvSpPr>
+        <p:spPr>
+          <a:xfrm>
+            <a:off x="7455747" y="1791026"/>
+            <a:ext cx="1380618" cy="662275"/>
+          </a:xfrm>
+          <a:prstGeom prst="roundRect">
+            <a:avLst/>
+          </a:prstGeom>
+          <a:noFill/>
+          <a:ln>
+            <a:solidFill>
+              <a:schemeClr val="tx2">
+                <a:lumMod val="25000"/>
+                <a:lumOff val="75000"/>
+              </a:schemeClr>
+            </a:solidFill>
+          </a:ln>
+        </p:spPr>
+        <p:style>
+          <a:lnRef idx="2">
+            <a:schemeClr val="accent1">
+              <a:shade val="15000"/>
+            </a:schemeClr>
+          </a:lnRef>
+          <a:fillRef idx="1">
+            <a:schemeClr val="accent1"/>
+          </a:fillRef>
+          <a:effectRef idx="0">
+            <a:schemeClr val="accent1"/>
+          </a:effectRef>
+          <a:fontRef idx="minor">
+            <a:schemeClr val="lt1"/>
+          </a:fontRef>
+        </p:style>
+        <p:txBody>
+          <a:bodyPr rtlCol="0" anchor="ctr"/>
+          <a:lstStyle/>
+          <a:p>
+            <a:pPr algn="ctr"/>
+            <a:r>
+              <a:rPr lang="en-US" dirty="0">
+                <a:solidFill>
+                  <a:schemeClr val="tx2">
+                    <a:lumMod val="25000"/>
+                    <a:lumOff val="75000"/>
+                  </a:schemeClr>
+                </a:solidFill>
+              </a:rPr>
+              <a:t>Gture Dev Portal</a:t>
+            </a:r>
+          </a:p>
+        </p:txBody>
+      </p:sp>
+      <p:cxnSp>
+        <p:nvCxnSpPr>
+          <p:cNvPr id="11" name="Straight Arrow Connector 10">
+            <a:extLst>
+              <a:ext uri="{FF2B5EF4-FFF2-40B4-BE49-F238E27FC236}">
+                <a16:creationId xmlns:a16="http://schemas.microsoft.com/office/drawing/2014/main" id="{00A5793B-D2FF-4EF3-6822-3A596FD6AF0B}"/>
+              </a:ext>
+            </a:extLst>
+          </p:cNvPr>
+          <p:cNvCxnSpPr>
+            <a:cxnSpLocks/>
+          </p:cNvCxnSpPr>
+          <p:nvPr/>
+        </p:nvCxnSpPr>
+        <p:spPr>
+          <a:xfrm>
+            <a:off x="8142838" y="2536875"/>
+            <a:ext cx="0" cy="483541"/>
+          </a:xfrm>
+          <a:prstGeom prst="straightConnector1">
+            <a:avLst/>
+          </a:prstGeom>
+          <a:ln>
+            <a:solidFill>
+              <a:schemeClr val="tx2">
+                <a:lumMod val="25000"/>
+                <a:lumOff val="75000"/>
+              </a:schemeClr>
+            </a:solidFill>
+            <a:headEnd type="triangle"/>
+            <a:tailEnd type="triangle"/>
+          </a:ln>
+        </p:spPr>
+        <p:style>
+          <a:lnRef idx="2">
+            <a:schemeClr val="accent1"/>
+          </a:lnRef>
+          <a:fillRef idx="0">
+            <a:schemeClr val="accent1"/>
+          </a:fillRef>
+          <a:effectRef idx="1">
+            <a:schemeClr val="accent1"/>
+          </a:effectRef>
+          <a:fontRef idx="minor">
+            <a:schemeClr val="tx1"/>
+          </a:fontRef>
+        </p:style>
+      </p:cxnSp>
+      <p:sp>
+        <p:nvSpPr>
+          <p:cNvPr id="29" name="Rounded Rectangle 28">
+            <a:extLst>
+              <a:ext uri="{FF2B5EF4-FFF2-40B4-BE49-F238E27FC236}">
+                <a16:creationId xmlns:a16="http://schemas.microsoft.com/office/drawing/2014/main" id="{0800A040-7552-BFBE-BE34-11CC8A92422A}"/>
+              </a:ext>
+            </a:extLst>
+          </p:cNvPr>
+          <p:cNvSpPr/>
+          <p:nvPr/>
+        </p:nvSpPr>
+        <p:spPr>
+          <a:xfrm>
+            <a:off x="7276915" y="3108196"/>
+            <a:ext cx="1757193" cy="3250559"/>
+          </a:xfrm>
+          <a:prstGeom prst="roundRect">
+            <a:avLst>
+              <a:gd name="adj" fmla="val 6608"/>
+            </a:avLst>
+          </a:prstGeom>
+          <a:noFill/>
+          <a:ln>
+            <a:solidFill>
+              <a:schemeClr val="tx2">
+                <a:lumMod val="25000"/>
+                <a:lumOff val="75000"/>
+              </a:schemeClr>
+            </a:solidFill>
+          </a:ln>
+        </p:spPr>
+        <p:style>
+          <a:lnRef idx="2">
+            <a:schemeClr val="accent1">
+              <a:shade val="15000"/>
+            </a:schemeClr>
+          </a:lnRef>
+          <a:fillRef idx="1">
+            <a:schemeClr val="accent1"/>
+          </a:fillRef>
+          <a:effectRef idx="0">
+            <a:schemeClr val="accent1"/>
+          </a:effectRef>
+          <a:fontRef idx="minor">
+            <a:schemeClr val="lt1"/>
+          </a:fontRef>
+        </p:style>
+        <p:txBody>
+          <a:bodyPr rtlCol="0" anchor="ctr"/>
+          <a:lstStyle/>
+          <a:p>
+            <a:pPr algn="ctr"/>
+            <a:endParaRPr lang="en-US" dirty="0">
+              <a:solidFill>
+                <a:schemeClr val="tx2">
+                  <a:lumMod val="25000"/>
+                  <a:lumOff val="75000"/>
+                </a:schemeClr>
+              </a:solidFill>
+            </a:endParaRPr>
+          </a:p>
+        </p:txBody>
+      </p:sp>
+      <p:sp>
+        <p:nvSpPr>
+          <p:cNvPr id="2" name="Rounded Rectangle 1">
+            <a:extLst>
+              <a:ext uri="{FF2B5EF4-FFF2-40B4-BE49-F238E27FC236}">
+                <a16:creationId xmlns:a16="http://schemas.microsoft.com/office/drawing/2014/main" id="{E9D118BF-0B95-CEBE-8681-6F2E8FAA31C1}"/>
+              </a:ext>
+            </a:extLst>
+          </p:cNvPr>
+          <p:cNvSpPr/>
+          <p:nvPr/>
+        </p:nvSpPr>
+        <p:spPr>
+          <a:xfrm>
+            <a:off x="527440" y="1791025"/>
+            <a:ext cx="1586753" cy="662275"/>
+          </a:xfrm>
+          <a:prstGeom prst="roundRect">
+            <a:avLst/>
+          </a:prstGeom>
+          <a:noFill/>
+          <a:ln>
+            <a:solidFill>
+              <a:schemeClr val="tx2">
+                <a:lumMod val="25000"/>
+                <a:lumOff val="75000"/>
+              </a:schemeClr>
+            </a:solidFill>
+          </a:ln>
+        </p:spPr>
+        <p:style>
+          <a:lnRef idx="2">
+            <a:schemeClr val="accent1">
+              <a:shade val="15000"/>
+            </a:schemeClr>
+          </a:lnRef>
+          <a:fillRef idx="1">
+            <a:schemeClr val="accent1"/>
+          </a:fillRef>
+          <a:effectRef idx="0">
+            <a:schemeClr val="accent1"/>
+          </a:effectRef>
+          <a:fontRef idx="minor">
+            <a:schemeClr val="lt1"/>
+          </a:fontRef>
+        </p:style>
+        <p:txBody>
+          <a:bodyPr rtlCol="0" anchor="ctr"/>
+          <a:lstStyle/>
+          <a:p>
+            <a:pPr algn="ctr"/>
+            <a:r>
+              <a:rPr lang="en-US" dirty="0">
+                <a:solidFill>
+                  <a:schemeClr val="tx2">
+                    <a:lumMod val="25000"/>
+                    <a:lumOff val="75000"/>
+                  </a:schemeClr>
+                </a:solidFill>
+              </a:rPr>
+              <a:t>Gture Agent Studio</a:t>
+            </a:r>
+          </a:p>
+        </p:txBody>
+      </p:sp>
+      <p:sp>
+        <p:nvSpPr>
+          <p:cNvPr id="6" name="TextBox 5">
+            <a:extLst>
+              <a:ext uri="{FF2B5EF4-FFF2-40B4-BE49-F238E27FC236}">
+                <a16:creationId xmlns:a16="http://schemas.microsoft.com/office/drawing/2014/main" id="{A706F744-C3CA-4099-AC50-E73D70E0F508}"/>
+              </a:ext>
+            </a:extLst>
+          </p:cNvPr>
+          <p:cNvSpPr txBox="1"/>
+          <p:nvPr/>
+        </p:nvSpPr>
+        <p:spPr>
+          <a:xfrm>
+            <a:off x="240859" y="2675330"/>
+            <a:ext cx="2058682" cy="276999"/>
+          </a:xfrm>
+          <a:prstGeom prst="rect">
+            <a:avLst/>
+          </a:prstGeom>
+          <a:noFill/>
+        </p:spPr>
+        <p:txBody>
+          <a:bodyPr wrap="square" rtlCol="0">
+            <a:spAutoFit/>
+          </a:bodyPr>
+          <a:lstStyle/>
+          <a:p>
+            <a:pPr algn="ctr"/>
+            <a:r>
+              <a:rPr lang="en-US" sz="1200" dirty="0">
+                <a:solidFill>
+                  <a:schemeClr val="bg1"/>
+                </a:solidFill>
+                <a:latin typeface="Avenir Book" panose="02000503020000020003" pitchFamily="2" charset="0"/>
+              </a:rPr>
+              <a:t>Company A Users</a:t>
+            </a:r>
+          </a:p>
+        </p:txBody>
+      </p:sp>
+      <p:cxnSp>
+        <p:nvCxnSpPr>
+          <p:cNvPr id="19" name="Elbow Connector 18">
+            <a:extLst>
+              <a:ext uri="{FF2B5EF4-FFF2-40B4-BE49-F238E27FC236}">
+                <a16:creationId xmlns:a16="http://schemas.microsoft.com/office/drawing/2014/main" id="{7DC1CA0F-2193-3828-933E-7435B7F4294C}"/>
+              </a:ext>
+            </a:extLst>
+          </p:cNvPr>
+          <p:cNvCxnSpPr>
+            <a:cxnSpLocks/>
+          </p:cNvCxnSpPr>
+          <p:nvPr/>
+        </p:nvCxnSpPr>
+        <p:spPr>
+          <a:xfrm>
+            <a:off x="2352720" y="2112434"/>
+            <a:ext cx="4771773" cy="1384248"/>
+          </a:xfrm>
+          <a:prstGeom prst="bentConnector3">
+            <a:avLst>
+              <a:gd name="adj1" fmla="val 90776"/>
+            </a:avLst>
+          </a:prstGeom>
+          <a:ln>
+            <a:solidFill>
+              <a:schemeClr val="tx2">
+                <a:lumMod val="25000"/>
+                <a:lumOff val="75000"/>
+              </a:schemeClr>
+            </a:solidFill>
+            <a:headEnd type="triangle"/>
+            <a:tailEnd type="triangle"/>
+          </a:ln>
+        </p:spPr>
+        <p:style>
+          <a:lnRef idx="2">
+            <a:schemeClr val="accent1"/>
+          </a:lnRef>
+          <a:fillRef idx="0">
+            <a:schemeClr val="accent1"/>
+          </a:fillRef>
+          <a:effectRef idx="1">
+            <a:schemeClr val="accent1"/>
+          </a:effectRef>
+          <a:fontRef idx="minor">
+            <a:schemeClr val="tx1"/>
+          </a:fontRef>
+        </p:style>
+      </p:cxnSp>
+      <p:cxnSp>
+        <p:nvCxnSpPr>
+          <p:cNvPr id="3" name="Straight Arrow Connector 2">
+            <a:extLst>
+              <a:ext uri="{FF2B5EF4-FFF2-40B4-BE49-F238E27FC236}">
+                <a16:creationId xmlns:a16="http://schemas.microsoft.com/office/drawing/2014/main" id="{639A30AA-12A0-C356-2EE3-79F00581C753}"/>
+              </a:ext>
+            </a:extLst>
+          </p:cNvPr>
+          <p:cNvCxnSpPr>
+            <a:cxnSpLocks/>
+          </p:cNvCxnSpPr>
+          <p:nvPr/>
+        </p:nvCxnSpPr>
+        <p:spPr>
+          <a:xfrm>
+            <a:off x="9186530" y="5782627"/>
+            <a:ext cx="691117" cy="0"/>
+          </a:xfrm>
+          <a:prstGeom prst="straightConnector1">
+            <a:avLst/>
+          </a:prstGeom>
+          <a:ln>
+            <a:solidFill>
+              <a:schemeClr val="bg1"/>
+            </a:solidFill>
+            <a:headEnd type="triangle"/>
+            <a:tailEnd type="triangle"/>
+          </a:ln>
+        </p:spPr>
+        <p:style>
+          <a:lnRef idx="2">
+            <a:schemeClr val="accent1"/>
+          </a:lnRef>
+          <a:fillRef idx="0">
+            <a:schemeClr val="accent1"/>
+          </a:fillRef>
+          <a:effectRef idx="1">
+            <a:schemeClr val="accent1"/>
+          </a:effectRef>
+          <a:fontRef idx="minor">
+            <a:schemeClr val="tx1"/>
+          </a:fontRef>
+        </p:style>
+      </p:cxnSp>
+      <p:pic>
+        <p:nvPicPr>
+          <p:cNvPr id="4" name="Graphic 3" descr="Artificial Intelligence with solid fill">
+            <a:extLst>
+              <a:ext uri="{FF2B5EF4-FFF2-40B4-BE49-F238E27FC236}">
+                <a16:creationId xmlns:a16="http://schemas.microsoft.com/office/drawing/2014/main" id="{B64DA739-0618-325F-F96E-FDFB27B8571A}"/>
+              </a:ext>
+            </a:extLst>
+          </p:cNvPr>
+          <p:cNvPicPr>
+            <a:picLocks noChangeAspect="1"/>
+          </p:cNvPicPr>
+          <p:nvPr/>
+        </p:nvPicPr>
+        <p:blipFill>
+          <a:blip r:embed="rId4">
+            <a:extLst>
+              <a:ext uri="{96DAC541-7B7A-43D3-8B79-37D633B846F1}">
+                <asvg:svgBlip xmlns:asvg="http://schemas.microsoft.com/office/drawing/2016/SVG/main" r:embed="rId5"/>
+              </a:ext>
+            </a:extLst>
+          </a:blip>
+          <a:stretch>
+            <a:fillRect/>
+          </a:stretch>
+        </p:blipFill>
+        <p:spPr>
+          <a:xfrm>
+            <a:off x="10635715" y="5307518"/>
+            <a:ext cx="549643" cy="549643"/>
+          </a:xfrm>
+          <a:prstGeom prst="rect">
+            <a:avLst/>
+          </a:prstGeom>
+        </p:spPr>
+      </p:pic>
+      <p:pic>
+        <p:nvPicPr>
+          <p:cNvPr id="5" name="Graphic 4" descr="Artificial Intelligence with solid fill">
+            <a:extLst>
+              <a:ext uri="{FF2B5EF4-FFF2-40B4-BE49-F238E27FC236}">
+                <a16:creationId xmlns:a16="http://schemas.microsoft.com/office/drawing/2014/main" id="{365F68AF-18A8-3037-4E0A-299405FEA539}"/>
+              </a:ext>
+            </a:extLst>
+          </p:cNvPr>
+          <p:cNvPicPr>
+            <a:picLocks noChangeAspect="1"/>
+          </p:cNvPicPr>
+          <p:nvPr/>
+        </p:nvPicPr>
+        <p:blipFill>
+          <a:blip r:embed="rId4">
+            <a:extLst>
+              <a:ext uri="{96DAC541-7B7A-43D3-8B79-37D633B846F1}">
+                <asvg:svgBlip xmlns:asvg="http://schemas.microsoft.com/office/drawing/2016/SVG/main" r:embed="rId5"/>
+              </a:ext>
+            </a:extLst>
+          </a:blip>
+          <a:stretch>
+            <a:fillRect/>
+          </a:stretch>
+        </p:blipFill>
+        <p:spPr>
+          <a:xfrm>
+            <a:off x="10788115" y="5459918"/>
+            <a:ext cx="549643" cy="549643"/>
+          </a:xfrm>
+          <a:prstGeom prst="rect">
+            <a:avLst/>
+          </a:prstGeom>
+        </p:spPr>
+      </p:pic>
+      <p:sp>
+        <p:nvSpPr>
+          <p:cNvPr id="18" name="TextBox 17">
+            <a:extLst>
+              <a:ext uri="{FF2B5EF4-FFF2-40B4-BE49-F238E27FC236}">
+                <a16:creationId xmlns:a16="http://schemas.microsoft.com/office/drawing/2014/main" id="{74B65387-8822-7CE2-AE09-E6F7E77C144D}"/>
+              </a:ext>
+            </a:extLst>
+          </p:cNvPr>
+          <p:cNvSpPr txBox="1"/>
+          <p:nvPr/>
+        </p:nvSpPr>
+        <p:spPr>
+          <a:xfrm>
+            <a:off x="10494219" y="6095993"/>
+            <a:ext cx="1248416" cy="461665"/>
+          </a:xfrm>
+          <a:prstGeom prst="rect">
+            <a:avLst/>
+          </a:prstGeom>
+          <a:noFill/>
+        </p:spPr>
+        <p:txBody>
+          <a:bodyPr wrap="square" rtlCol="0">
+            <a:spAutoFit/>
+          </a:bodyPr>
+          <a:lstStyle/>
+          <a:p>
+            <a:pPr algn="ctr"/>
+            <a:r>
+              <a:rPr lang="en-US" sz="1200" dirty="0">
+                <a:solidFill>
+                  <a:schemeClr val="bg1"/>
+                </a:solidFill>
+                <a:latin typeface="Avenir Book" panose="02000503020000020003" pitchFamily="2" charset="0"/>
+              </a:rPr>
+              <a:t>Company B</a:t>
+            </a:r>
+          </a:p>
+          <a:p>
+            <a:pPr algn="ctr"/>
+            <a:r>
+              <a:rPr lang="en-US" sz="1200" dirty="0">
+                <a:solidFill>
+                  <a:schemeClr val="bg1"/>
+                </a:solidFill>
+                <a:latin typeface="Avenir Book" panose="02000503020000020003" pitchFamily="2" charset="0"/>
+              </a:rPr>
+              <a:t> AI Agents</a:t>
+            </a:r>
+          </a:p>
+        </p:txBody>
+      </p:sp>
+      <p:sp>
+        <p:nvSpPr>
+          <p:cNvPr id="31" name="Rounded Rectangle 30">
+            <a:extLst>
+              <a:ext uri="{FF2B5EF4-FFF2-40B4-BE49-F238E27FC236}">
+                <a16:creationId xmlns:a16="http://schemas.microsoft.com/office/drawing/2014/main" id="{7B2EA896-552C-A162-4D8E-BCD48B771AA5}"/>
+              </a:ext>
+            </a:extLst>
+          </p:cNvPr>
+          <p:cNvSpPr/>
+          <p:nvPr/>
+        </p:nvSpPr>
+        <p:spPr>
+          <a:xfrm rot="5400000">
+            <a:off x="9478334" y="5561240"/>
+            <a:ext cx="1514417" cy="410995"/>
+          </a:xfrm>
+          <a:prstGeom prst="roundRect">
+            <a:avLst/>
+          </a:prstGeom>
+          <a:noFill/>
+          <a:ln>
+            <a:solidFill>
+              <a:schemeClr val="tx2">
+                <a:lumMod val="25000"/>
+                <a:lumOff val="75000"/>
+              </a:schemeClr>
+            </a:solidFill>
+          </a:ln>
+        </p:spPr>
+        <p:style>
+          <a:lnRef idx="2">
+            <a:schemeClr val="accent1">
+              <a:shade val="15000"/>
+            </a:schemeClr>
+          </a:lnRef>
+          <a:fillRef idx="1">
+            <a:schemeClr val="accent1"/>
+          </a:fillRef>
+          <a:effectRef idx="0">
+            <a:schemeClr val="accent1"/>
+          </a:effectRef>
+          <a:fontRef idx="minor">
+            <a:schemeClr val="lt1"/>
+          </a:fontRef>
+        </p:style>
+        <p:txBody>
+          <a:bodyPr rtlCol="0" anchor="ctr"/>
+          <a:lstStyle/>
+          <a:p>
+            <a:pPr algn="ctr"/>
+            <a:r>
+              <a:rPr lang="en-US" dirty="0">
+                <a:solidFill>
+                  <a:schemeClr val="tx2">
+                    <a:lumMod val="25000"/>
+                    <a:lumOff val="75000"/>
+                  </a:schemeClr>
+                </a:solidFill>
+              </a:rPr>
+              <a:t>Lib </a:t>
+            </a:r>
+          </a:p>
+        </p:txBody>
+      </p:sp>
+      <p:sp>
+        <p:nvSpPr>
+          <p:cNvPr id="32" name="TextBox 31">
+            <a:extLst>
+              <a:ext uri="{FF2B5EF4-FFF2-40B4-BE49-F238E27FC236}">
+                <a16:creationId xmlns:a16="http://schemas.microsoft.com/office/drawing/2014/main" id="{7C393C61-72C9-A218-39CF-A00F8A49BCD7}"/>
+              </a:ext>
+            </a:extLst>
+          </p:cNvPr>
+          <p:cNvSpPr txBox="1"/>
+          <p:nvPr/>
+        </p:nvSpPr>
+        <p:spPr>
+          <a:xfrm>
+            <a:off x="240859" y="3094571"/>
+            <a:ext cx="2058682" cy="276999"/>
+          </a:xfrm>
+          <a:prstGeom prst="rect">
+            <a:avLst/>
+          </a:prstGeom>
+          <a:noFill/>
+        </p:spPr>
+        <p:txBody>
+          <a:bodyPr wrap="square" rtlCol="0">
+            <a:spAutoFit/>
+          </a:bodyPr>
+          <a:lstStyle/>
+          <a:p>
+            <a:pPr algn="ctr"/>
+            <a:r>
+              <a:rPr lang="en-US" sz="1200" dirty="0">
+                <a:solidFill>
+                  <a:schemeClr val="bg1"/>
+                </a:solidFill>
+                <a:latin typeface="Avenir Book" panose="02000503020000020003" pitchFamily="2" charset="0"/>
+              </a:rPr>
+              <a:t>Company B Users</a:t>
+            </a:r>
+          </a:p>
+        </p:txBody>
+      </p:sp>
+    </p:spTree>
+    <p:extLst>
+      <p:ext uri="{BB962C8B-B14F-4D97-AF65-F5344CB8AC3E}">
+        <p14:creationId xmlns:p14="http://schemas.microsoft.com/office/powerpoint/2010/main" val="2816515535"/>
+      </p:ext>
+    </p:extLst>
+  </p:cSld>
+  <p:clrMapOvr>
+    <a:masterClrMapping/>
+  </p:clrMapOvr>
+</p:sld>
+</file>
+
+<file path=ppt/slides/slide6.xml><?xml version="1.0" encoding="utf-8"?>
+<p:sld xmlns:a="http://schemas.openxmlformats.org/drawingml/2006/main" xmlns:r="http://schemas.openxmlformats.org/officeDocument/2006/relationships" xmlns:p="http://schemas.openxmlformats.org/presentationml/2006/main">
+  <p:cSld>
+    <p:bg>
+      <p:bgPr>
+        <a:solidFill>
+          <a:schemeClr val="tx1">
+            <a:lumMod val="85000"/>
+            <a:lumOff val="15000"/>
+          </a:schemeClr>
+        </a:solidFill>
+        <a:effectLst/>
+      </p:bgPr>
+    </p:bg>
+    <p:spTree>
+      <p:nvGrpSpPr>
+        <p:cNvPr id="1" name="">
+          <a:extLst>
+            <a:ext uri="{FF2B5EF4-FFF2-40B4-BE49-F238E27FC236}">
+              <a16:creationId xmlns:a16="http://schemas.microsoft.com/office/drawing/2014/main" id="{460A94F8-A713-E404-6350-4A213CCEFAD7}"/>
+            </a:ext>
+          </a:extLst>
+        </p:cNvPr>
+        <p:cNvGrpSpPr/>
+        <p:nvPr/>
+      </p:nvGrpSpPr>
+      <p:grpSpPr>
+        <a:xfrm>
+          <a:off x="0" y="0"/>
+          <a:ext cx="0" cy="0"/>
+          <a:chOff x="0" y="0"/>
+          <a:chExt cx="0" cy="0"/>
+        </a:xfrm>
+      </p:grpSpPr>
+      <p:pic>
+        <p:nvPicPr>
+          <p:cNvPr id="12" name="Graphic 11" descr="Server with solid fill">
+            <a:extLst>
+              <a:ext uri="{FF2B5EF4-FFF2-40B4-BE49-F238E27FC236}">
+                <a16:creationId xmlns:a16="http://schemas.microsoft.com/office/drawing/2014/main" id="{206F8CBF-D475-F3A2-B19F-2DB947580C39}"/>
+              </a:ext>
+            </a:extLst>
+          </p:cNvPr>
+          <p:cNvPicPr>
+            <a:picLocks noChangeAspect="1"/>
+          </p:cNvPicPr>
+          <p:nvPr/>
+        </p:nvPicPr>
+        <p:blipFill>
+          <a:blip r:embed="rId2">
+            <a:extLst>
+              <a:ext uri="{96DAC541-7B7A-43D3-8B79-37D633B846F1}">
+                <asvg:svgBlip xmlns:asvg="http://schemas.microsoft.com/office/drawing/2016/SVG/main" r:embed="rId3"/>
+              </a:ext>
+            </a:extLst>
+          </a:blip>
+          <a:stretch>
+            <a:fillRect/>
+          </a:stretch>
+        </p:blipFill>
+        <p:spPr>
+          <a:xfrm>
+            <a:off x="7664393" y="3233071"/>
+            <a:ext cx="926974" cy="926974"/>
+          </a:xfrm>
+          <a:prstGeom prst="rect">
+            <a:avLst/>
+          </a:prstGeom>
+        </p:spPr>
+      </p:pic>
+      <p:sp>
+        <p:nvSpPr>
+          <p:cNvPr id="15" name="TextBox 14">
+            <a:extLst>
+              <a:ext uri="{FF2B5EF4-FFF2-40B4-BE49-F238E27FC236}">
+                <a16:creationId xmlns:a16="http://schemas.microsoft.com/office/drawing/2014/main" id="{04FDB20D-70F2-A9E6-21C2-653057547A76}"/>
+              </a:ext>
+            </a:extLst>
+          </p:cNvPr>
+          <p:cNvSpPr txBox="1"/>
+          <p:nvPr/>
+        </p:nvSpPr>
+        <p:spPr>
+          <a:xfrm>
+            <a:off x="7276915" y="4140195"/>
+            <a:ext cx="1757193" cy="646331"/>
+          </a:xfrm>
+          <a:prstGeom prst="rect">
+            <a:avLst/>
+          </a:prstGeom>
+          <a:noFill/>
+        </p:spPr>
+        <p:txBody>
+          <a:bodyPr wrap="square" rtlCol="0">
+            <a:spAutoFit/>
+          </a:bodyPr>
+          <a:lstStyle/>
+          <a:p>
+            <a:pPr algn="ctr"/>
+            <a:r>
+              <a:rPr lang="en-US" dirty="0">
+                <a:solidFill>
+                  <a:schemeClr val="tx2">
+                    <a:lumMod val="25000"/>
+                    <a:lumOff val="75000"/>
+                  </a:schemeClr>
+                </a:solidFill>
+                <a:latin typeface="Avenir Book" panose="02000503020000020003" pitchFamily="2" charset="0"/>
+              </a:rPr>
+              <a:t>Gture platform server</a:t>
+            </a:r>
+          </a:p>
+        </p:txBody>
+      </p:sp>
+      <p:cxnSp>
+        <p:nvCxnSpPr>
+          <p:cNvPr id="22" name="Straight Arrow Connector 21">
+            <a:extLst>
+              <a:ext uri="{FF2B5EF4-FFF2-40B4-BE49-F238E27FC236}">
+                <a16:creationId xmlns:a16="http://schemas.microsoft.com/office/drawing/2014/main" id="{BE282910-D6BB-4553-9CB2-D09219E2E752}"/>
+              </a:ext>
+            </a:extLst>
+          </p:cNvPr>
+          <p:cNvCxnSpPr>
+            <a:cxnSpLocks/>
+          </p:cNvCxnSpPr>
+          <p:nvPr/>
+        </p:nvCxnSpPr>
+        <p:spPr>
+          <a:xfrm>
+            <a:off x="9186530" y="3846679"/>
+            <a:ext cx="691117" cy="0"/>
+          </a:xfrm>
+          <a:prstGeom prst="straightConnector1">
+            <a:avLst/>
+          </a:prstGeom>
+          <a:ln>
+            <a:solidFill>
+              <a:schemeClr val="tx2">
+                <a:lumMod val="25000"/>
+                <a:lumOff val="75000"/>
+              </a:schemeClr>
+            </a:solidFill>
+            <a:headEnd type="triangle"/>
+            <a:tailEnd type="triangle"/>
+          </a:ln>
+        </p:spPr>
+        <p:style>
+          <a:lnRef idx="2">
+            <a:schemeClr val="accent1"/>
+          </a:lnRef>
+          <a:fillRef idx="0">
+            <a:schemeClr val="accent1"/>
+          </a:fillRef>
+          <a:effectRef idx="1">
+            <a:schemeClr val="accent1"/>
+          </a:effectRef>
+          <a:fontRef idx="minor">
+            <a:schemeClr val="tx1"/>
+          </a:fontRef>
+        </p:style>
+      </p:cxnSp>
+      <p:pic>
+        <p:nvPicPr>
+          <p:cNvPr id="24" name="Graphic 23" descr="Artificial Intelligence with solid fill">
+            <a:extLst>
+              <a:ext uri="{FF2B5EF4-FFF2-40B4-BE49-F238E27FC236}">
+                <a16:creationId xmlns:a16="http://schemas.microsoft.com/office/drawing/2014/main" id="{FF113947-C70A-3138-7F7C-AA1B3937F26B}"/>
+              </a:ext>
+            </a:extLst>
+          </p:cNvPr>
+          <p:cNvPicPr>
+            <a:picLocks noChangeAspect="1"/>
+          </p:cNvPicPr>
+          <p:nvPr/>
+        </p:nvPicPr>
+        <p:blipFill>
+          <a:blip r:embed="rId4">
+            <a:extLst>
+              <a:ext uri="{96DAC541-7B7A-43D3-8B79-37D633B846F1}">
+                <asvg:svgBlip xmlns:asvg="http://schemas.microsoft.com/office/drawing/2016/SVG/main" r:embed="rId5"/>
+              </a:ext>
+            </a:extLst>
+          </a:blip>
+          <a:stretch>
+            <a:fillRect/>
+          </a:stretch>
+        </p:blipFill>
+        <p:spPr>
+          <a:xfrm>
+            <a:off x="10635715" y="3371570"/>
+            <a:ext cx="549643" cy="549643"/>
+          </a:xfrm>
+          <a:prstGeom prst="rect">
+            <a:avLst/>
+          </a:prstGeom>
+        </p:spPr>
+      </p:pic>
+      <p:pic>
+        <p:nvPicPr>
+          <p:cNvPr id="25" name="Graphic 24" descr="Artificial Intelligence with solid fill">
+            <a:extLst>
+              <a:ext uri="{FF2B5EF4-FFF2-40B4-BE49-F238E27FC236}">
+                <a16:creationId xmlns:a16="http://schemas.microsoft.com/office/drawing/2014/main" id="{D412FD53-A3A6-F0A2-861C-50C7148B8149}"/>
+              </a:ext>
+            </a:extLst>
+          </p:cNvPr>
+          <p:cNvPicPr>
+            <a:picLocks noChangeAspect="1"/>
+          </p:cNvPicPr>
+          <p:nvPr/>
+        </p:nvPicPr>
+        <p:blipFill>
+          <a:blip r:embed="rId4">
+            <a:extLst>
+              <a:ext uri="{96DAC541-7B7A-43D3-8B79-37D633B846F1}">
+                <asvg:svgBlip xmlns:asvg="http://schemas.microsoft.com/office/drawing/2016/SVG/main" r:embed="rId5"/>
+              </a:ext>
+            </a:extLst>
+          </a:blip>
+          <a:stretch>
+            <a:fillRect/>
+          </a:stretch>
+        </p:blipFill>
+        <p:spPr>
+          <a:xfrm>
+            <a:off x="10788115" y="3523970"/>
+            <a:ext cx="549643" cy="549643"/>
+          </a:xfrm>
+          <a:prstGeom prst="rect">
+            <a:avLst/>
+          </a:prstGeom>
+        </p:spPr>
+      </p:pic>
+      <p:sp>
+        <p:nvSpPr>
+          <p:cNvPr id="26" name="TextBox 25">
+            <a:extLst>
+              <a:ext uri="{FF2B5EF4-FFF2-40B4-BE49-F238E27FC236}">
+                <a16:creationId xmlns:a16="http://schemas.microsoft.com/office/drawing/2014/main" id="{BB0B7A54-A219-8DBA-1FCD-6D88E984D75D}"/>
+              </a:ext>
+            </a:extLst>
+          </p:cNvPr>
+          <p:cNvSpPr txBox="1"/>
+          <p:nvPr/>
+        </p:nvSpPr>
+        <p:spPr>
+          <a:xfrm>
+            <a:off x="10494219" y="4160045"/>
+            <a:ext cx="1248416" cy="461665"/>
+          </a:xfrm>
+          <a:prstGeom prst="rect">
+            <a:avLst/>
+          </a:prstGeom>
+          <a:noFill/>
+        </p:spPr>
+        <p:txBody>
+          <a:bodyPr wrap="square" rtlCol="0">
+            <a:spAutoFit/>
+          </a:bodyPr>
+          <a:lstStyle/>
+          <a:p>
+            <a:pPr algn="ctr"/>
+            <a:r>
+              <a:rPr lang="en-US" sz="1200" dirty="0">
+                <a:solidFill>
+                  <a:schemeClr val="tx2">
+                    <a:lumMod val="25000"/>
+                    <a:lumOff val="75000"/>
+                  </a:schemeClr>
+                </a:solidFill>
+                <a:latin typeface="Avenir Book" panose="02000503020000020003" pitchFamily="2" charset="0"/>
+              </a:rPr>
+              <a:t>Company A</a:t>
+            </a:r>
+          </a:p>
+          <a:p>
+            <a:pPr algn="ctr"/>
+            <a:r>
+              <a:rPr lang="en-US" sz="1200" dirty="0">
+                <a:solidFill>
+                  <a:schemeClr val="tx2">
+                    <a:lumMod val="25000"/>
+                    <a:lumOff val="75000"/>
+                  </a:schemeClr>
+                </a:solidFill>
+                <a:latin typeface="Avenir Book" panose="02000503020000020003" pitchFamily="2" charset="0"/>
+              </a:rPr>
+              <a:t> AI Agents</a:t>
+            </a:r>
+          </a:p>
+        </p:txBody>
+      </p:sp>
+      <p:sp>
+        <p:nvSpPr>
+          <p:cNvPr id="7" name="Rounded Rectangle 6">
+            <a:extLst>
+              <a:ext uri="{FF2B5EF4-FFF2-40B4-BE49-F238E27FC236}">
+                <a16:creationId xmlns:a16="http://schemas.microsoft.com/office/drawing/2014/main" id="{1D2A7B19-06A6-930C-3F4E-D90F4A66215E}"/>
+              </a:ext>
+            </a:extLst>
+          </p:cNvPr>
+          <p:cNvSpPr/>
+          <p:nvPr/>
+        </p:nvSpPr>
+        <p:spPr>
+          <a:xfrm rot="5400000">
+            <a:off x="9478334" y="3625292"/>
+            <a:ext cx="1514417" cy="410995"/>
+          </a:xfrm>
+          <a:prstGeom prst="roundRect">
+            <a:avLst/>
+          </a:prstGeom>
+          <a:noFill/>
+          <a:ln>
+            <a:solidFill>
+              <a:schemeClr val="tx2">
+                <a:lumMod val="25000"/>
+                <a:lumOff val="75000"/>
+              </a:schemeClr>
+            </a:solidFill>
+          </a:ln>
+        </p:spPr>
+        <p:style>
+          <a:lnRef idx="2">
+            <a:schemeClr val="accent1">
+              <a:shade val="15000"/>
+            </a:schemeClr>
+          </a:lnRef>
+          <a:fillRef idx="1">
+            <a:schemeClr val="accent1"/>
+          </a:fillRef>
+          <a:effectRef idx="0">
+            <a:schemeClr val="accent1"/>
+          </a:effectRef>
+          <a:fontRef idx="minor">
+            <a:schemeClr val="lt1"/>
+          </a:fontRef>
+        </p:style>
+        <p:txBody>
+          <a:bodyPr rtlCol="0" anchor="ctr"/>
+          <a:lstStyle/>
+          <a:p>
+            <a:pPr algn="ctr"/>
+            <a:r>
+              <a:rPr lang="en-US" dirty="0">
+                <a:solidFill>
+                  <a:schemeClr val="tx2">
+                    <a:lumMod val="25000"/>
+                    <a:lumOff val="75000"/>
+                  </a:schemeClr>
+                </a:solidFill>
+              </a:rPr>
+              <a:t>Lib </a:t>
+            </a:r>
+          </a:p>
+        </p:txBody>
+      </p:sp>
+      <p:sp>
+        <p:nvSpPr>
+          <p:cNvPr id="9" name="Rounded Rectangle 8">
+            <a:extLst>
+              <a:ext uri="{FF2B5EF4-FFF2-40B4-BE49-F238E27FC236}">
+                <a16:creationId xmlns:a16="http://schemas.microsoft.com/office/drawing/2014/main" id="{8A9E8CFF-6221-F8C9-A8C1-476AC78359FD}"/>
+              </a:ext>
+            </a:extLst>
+          </p:cNvPr>
+          <p:cNvSpPr/>
+          <p:nvPr/>
+        </p:nvSpPr>
+        <p:spPr>
+          <a:xfrm>
+            <a:off x="7455747" y="1791026"/>
+            <a:ext cx="1380618" cy="662275"/>
+          </a:xfrm>
+          <a:prstGeom prst="roundRect">
+            <a:avLst/>
+          </a:prstGeom>
+          <a:noFill/>
+          <a:ln>
+            <a:solidFill>
+              <a:schemeClr val="tx2">
+                <a:lumMod val="25000"/>
+                <a:lumOff val="75000"/>
+              </a:schemeClr>
+            </a:solidFill>
+          </a:ln>
+        </p:spPr>
+        <p:style>
+          <a:lnRef idx="2">
+            <a:schemeClr val="accent1">
+              <a:shade val="15000"/>
+            </a:schemeClr>
+          </a:lnRef>
+          <a:fillRef idx="1">
+            <a:schemeClr val="accent1"/>
+          </a:fillRef>
+          <a:effectRef idx="0">
+            <a:schemeClr val="accent1"/>
+          </a:effectRef>
+          <a:fontRef idx="minor">
+            <a:schemeClr val="lt1"/>
+          </a:fontRef>
+        </p:style>
+        <p:txBody>
+          <a:bodyPr rtlCol="0" anchor="ctr"/>
+          <a:lstStyle/>
+          <a:p>
+            <a:pPr algn="ctr"/>
+            <a:r>
+              <a:rPr lang="en-US" dirty="0">
+                <a:solidFill>
+                  <a:schemeClr val="tx2">
+                    <a:lumMod val="25000"/>
+                    <a:lumOff val="75000"/>
+                  </a:schemeClr>
+                </a:solidFill>
+              </a:rPr>
+              <a:t>Gture Dev Portal</a:t>
+            </a:r>
+          </a:p>
+        </p:txBody>
+      </p:sp>
+      <p:cxnSp>
+        <p:nvCxnSpPr>
+          <p:cNvPr id="11" name="Straight Arrow Connector 10">
+            <a:extLst>
+              <a:ext uri="{FF2B5EF4-FFF2-40B4-BE49-F238E27FC236}">
+                <a16:creationId xmlns:a16="http://schemas.microsoft.com/office/drawing/2014/main" id="{D62CF1EA-7272-C9F1-D4D2-72636B169C6B}"/>
+              </a:ext>
+            </a:extLst>
+          </p:cNvPr>
+          <p:cNvCxnSpPr>
+            <a:cxnSpLocks/>
+          </p:cNvCxnSpPr>
+          <p:nvPr/>
+        </p:nvCxnSpPr>
+        <p:spPr>
+          <a:xfrm>
+            <a:off x="8142838" y="2536875"/>
+            <a:ext cx="0" cy="483541"/>
+          </a:xfrm>
+          <a:prstGeom prst="straightConnector1">
+            <a:avLst/>
+          </a:prstGeom>
+          <a:ln>
+            <a:solidFill>
+              <a:schemeClr val="tx2">
+                <a:lumMod val="25000"/>
+                <a:lumOff val="75000"/>
+              </a:schemeClr>
+            </a:solidFill>
+            <a:headEnd type="triangle"/>
+            <a:tailEnd type="triangle"/>
+          </a:ln>
+        </p:spPr>
+        <p:style>
+          <a:lnRef idx="2">
+            <a:schemeClr val="accent1"/>
+          </a:lnRef>
+          <a:fillRef idx="0">
+            <a:schemeClr val="accent1"/>
+          </a:fillRef>
+          <a:effectRef idx="1">
+            <a:schemeClr val="accent1"/>
+          </a:effectRef>
+          <a:fontRef idx="minor">
+            <a:schemeClr val="tx1"/>
+          </a:fontRef>
+        </p:style>
+      </p:cxnSp>
+      <p:sp>
+        <p:nvSpPr>
+          <p:cNvPr id="29" name="Rounded Rectangle 28">
+            <a:extLst>
+              <a:ext uri="{FF2B5EF4-FFF2-40B4-BE49-F238E27FC236}">
+                <a16:creationId xmlns:a16="http://schemas.microsoft.com/office/drawing/2014/main" id="{FCD47747-BDFB-36FB-E462-6DC69D19C3B9}"/>
+              </a:ext>
+            </a:extLst>
+          </p:cNvPr>
+          <p:cNvSpPr/>
+          <p:nvPr/>
+        </p:nvSpPr>
+        <p:spPr>
+          <a:xfrm>
+            <a:off x="7276915" y="3108196"/>
+            <a:ext cx="1757193" cy="3250559"/>
+          </a:xfrm>
+          <a:prstGeom prst="roundRect">
+            <a:avLst>
+              <a:gd name="adj" fmla="val 6608"/>
+            </a:avLst>
+          </a:prstGeom>
+          <a:noFill/>
+          <a:ln>
+            <a:solidFill>
+              <a:schemeClr val="tx2">
+                <a:lumMod val="25000"/>
+                <a:lumOff val="75000"/>
+              </a:schemeClr>
+            </a:solidFill>
+          </a:ln>
+        </p:spPr>
+        <p:style>
+          <a:lnRef idx="2">
+            <a:schemeClr val="accent1">
+              <a:shade val="15000"/>
+            </a:schemeClr>
+          </a:lnRef>
+          <a:fillRef idx="1">
+            <a:schemeClr val="accent1"/>
+          </a:fillRef>
+          <a:effectRef idx="0">
+            <a:schemeClr val="accent1"/>
+          </a:effectRef>
+          <a:fontRef idx="minor">
+            <a:schemeClr val="lt1"/>
+          </a:fontRef>
+        </p:style>
+        <p:txBody>
+          <a:bodyPr rtlCol="0" anchor="ctr"/>
+          <a:lstStyle/>
+          <a:p>
+            <a:pPr algn="ctr"/>
+            <a:endParaRPr lang="en-US" dirty="0">
+              <a:solidFill>
+                <a:schemeClr val="tx2">
+                  <a:lumMod val="25000"/>
+                  <a:lumOff val="75000"/>
+                </a:schemeClr>
+              </a:solidFill>
+            </a:endParaRPr>
+          </a:p>
+        </p:txBody>
+      </p:sp>
+      <p:sp>
+        <p:nvSpPr>
+          <p:cNvPr id="2" name="Rounded Rectangle 1">
+            <a:extLst>
+              <a:ext uri="{FF2B5EF4-FFF2-40B4-BE49-F238E27FC236}">
+                <a16:creationId xmlns:a16="http://schemas.microsoft.com/office/drawing/2014/main" id="{6AEF68CF-64E1-B131-FE42-F5368A5F23A9}"/>
+              </a:ext>
+            </a:extLst>
+          </p:cNvPr>
+          <p:cNvSpPr/>
+          <p:nvPr/>
+        </p:nvSpPr>
+        <p:spPr>
+          <a:xfrm>
+            <a:off x="527440" y="1791025"/>
+            <a:ext cx="1586753" cy="662275"/>
+          </a:xfrm>
+          <a:prstGeom prst="roundRect">
+            <a:avLst/>
+          </a:prstGeom>
+          <a:noFill/>
+          <a:ln>
+            <a:solidFill>
+              <a:schemeClr val="tx2">
+                <a:lumMod val="25000"/>
+                <a:lumOff val="75000"/>
+              </a:schemeClr>
+            </a:solidFill>
+          </a:ln>
+        </p:spPr>
+        <p:style>
+          <a:lnRef idx="2">
+            <a:schemeClr val="accent1">
+              <a:shade val="15000"/>
+            </a:schemeClr>
+          </a:lnRef>
+          <a:fillRef idx="1">
+            <a:schemeClr val="accent1"/>
+          </a:fillRef>
+          <a:effectRef idx="0">
+            <a:schemeClr val="accent1"/>
+          </a:effectRef>
+          <a:fontRef idx="minor">
+            <a:schemeClr val="lt1"/>
+          </a:fontRef>
+        </p:style>
+        <p:txBody>
+          <a:bodyPr rtlCol="0" anchor="ctr"/>
+          <a:lstStyle/>
+          <a:p>
+            <a:pPr algn="ctr"/>
+            <a:r>
+              <a:rPr lang="en-US" dirty="0">
+                <a:solidFill>
+                  <a:schemeClr val="tx2">
+                    <a:lumMod val="25000"/>
+                    <a:lumOff val="75000"/>
+                  </a:schemeClr>
+                </a:solidFill>
+              </a:rPr>
+              <a:t>Gture Agent Studio</a:t>
+            </a:r>
+          </a:p>
+        </p:txBody>
+      </p:sp>
+      <p:sp>
+        <p:nvSpPr>
+          <p:cNvPr id="6" name="TextBox 5">
+            <a:extLst>
+              <a:ext uri="{FF2B5EF4-FFF2-40B4-BE49-F238E27FC236}">
+                <a16:creationId xmlns:a16="http://schemas.microsoft.com/office/drawing/2014/main" id="{1B4E7ECF-80B1-77A3-A059-E8662607D72D}"/>
+              </a:ext>
+            </a:extLst>
+          </p:cNvPr>
+          <p:cNvSpPr txBox="1"/>
+          <p:nvPr/>
+        </p:nvSpPr>
+        <p:spPr>
+          <a:xfrm>
+            <a:off x="240859" y="2520723"/>
+            <a:ext cx="2058682" cy="276999"/>
+          </a:xfrm>
+          <a:prstGeom prst="rect">
+            <a:avLst/>
+          </a:prstGeom>
+          <a:noFill/>
+        </p:spPr>
+        <p:txBody>
+          <a:bodyPr wrap="square" rtlCol="0">
+            <a:spAutoFit/>
+          </a:bodyPr>
+          <a:lstStyle/>
+          <a:p>
+            <a:pPr algn="ctr"/>
+            <a:r>
+              <a:rPr lang="en-US" sz="1200" dirty="0">
+                <a:solidFill>
+                  <a:schemeClr val="tx2">
+                    <a:lumMod val="25000"/>
+                    <a:lumOff val="75000"/>
+                  </a:schemeClr>
+                </a:solidFill>
+                <a:latin typeface="Avenir Book" panose="02000503020000020003" pitchFamily="2" charset="0"/>
+              </a:rPr>
+              <a:t>Company A Users</a:t>
+            </a:r>
+          </a:p>
+        </p:txBody>
+      </p:sp>
+      <p:cxnSp>
+        <p:nvCxnSpPr>
+          <p:cNvPr id="19" name="Elbow Connector 18">
+            <a:extLst>
+              <a:ext uri="{FF2B5EF4-FFF2-40B4-BE49-F238E27FC236}">
+                <a16:creationId xmlns:a16="http://schemas.microsoft.com/office/drawing/2014/main" id="{00BE40DD-B177-34AC-0023-6F82D471E729}"/>
+              </a:ext>
+            </a:extLst>
+          </p:cNvPr>
+          <p:cNvCxnSpPr>
+            <a:cxnSpLocks/>
+          </p:cNvCxnSpPr>
+          <p:nvPr/>
+        </p:nvCxnSpPr>
+        <p:spPr>
+          <a:xfrm>
+            <a:off x="2352720" y="2112434"/>
+            <a:ext cx="4771773" cy="1384248"/>
+          </a:xfrm>
+          <a:prstGeom prst="bentConnector3">
+            <a:avLst>
+              <a:gd name="adj1" fmla="val 90776"/>
+            </a:avLst>
+          </a:prstGeom>
+          <a:ln>
+            <a:solidFill>
+              <a:schemeClr val="tx2">
+                <a:lumMod val="25000"/>
+                <a:lumOff val="75000"/>
+              </a:schemeClr>
+            </a:solidFill>
+            <a:headEnd type="triangle"/>
+            <a:tailEnd type="triangle"/>
+          </a:ln>
+        </p:spPr>
+        <p:style>
+          <a:lnRef idx="2">
+            <a:schemeClr val="accent1"/>
+          </a:lnRef>
+          <a:fillRef idx="0">
+            <a:schemeClr val="accent1"/>
+          </a:fillRef>
+          <a:effectRef idx="1">
+            <a:schemeClr val="accent1"/>
+          </a:effectRef>
+          <a:fontRef idx="minor">
+            <a:schemeClr val="tx1"/>
+          </a:fontRef>
+        </p:style>
+      </p:cxnSp>
+      <p:cxnSp>
+        <p:nvCxnSpPr>
+          <p:cNvPr id="3" name="Straight Arrow Connector 2">
+            <a:extLst>
+              <a:ext uri="{FF2B5EF4-FFF2-40B4-BE49-F238E27FC236}">
+                <a16:creationId xmlns:a16="http://schemas.microsoft.com/office/drawing/2014/main" id="{3BACAE55-0A7D-D2CC-35CA-8A14E3423DEA}"/>
+              </a:ext>
+            </a:extLst>
+          </p:cNvPr>
+          <p:cNvCxnSpPr>
+            <a:cxnSpLocks/>
+          </p:cNvCxnSpPr>
+          <p:nvPr/>
+        </p:nvCxnSpPr>
+        <p:spPr>
+          <a:xfrm>
+            <a:off x="9186530" y="5782627"/>
+            <a:ext cx="691117" cy="0"/>
+          </a:xfrm>
+          <a:prstGeom prst="straightConnector1">
+            <a:avLst/>
+          </a:prstGeom>
+          <a:ln>
+            <a:solidFill>
+              <a:schemeClr val="tx2">
+                <a:lumMod val="25000"/>
+                <a:lumOff val="75000"/>
+              </a:schemeClr>
+            </a:solidFill>
+            <a:headEnd type="triangle"/>
+            <a:tailEnd type="triangle"/>
+          </a:ln>
+        </p:spPr>
+        <p:style>
+          <a:lnRef idx="2">
+            <a:schemeClr val="accent1"/>
+          </a:lnRef>
+          <a:fillRef idx="0">
+            <a:schemeClr val="accent1"/>
+          </a:fillRef>
+          <a:effectRef idx="1">
+            <a:schemeClr val="accent1"/>
+          </a:effectRef>
+          <a:fontRef idx="minor">
+            <a:schemeClr val="tx1"/>
+          </a:fontRef>
+        </p:style>
+      </p:cxnSp>
+      <p:pic>
+        <p:nvPicPr>
+          <p:cNvPr id="4" name="Graphic 3" descr="Artificial Intelligence with solid fill">
+            <a:extLst>
+              <a:ext uri="{FF2B5EF4-FFF2-40B4-BE49-F238E27FC236}">
+                <a16:creationId xmlns:a16="http://schemas.microsoft.com/office/drawing/2014/main" id="{78009C86-75EA-3014-CC96-7D0DAC5A8B41}"/>
+              </a:ext>
+            </a:extLst>
+          </p:cNvPr>
+          <p:cNvPicPr>
+            <a:picLocks noChangeAspect="1"/>
+          </p:cNvPicPr>
+          <p:nvPr/>
+        </p:nvPicPr>
+        <p:blipFill>
+          <a:blip r:embed="rId4">
+            <a:extLst>
+              <a:ext uri="{96DAC541-7B7A-43D3-8B79-37D633B846F1}">
+                <asvg:svgBlip xmlns:asvg="http://schemas.microsoft.com/office/drawing/2016/SVG/main" r:embed="rId5"/>
+              </a:ext>
+            </a:extLst>
+          </a:blip>
+          <a:stretch>
+            <a:fillRect/>
+          </a:stretch>
+        </p:blipFill>
+        <p:spPr>
+          <a:xfrm>
+            <a:off x="10635715" y="5307518"/>
+            <a:ext cx="549643" cy="549643"/>
+          </a:xfrm>
+          <a:prstGeom prst="rect">
+            <a:avLst/>
+          </a:prstGeom>
+        </p:spPr>
+      </p:pic>
+      <p:pic>
+        <p:nvPicPr>
+          <p:cNvPr id="5" name="Graphic 4" descr="Artificial Intelligence with solid fill">
+            <a:extLst>
+              <a:ext uri="{FF2B5EF4-FFF2-40B4-BE49-F238E27FC236}">
+                <a16:creationId xmlns:a16="http://schemas.microsoft.com/office/drawing/2014/main" id="{D98D5CA4-B8DA-8420-430C-9CEC14BCD71F}"/>
+              </a:ext>
+            </a:extLst>
+          </p:cNvPr>
+          <p:cNvPicPr>
+            <a:picLocks noChangeAspect="1"/>
+          </p:cNvPicPr>
+          <p:nvPr/>
+        </p:nvPicPr>
+        <p:blipFill>
+          <a:blip r:embed="rId4">
+            <a:extLst>
+              <a:ext uri="{96DAC541-7B7A-43D3-8B79-37D633B846F1}">
+                <asvg:svgBlip xmlns:asvg="http://schemas.microsoft.com/office/drawing/2016/SVG/main" r:embed="rId5"/>
+              </a:ext>
+            </a:extLst>
+          </a:blip>
+          <a:stretch>
+            <a:fillRect/>
+          </a:stretch>
+        </p:blipFill>
+        <p:spPr>
+          <a:xfrm>
+            <a:off x="10788115" y="5459918"/>
+            <a:ext cx="549643" cy="549643"/>
+          </a:xfrm>
+          <a:prstGeom prst="rect">
+            <a:avLst/>
+          </a:prstGeom>
+        </p:spPr>
+      </p:pic>
+      <p:sp>
+        <p:nvSpPr>
+          <p:cNvPr id="18" name="TextBox 17">
+            <a:extLst>
+              <a:ext uri="{FF2B5EF4-FFF2-40B4-BE49-F238E27FC236}">
+                <a16:creationId xmlns:a16="http://schemas.microsoft.com/office/drawing/2014/main" id="{76D7F2DF-9DA2-C7BF-3CB4-AEC8D290B552}"/>
+              </a:ext>
+            </a:extLst>
+          </p:cNvPr>
+          <p:cNvSpPr txBox="1"/>
+          <p:nvPr/>
+        </p:nvSpPr>
+        <p:spPr>
+          <a:xfrm>
+            <a:off x="10494219" y="6095993"/>
+            <a:ext cx="1248416" cy="461665"/>
+          </a:xfrm>
+          <a:prstGeom prst="rect">
+            <a:avLst/>
+          </a:prstGeom>
+          <a:noFill/>
+        </p:spPr>
+        <p:txBody>
+          <a:bodyPr wrap="square" rtlCol="0">
+            <a:spAutoFit/>
+          </a:bodyPr>
+          <a:lstStyle/>
+          <a:p>
+            <a:pPr algn="ctr"/>
+            <a:r>
+              <a:rPr lang="en-US" sz="1200" dirty="0">
+                <a:solidFill>
+                  <a:schemeClr val="tx2">
+                    <a:lumMod val="25000"/>
+                    <a:lumOff val="75000"/>
+                  </a:schemeClr>
+                </a:solidFill>
+                <a:latin typeface="Avenir Book" panose="02000503020000020003" pitchFamily="2" charset="0"/>
+              </a:rPr>
+              <a:t>Company B</a:t>
+            </a:r>
+          </a:p>
+          <a:p>
+            <a:pPr algn="ctr"/>
+            <a:r>
+              <a:rPr lang="en-US" sz="1200" dirty="0">
+                <a:solidFill>
+                  <a:schemeClr val="tx2">
+                    <a:lumMod val="25000"/>
+                    <a:lumOff val="75000"/>
+                  </a:schemeClr>
+                </a:solidFill>
+                <a:latin typeface="Avenir Book" panose="02000503020000020003" pitchFamily="2" charset="0"/>
+              </a:rPr>
+              <a:t> AI Agents</a:t>
+            </a:r>
+          </a:p>
+        </p:txBody>
+      </p:sp>
+      <p:sp>
+        <p:nvSpPr>
+          <p:cNvPr id="31" name="Rounded Rectangle 30">
+            <a:extLst>
+              <a:ext uri="{FF2B5EF4-FFF2-40B4-BE49-F238E27FC236}">
+                <a16:creationId xmlns:a16="http://schemas.microsoft.com/office/drawing/2014/main" id="{717B6F71-9111-F7B6-6BC8-0DE6F71A14D6}"/>
+              </a:ext>
+            </a:extLst>
+          </p:cNvPr>
+          <p:cNvSpPr/>
+          <p:nvPr/>
+        </p:nvSpPr>
+        <p:spPr>
+          <a:xfrm rot="5400000">
+            <a:off x="9478334" y="5561240"/>
+            <a:ext cx="1514417" cy="410995"/>
+          </a:xfrm>
+          <a:prstGeom prst="roundRect">
+            <a:avLst/>
+          </a:prstGeom>
+          <a:noFill/>
+          <a:ln>
+            <a:solidFill>
+              <a:schemeClr val="tx2">
+                <a:lumMod val="25000"/>
+                <a:lumOff val="75000"/>
+              </a:schemeClr>
+            </a:solidFill>
+          </a:ln>
+        </p:spPr>
+        <p:style>
+          <a:lnRef idx="2">
+            <a:schemeClr val="accent1">
+              <a:shade val="15000"/>
+            </a:schemeClr>
+          </a:lnRef>
+          <a:fillRef idx="1">
+            <a:schemeClr val="accent1"/>
+          </a:fillRef>
+          <a:effectRef idx="0">
+            <a:schemeClr val="accent1"/>
+          </a:effectRef>
+          <a:fontRef idx="minor">
+            <a:schemeClr val="lt1"/>
+          </a:fontRef>
+        </p:style>
+        <p:txBody>
+          <a:bodyPr rtlCol="0" anchor="ctr"/>
+          <a:lstStyle/>
+          <a:p>
+            <a:pPr algn="ctr"/>
+            <a:r>
+              <a:rPr lang="en-US" dirty="0">
+                <a:solidFill>
+                  <a:schemeClr val="tx2">
+                    <a:lumMod val="25000"/>
+                    <a:lumOff val="75000"/>
+                  </a:schemeClr>
+                </a:solidFill>
+              </a:rPr>
+              <a:t>Lib </a:t>
+            </a:r>
+          </a:p>
+        </p:txBody>
+      </p:sp>
+      <p:sp>
+        <p:nvSpPr>
+          <p:cNvPr id="32" name="TextBox 31">
+            <a:extLst>
+              <a:ext uri="{FF2B5EF4-FFF2-40B4-BE49-F238E27FC236}">
+                <a16:creationId xmlns:a16="http://schemas.microsoft.com/office/drawing/2014/main" id="{3BB585BE-D2B6-4506-D584-F9BDFB1617C0}"/>
+              </a:ext>
+            </a:extLst>
+          </p:cNvPr>
+          <p:cNvSpPr txBox="1"/>
+          <p:nvPr/>
+        </p:nvSpPr>
+        <p:spPr>
+          <a:xfrm>
+            <a:off x="240859" y="2770273"/>
+            <a:ext cx="2058682" cy="276999"/>
+          </a:xfrm>
+          <a:prstGeom prst="rect">
+            <a:avLst/>
+          </a:prstGeom>
+          <a:noFill/>
+        </p:spPr>
+        <p:txBody>
+          <a:bodyPr wrap="square" rtlCol="0">
+            <a:spAutoFit/>
+          </a:bodyPr>
+          <a:lstStyle/>
+          <a:p>
+            <a:pPr algn="ctr"/>
+            <a:r>
+              <a:rPr lang="en-US" sz="1200" dirty="0">
+                <a:solidFill>
+                  <a:schemeClr val="tx2">
+                    <a:lumMod val="25000"/>
+                    <a:lumOff val="75000"/>
+                  </a:schemeClr>
+                </a:solidFill>
+                <a:latin typeface="Avenir Book" panose="02000503020000020003" pitchFamily="2" charset="0"/>
+              </a:rPr>
+              <a:t>Company B Users</a:t>
+            </a:r>
+          </a:p>
+        </p:txBody>
+      </p:sp>
+      <p:pic>
+        <p:nvPicPr>
+          <p:cNvPr id="10" name="Graphic 9" descr="Server outline">
+            <a:extLst>
+              <a:ext uri="{FF2B5EF4-FFF2-40B4-BE49-F238E27FC236}">
+                <a16:creationId xmlns:a16="http://schemas.microsoft.com/office/drawing/2014/main" id="{DEB30C8D-1356-C8F1-2310-E96745668723}"/>
+              </a:ext>
+            </a:extLst>
+          </p:cNvPr>
+          <p:cNvPicPr>
+            <a:picLocks noChangeAspect="1"/>
+          </p:cNvPicPr>
+          <p:nvPr/>
+        </p:nvPicPr>
+        <p:blipFill>
+          <a:blip r:embed="rId6">
+            <a:extLst>
+              <a:ext uri="{96DAC541-7B7A-43D3-8B79-37D633B846F1}">
+                <asvg:svgBlip xmlns:asvg="http://schemas.microsoft.com/office/drawing/2016/SVG/main" r:embed="rId7"/>
+              </a:ext>
+            </a:extLst>
+          </a:blip>
+          <a:stretch>
+            <a:fillRect/>
+          </a:stretch>
+        </p:blipFill>
+        <p:spPr>
+          <a:xfrm>
+            <a:off x="3116539" y="3977377"/>
+            <a:ext cx="795797" cy="795797"/>
+          </a:xfrm>
+          <a:prstGeom prst="rect">
+            <a:avLst/>
+          </a:prstGeom>
+        </p:spPr>
+      </p:pic>
+      <p:cxnSp>
+        <p:nvCxnSpPr>
+          <p:cNvPr id="13" name="Straight Arrow Connector 12">
+            <a:extLst>
+              <a:ext uri="{FF2B5EF4-FFF2-40B4-BE49-F238E27FC236}">
+                <a16:creationId xmlns:a16="http://schemas.microsoft.com/office/drawing/2014/main" id="{4BFE0920-F2B1-38FE-7B72-262AF3EEED39}"/>
+              </a:ext>
+            </a:extLst>
+          </p:cNvPr>
+          <p:cNvCxnSpPr>
+            <a:cxnSpLocks/>
+          </p:cNvCxnSpPr>
+          <p:nvPr/>
+        </p:nvCxnSpPr>
+        <p:spPr>
+          <a:xfrm>
+            <a:off x="4159592" y="4321269"/>
+            <a:ext cx="2900427" cy="0"/>
+          </a:xfrm>
+          <a:prstGeom prst="straightConnector1">
+            <a:avLst/>
+          </a:prstGeom>
+          <a:ln>
+            <a:solidFill>
+              <a:schemeClr val="bg1"/>
+            </a:solidFill>
+            <a:headEnd type="triangle"/>
+            <a:tailEnd type="triangle"/>
+          </a:ln>
+        </p:spPr>
+        <p:style>
+          <a:lnRef idx="2">
+            <a:schemeClr val="accent1"/>
+          </a:lnRef>
+          <a:fillRef idx="0">
+            <a:schemeClr val="accent1"/>
+          </a:fillRef>
+          <a:effectRef idx="1">
+            <a:schemeClr val="accent1"/>
+          </a:effectRef>
+          <a:fontRef idx="minor">
+            <a:schemeClr val="tx1"/>
+          </a:fontRef>
+        </p:style>
+      </p:cxnSp>
+      <p:cxnSp>
+        <p:nvCxnSpPr>
+          <p:cNvPr id="17" name="Straight Arrow Connector 16">
+            <a:extLst>
+              <a:ext uri="{FF2B5EF4-FFF2-40B4-BE49-F238E27FC236}">
+                <a16:creationId xmlns:a16="http://schemas.microsoft.com/office/drawing/2014/main" id="{72D54881-EF76-3FB4-7F49-9F68C883D3E6}"/>
+              </a:ext>
+            </a:extLst>
+          </p:cNvPr>
+          <p:cNvCxnSpPr>
+            <a:cxnSpLocks/>
+          </p:cNvCxnSpPr>
+          <p:nvPr/>
+        </p:nvCxnSpPr>
+        <p:spPr>
+          <a:xfrm>
+            <a:off x="2048438" y="4337277"/>
+            <a:ext cx="968031" cy="0"/>
+          </a:xfrm>
+          <a:prstGeom prst="straightConnector1">
+            <a:avLst/>
+          </a:prstGeom>
+          <a:ln>
+            <a:solidFill>
+              <a:schemeClr val="bg1"/>
+            </a:solidFill>
+            <a:headEnd type="triangle"/>
+            <a:tailEnd type="triangle"/>
+          </a:ln>
+        </p:spPr>
+        <p:style>
+          <a:lnRef idx="2">
+            <a:schemeClr val="accent1"/>
+          </a:lnRef>
+          <a:fillRef idx="0">
+            <a:schemeClr val="accent1"/>
+          </a:fillRef>
+          <a:effectRef idx="1">
+            <a:schemeClr val="accent1"/>
+          </a:effectRef>
+          <a:fontRef idx="minor">
+            <a:schemeClr val="tx1"/>
+          </a:fontRef>
+        </p:style>
+      </p:cxnSp>
+      <p:pic>
+        <p:nvPicPr>
+          <p:cNvPr id="20" name="Graphic 19" descr="Ui Ux with solid fill">
+            <a:extLst>
+              <a:ext uri="{FF2B5EF4-FFF2-40B4-BE49-F238E27FC236}">
+                <a16:creationId xmlns:a16="http://schemas.microsoft.com/office/drawing/2014/main" id="{40FFBCED-C070-E231-EE7F-5A0FADE298D3}"/>
+              </a:ext>
+            </a:extLst>
+          </p:cNvPr>
+          <p:cNvPicPr>
+            <a:picLocks noChangeAspect="1"/>
+          </p:cNvPicPr>
+          <p:nvPr/>
+        </p:nvPicPr>
+        <p:blipFill>
+          <a:blip r:embed="rId8">
+            <a:extLst>
+              <a:ext uri="{96DAC541-7B7A-43D3-8B79-37D633B846F1}">
+                <asvg:svgBlip xmlns:asvg="http://schemas.microsoft.com/office/drawing/2016/SVG/main" r:embed="rId9"/>
+              </a:ext>
+            </a:extLst>
+          </a:blip>
+          <a:stretch>
+            <a:fillRect/>
+          </a:stretch>
+        </p:blipFill>
+        <p:spPr>
+          <a:xfrm>
+            <a:off x="590705" y="3755853"/>
+            <a:ext cx="1237130" cy="1237130"/>
+          </a:xfrm>
+          <a:prstGeom prst="rect">
+            <a:avLst/>
+          </a:prstGeom>
+        </p:spPr>
+      </p:pic>
+      <p:sp>
+        <p:nvSpPr>
+          <p:cNvPr id="21" name="TextBox 20">
+            <a:extLst>
+              <a:ext uri="{FF2B5EF4-FFF2-40B4-BE49-F238E27FC236}">
+                <a16:creationId xmlns:a16="http://schemas.microsoft.com/office/drawing/2014/main" id="{1F01A5C5-0B89-E6CB-F4E1-B08E3CFD65E9}"/>
+              </a:ext>
+            </a:extLst>
+          </p:cNvPr>
+          <p:cNvSpPr txBox="1"/>
+          <p:nvPr/>
+        </p:nvSpPr>
+        <p:spPr>
+          <a:xfrm>
+            <a:off x="241082" y="5071432"/>
+            <a:ext cx="1936376" cy="461665"/>
+          </a:xfrm>
+          <a:prstGeom prst="rect">
+            <a:avLst/>
+          </a:prstGeom>
+          <a:noFill/>
+        </p:spPr>
+        <p:txBody>
+          <a:bodyPr wrap="square" rtlCol="0">
+            <a:spAutoFit/>
+          </a:bodyPr>
+          <a:lstStyle/>
+          <a:p>
+            <a:pPr algn="ctr"/>
+            <a:r>
+              <a:rPr lang="en-US" sz="1200" dirty="0">
+                <a:solidFill>
+                  <a:schemeClr val="bg1"/>
+                </a:solidFill>
+                <a:latin typeface="Avenir Book" panose="02000503020000020003" pitchFamily="2" charset="0"/>
+              </a:rPr>
+              <a:t>Company C</a:t>
+            </a:r>
+          </a:p>
+          <a:p>
+            <a:pPr algn="ctr"/>
+            <a:r>
+              <a:rPr lang="en-US" sz="1200" dirty="0">
+                <a:solidFill>
+                  <a:schemeClr val="bg1"/>
+                </a:solidFill>
+                <a:latin typeface="Avenir Book" panose="02000503020000020003" pitchFamily="2" charset="0"/>
+              </a:rPr>
+              <a:t> Product UI</a:t>
+            </a:r>
+          </a:p>
+        </p:txBody>
+      </p:sp>
+      <p:sp>
+        <p:nvSpPr>
+          <p:cNvPr id="23" name="TextBox 22">
+            <a:extLst>
+              <a:ext uri="{FF2B5EF4-FFF2-40B4-BE49-F238E27FC236}">
+                <a16:creationId xmlns:a16="http://schemas.microsoft.com/office/drawing/2014/main" id="{D318F5F3-6AD4-2307-B87D-14F527462A8F}"/>
+              </a:ext>
+            </a:extLst>
+          </p:cNvPr>
+          <p:cNvSpPr txBox="1"/>
+          <p:nvPr/>
+        </p:nvSpPr>
+        <p:spPr>
+          <a:xfrm>
+            <a:off x="2532453" y="4778696"/>
+            <a:ext cx="1936376" cy="461665"/>
+          </a:xfrm>
+          <a:prstGeom prst="rect">
+            <a:avLst/>
+          </a:prstGeom>
+          <a:noFill/>
+        </p:spPr>
+        <p:txBody>
+          <a:bodyPr wrap="square" rtlCol="0">
+            <a:spAutoFit/>
+          </a:bodyPr>
+          <a:lstStyle/>
+          <a:p>
+            <a:pPr algn="ctr"/>
+            <a:r>
+              <a:rPr lang="en-US" sz="1200" dirty="0">
+                <a:solidFill>
+                  <a:schemeClr val="bg1"/>
+                </a:solidFill>
+                <a:latin typeface="Avenir Book" panose="02000503020000020003" pitchFamily="2" charset="0"/>
+              </a:rPr>
+              <a:t>Company C</a:t>
+            </a:r>
+          </a:p>
+          <a:p>
+            <a:pPr algn="ctr"/>
+            <a:r>
+              <a:rPr lang="en-US" sz="1200" dirty="0">
+                <a:solidFill>
+                  <a:schemeClr val="bg1"/>
+                </a:solidFill>
+                <a:latin typeface="Avenir Book" panose="02000503020000020003" pitchFamily="2" charset="0"/>
+              </a:rPr>
+              <a:t>Servers</a:t>
+            </a:r>
+          </a:p>
+        </p:txBody>
+      </p:sp>
+      <p:cxnSp>
+        <p:nvCxnSpPr>
+          <p:cNvPr id="27" name="Straight Arrow Connector 26">
+            <a:extLst>
+              <a:ext uri="{FF2B5EF4-FFF2-40B4-BE49-F238E27FC236}">
+                <a16:creationId xmlns:a16="http://schemas.microsoft.com/office/drawing/2014/main" id="{592D9CB1-6CB2-61DA-644E-95E101DC4E79}"/>
+              </a:ext>
+            </a:extLst>
+          </p:cNvPr>
+          <p:cNvCxnSpPr>
+            <a:cxnSpLocks/>
+          </p:cNvCxnSpPr>
+          <p:nvPr/>
+        </p:nvCxnSpPr>
+        <p:spPr>
+          <a:xfrm>
+            <a:off x="6331278" y="5709539"/>
+            <a:ext cx="691117" cy="0"/>
+          </a:xfrm>
+          <a:prstGeom prst="straightConnector1">
+            <a:avLst/>
+          </a:prstGeom>
+          <a:ln>
+            <a:solidFill>
+              <a:schemeClr val="bg1"/>
+            </a:solidFill>
+            <a:headEnd type="triangle"/>
+            <a:tailEnd type="triangle"/>
+          </a:ln>
+        </p:spPr>
+        <p:style>
+          <a:lnRef idx="2">
+            <a:schemeClr val="accent1"/>
+          </a:lnRef>
+          <a:fillRef idx="0">
+            <a:schemeClr val="accent1"/>
+          </a:fillRef>
+          <a:effectRef idx="1">
+            <a:schemeClr val="accent1"/>
+          </a:effectRef>
+          <a:fontRef idx="minor">
+            <a:schemeClr val="tx1"/>
+          </a:fontRef>
+        </p:style>
+      </p:cxnSp>
+      <p:pic>
+        <p:nvPicPr>
+          <p:cNvPr id="28" name="Graphic 27" descr="Artificial Intelligence with solid fill">
+            <a:extLst>
+              <a:ext uri="{FF2B5EF4-FFF2-40B4-BE49-F238E27FC236}">
+                <a16:creationId xmlns:a16="http://schemas.microsoft.com/office/drawing/2014/main" id="{EFDA2E69-44E4-9177-BB5D-A6A14CDDCDE8}"/>
+              </a:ext>
+            </a:extLst>
+          </p:cNvPr>
+          <p:cNvPicPr>
+            <a:picLocks noChangeAspect="1"/>
+          </p:cNvPicPr>
+          <p:nvPr/>
+        </p:nvPicPr>
+        <p:blipFill>
+          <a:blip r:embed="rId10">
+            <a:extLst>
+              <a:ext uri="{96DAC541-7B7A-43D3-8B79-37D633B846F1}">
+                <asvg:svgBlip xmlns:asvg="http://schemas.microsoft.com/office/drawing/2016/SVG/main" r:embed="rId11"/>
+              </a:ext>
+            </a:extLst>
+          </a:blip>
+          <a:stretch>
+            <a:fillRect/>
+          </a:stretch>
+        </p:blipFill>
+        <p:spPr>
+          <a:xfrm>
+            <a:off x="4755138" y="5129327"/>
+            <a:ext cx="549643" cy="549643"/>
+          </a:xfrm>
+          <a:prstGeom prst="rect">
+            <a:avLst/>
+          </a:prstGeom>
+        </p:spPr>
+      </p:pic>
+      <p:pic>
+        <p:nvPicPr>
+          <p:cNvPr id="30" name="Graphic 29" descr="Artificial Intelligence with solid fill">
+            <a:extLst>
+              <a:ext uri="{FF2B5EF4-FFF2-40B4-BE49-F238E27FC236}">
+                <a16:creationId xmlns:a16="http://schemas.microsoft.com/office/drawing/2014/main" id="{A773ED65-4570-73A8-3180-EF3555FC52BF}"/>
+              </a:ext>
+            </a:extLst>
+          </p:cNvPr>
+          <p:cNvPicPr>
+            <a:picLocks noChangeAspect="1"/>
+          </p:cNvPicPr>
+          <p:nvPr/>
+        </p:nvPicPr>
+        <p:blipFill>
+          <a:blip r:embed="rId10">
+            <a:extLst>
+              <a:ext uri="{96DAC541-7B7A-43D3-8B79-37D633B846F1}">
+                <asvg:svgBlip xmlns:asvg="http://schemas.microsoft.com/office/drawing/2016/SVG/main" r:embed="rId11"/>
+              </a:ext>
+            </a:extLst>
+          </a:blip>
+          <a:stretch>
+            <a:fillRect/>
+          </a:stretch>
+        </p:blipFill>
+        <p:spPr>
+          <a:xfrm>
+            <a:off x="4907538" y="5281727"/>
+            <a:ext cx="549643" cy="549643"/>
+          </a:xfrm>
+          <a:prstGeom prst="rect">
+            <a:avLst/>
+          </a:prstGeom>
+        </p:spPr>
+      </p:pic>
+      <p:sp>
+        <p:nvSpPr>
+          <p:cNvPr id="33" name="TextBox 32">
+            <a:extLst>
+              <a:ext uri="{FF2B5EF4-FFF2-40B4-BE49-F238E27FC236}">
+                <a16:creationId xmlns:a16="http://schemas.microsoft.com/office/drawing/2014/main" id="{FB3AE578-D14E-08C3-F33F-F3747FEF4A86}"/>
+              </a:ext>
+            </a:extLst>
+          </p:cNvPr>
+          <p:cNvSpPr txBox="1"/>
+          <p:nvPr/>
+        </p:nvSpPr>
+        <p:spPr>
+          <a:xfrm>
+            <a:off x="4613642" y="5917802"/>
+            <a:ext cx="1248416" cy="461665"/>
+          </a:xfrm>
+          <a:prstGeom prst="rect">
+            <a:avLst/>
+          </a:prstGeom>
+          <a:noFill/>
+        </p:spPr>
+        <p:txBody>
+          <a:bodyPr wrap="square" rtlCol="0">
+            <a:spAutoFit/>
+          </a:bodyPr>
+          <a:lstStyle/>
+          <a:p>
+            <a:pPr algn="ctr"/>
+            <a:r>
+              <a:rPr lang="en-US" sz="1200" dirty="0">
+                <a:solidFill>
+                  <a:schemeClr val="bg1"/>
+                </a:solidFill>
+                <a:latin typeface="Avenir Book" panose="02000503020000020003" pitchFamily="2" charset="0"/>
+              </a:rPr>
+              <a:t>Company C</a:t>
+            </a:r>
+          </a:p>
+          <a:p>
+            <a:pPr algn="ctr"/>
+            <a:r>
+              <a:rPr lang="en-US" sz="1200" dirty="0">
+                <a:solidFill>
+                  <a:schemeClr val="bg1"/>
+                </a:solidFill>
+                <a:latin typeface="Avenir Book" panose="02000503020000020003" pitchFamily="2" charset="0"/>
+              </a:rPr>
+              <a:t> AI Agents</a:t>
+            </a:r>
+          </a:p>
+        </p:txBody>
+      </p:sp>
+      <p:sp>
+        <p:nvSpPr>
+          <p:cNvPr id="34" name="Rounded Rectangle 33">
+            <a:extLst>
+              <a:ext uri="{FF2B5EF4-FFF2-40B4-BE49-F238E27FC236}">
+                <a16:creationId xmlns:a16="http://schemas.microsoft.com/office/drawing/2014/main" id="{5E3ED3EA-4443-3624-94DD-FC0B30E5DBC3}"/>
+              </a:ext>
+            </a:extLst>
+          </p:cNvPr>
+          <p:cNvSpPr/>
+          <p:nvPr/>
+        </p:nvSpPr>
+        <p:spPr>
+          <a:xfrm rot="5400000">
+            <a:off x="5265093" y="5488152"/>
+            <a:ext cx="1514417" cy="410995"/>
+          </a:xfrm>
+          <a:prstGeom prst="roundRect">
+            <a:avLst/>
+          </a:prstGeom>
+          <a:noFill/>
+          <a:ln>
+            <a:solidFill>
+              <a:schemeClr val="bg1"/>
+            </a:solidFill>
+          </a:ln>
+        </p:spPr>
+        <p:style>
+          <a:lnRef idx="2">
+            <a:schemeClr val="accent1">
+              <a:shade val="15000"/>
+            </a:schemeClr>
+          </a:lnRef>
+          <a:fillRef idx="1">
+            <a:schemeClr val="accent1"/>
+          </a:fillRef>
+          <a:effectRef idx="0">
+            <a:schemeClr val="accent1"/>
+          </a:effectRef>
+          <a:fontRef idx="minor">
+            <a:schemeClr val="lt1"/>
+          </a:fontRef>
+        </p:style>
+        <p:txBody>
+          <a:bodyPr rtlCol="0" anchor="ctr"/>
+          <a:lstStyle/>
+          <a:p>
+            <a:pPr algn="ctr"/>
+            <a:r>
+              <a:rPr lang="en-US" dirty="0">
+                <a:solidFill>
+                  <a:schemeClr val="bg1"/>
+                </a:solidFill>
+              </a:rPr>
+              <a:t>Lib </a:t>
+            </a:r>
+          </a:p>
+        </p:txBody>
+      </p:sp>
+    </p:spTree>
+    <p:extLst>
+      <p:ext uri="{BB962C8B-B14F-4D97-AF65-F5344CB8AC3E}">
+        <p14:creationId xmlns:p14="http://schemas.microsoft.com/office/powerpoint/2010/main" val="3872688988"/>
+      </p:ext>
+    </p:extLst>
+  </p:cSld>
+  <p:clrMapOvr>
+    <a:masterClrMapping/>
+  </p:clrMapOvr>
+</p:sld>
+</file>
+
+<file path=ppt/slides/slide7.xml><?xml version="1.0" encoding="utf-8"?>
+<p:sld xmlns:a="http://schemas.openxmlformats.org/drawingml/2006/main" xmlns:r="http://schemas.openxmlformats.org/officeDocument/2006/relationships" xmlns:p="http://schemas.openxmlformats.org/presentationml/2006/main">
+  <p:cSld>
+    <p:bg>
+      <p:bgPr>
+        <a:solidFill>
+          <a:schemeClr val="tx1">
+            <a:lumMod val="85000"/>
+            <a:lumOff val="15000"/>
+          </a:schemeClr>
+        </a:solidFill>
+        <a:effectLst/>
+      </p:bgPr>
+    </p:bg>
+    <p:spTree>
+      <p:nvGrpSpPr>
+        <p:cNvPr id="1" name="">
+          <a:extLst>
+            <a:ext uri="{FF2B5EF4-FFF2-40B4-BE49-F238E27FC236}">
+              <a16:creationId xmlns:a16="http://schemas.microsoft.com/office/drawing/2014/main" id="{F9EE088F-502F-034A-09D2-6654C4925BF3}"/>
+            </a:ext>
+          </a:extLst>
+        </p:cNvPr>
+        <p:cNvGrpSpPr/>
+        <p:nvPr/>
+      </p:nvGrpSpPr>
+      <p:grpSpPr>
+        <a:xfrm>
+          <a:off x="0" y="0"/>
+          <a:ext cx="0" cy="0"/>
+          <a:chOff x="0" y="0"/>
+          <a:chExt cx="0" cy="0"/>
+        </a:xfrm>
+      </p:grpSpPr>
+      <p:pic>
+        <p:nvPicPr>
+          <p:cNvPr id="12" name="Graphic 11" descr="Server with solid fill">
+            <a:extLst>
+              <a:ext uri="{FF2B5EF4-FFF2-40B4-BE49-F238E27FC236}">
+                <a16:creationId xmlns:a16="http://schemas.microsoft.com/office/drawing/2014/main" id="{C86D9664-3FDD-B496-7E10-E85B608D1D2D}"/>
+              </a:ext>
+            </a:extLst>
+          </p:cNvPr>
+          <p:cNvPicPr>
+            <a:picLocks noChangeAspect="1"/>
+          </p:cNvPicPr>
+          <p:nvPr/>
+        </p:nvPicPr>
+        <p:blipFill>
+          <a:blip r:embed="rId2">
+            <a:extLst>
+              <a:ext uri="{96DAC541-7B7A-43D3-8B79-37D633B846F1}">
+                <asvg:svgBlip xmlns:asvg="http://schemas.microsoft.com/office/drawing/2016/SVG/main" r:embed="rId3"/>
+              </a:ext>
+            </a:extLst>
+          </a:blip>
+          <a:stretch>
+            <a:fillRect/>
+          </a:stretch>
+        </p:blipFill>
+        <p:spPr>
+          <a:xfrm>
+            <a:off x="7664393" y="3233071"/>
+            <a:ext cx="926974" cy="926974"/>
+          </a:xfrm>
+          <a:prstGeom prst="rect">
+            <a:avLst/>
+          </a:prstGeom>
+        </p:spPr>
+      </p:pic>
+      <p:sp>
+        <p:nvSpPr>
+          <p:cNvPr id="15" name="TextBox 14">
+            <a:extLst>
+              <a:ext uri="{FF2B5EF4-FFF2-40B4-BE49-F238E27FC236}">
+                <a16:creationId xmlns:a16="http://schemas.microsoft.com/office/drawing/2014/main" id="{E7E47620-AAA3-A66B-E9D8-A5FAC17082EC}"/>
+              </a:ext>
+            </a:extLst>
+          </p:cNvPr>
+          <p:cNvSpPr txBox="1"/>
+          <p:nvPr/>
+        </p:nvSpPr>
+        <p:spPr>
+          <a:xfrm>
+            <a:off x="7276915" y="4140195"/>
+            <a:ext cx="1757193" cy="923330"/>
+          </a:xfrm>
+          <a:prstGeom prst="rect">
+            <a:avLst/>
+          </a:prstGeom>
+          <a:noFill/>
+        </p:spPr>
+        <p:txBody>
+          <a:bodyPr wrap="square" rtlCol="0">
+            <a:spAutoFit/>
+          </a:bodyPr>
+          <a:lstStyle/>
+          <a:p>
+            <a:pPr algn="ctr"/>
+            <a:r>
+              <a:rPr lang="en-US" dirty="0">
+                <a:solidFill>
+                  <a:schemeClr val="bg1"/>
+                </a:solidFill>
+                <a:latin typeface="Avenir Book" panose="02000503020000020003" pitchFamily="2" charset="0"/>
+              </a:rPr>
+              <a:t>Company C</a:t>
+            </a:r>
+          </a:p>
+          <a:p>
+            <a:pPr algn="ctr"/>
+            <a:r>
+              <a:rPr lang="en-US" dirty="0">
+                <a:solidFill>
+                  <a:schemeClr val="bg1"/>
+                </a:solidFill>
+                <a:latin typeface="Avenir Book" panose="02000503020000020003" pitchFamily="2" charset="0"/>
+              </a:rPr>
+              <a:t> platform server</a:t>
+            </a:r>
+          </a:p>
+        </p:txBody>
+      </p:sp>
+      <p:sp>
+        <p:nvSpPr>
+          <p:cNvPr id="9" name="Rounded Rectangle 8">
+            <a:extLst>
+              <a:ext uri="{FF2B5EF4-FFF2-40B4-BE49-F238E27FC236}">
+                <a16:creationId xmlns:a16="http://schemas.microsoft.com/office/drawing/2014/main" id="{502DD6B0-10D0-B182-6C63-B29AE9D53DC4}"/>
+              </a:ext>
+            </a:extLst>
+          </p:cNvPr>
+          <p:cNvSpPr/>
+          <p:nvPr/>
+        </p:nvSpPr>
+        <p:spPr>
+          <a:xfrm>
+            <a:off x="7455747" y="1791026"/>
+            <a:ext cx="1380618" cy="662275"/>
+          </a:xfrm>
+          <a:prstGeom prst="roundRect">
+            <a:avLst/>
+          </a:prstGeom>
+          <a:noFill/>
+          <a:ln>
+            <a:solidFill>
+              <a:schemeClr val="bg1"/>
+            </a:solidFill>
+          </a:ln>
+        </p:spPr>
+        <p:style>
+          <a:lnRef idx="2">
+            <a:schemeClr val="accent1">
+              <a:shade val="15000"/>
+            </a:schemeClr>
+          </a:lnRef>
+          <a:fillRef idx="1">
+            <a:schemeClr val="accent1"/>
+          </a:fillRef>
+          <a:effectRef idx="0">
+            <a:schemeClr val="accent1"/>
+          </a:effectRef>
+          <a:fontRef idx="minor">
+            <a:schemeClr val="lt1"/>
+          </a:fontRef>
+        </p:style>
+        <p:txBody>
+          <a:bodyPr rtlCol="0" anchor="ctr"/>
+          <a:lstStyle/>
+          <a:p>
+            <a:pPr algn="ctr"/>
+            <a:r>
+              <a:rPr lang="en-US" dirty="0">
+                <a:solidFill>
+                  <a:schemeClr val="bg1"/>
+                </a:solidFill>
+              </a:rPr>
+              <a:t>Com C Dev Portal</a:t>
+            </a:r>
+          </a:p>
+        </p:txBody>
+      </p:sp>
+      <p:cxnSp>
+        <p:nvCxnSpPr>
+          <p:cNvPr id="11" name="Straight Arrow Connector 10">
+            <a:extLst>
+              <a:ext uri="{FF2B5EF4-FFF2-40B4-BE49-F238E27FC236}">
+                <a16:creationId xmlns:a16="http://schemas.microsoft.com/office/drawing/2014/main" id="{51664A25-C9BB-5B98-3A5B-E9300916781A}"/>
+              </a:ext>
+            </a:extLst>
+          </p:cNvPr>
+          <p:cNvCxnSpPr>
+            <a:cxnSpLocks/>
+          </p:cNvCxnSpPr>
+          <p:nvPr/>
+        </p:nvCxnSpPr>
+        <p:spPr>
+          <a:xfrm>
+            <a:off x="8142838" y="2536875"/>
+            <a:ext cx="0" cy="483541"/>
+          </a:xfrm>
+          <a:prstGeom prst="straightConnector1">
+            <a:avLst/>
+          </a:prstGeom>
+          <a:ln>
+            <a:solidFill>
+              <a:schemeClr val="tx2">
+                <a:lumMod val="25000"/>
+                <a:lumOff val="75000"/>
+              </a:schemeClr>
+            </a:solidFill>
+            <a:headEnd type="triangle"/>
+            <a:tailEnd type="triangle"/>
+          </a:ln>
+        </p:spPr>
+        <p:style>
+          <a:lnRef idx="2">
+            <a:schemeClr val="accent1"/>
+          </a:lnRef>
+          <a:fillRef idx="0">
+            <a:schemeClr val="accent1"/>
+          </a:fillRef>
+          <a:effectRef idx="1">
+            <a:schemeClr val="accent1"/>
+          </a:effectRef>
+          <a:fontRef idx="minor">
+            <a:schemeClr val="tx1"/>
+          </a:fontRef>
+        </p:style>
+      </p:cxnSp>
+      <p:sp>
+        <p:nvSpPr>
+          <p:cNvPr id="29" name="Rounded Rectangle 28">
+            <a:extLst>
+              <a:ext uri="{FF2B5EF4-FFF2-40B4-BE49-F238E27FC236}">
+                <a16:creationId xmlns:a16="http://schemas.microsoft.com/office/drawing/2014/main" id="{10512EB5-6FCE-B098-B135-79395C943919}"/>
+              </a:ext>
+            </a:extLst>
+          </p:cNvPr>
+          <p:cNvSpPr/>
+          <p:nvPr/>
+        </p:nvSpPr>
+        <p:spPr>
+          <a:xfrm>
+            <a:off x="7276915" y="3108196"/>
+            <a:ext cx="1757193" cy="3250559"/>
+          </a:xfrm>
+          <a:prstGeom prst="roundRect">
+            <a:avLst>
+              <a:gd name="adj" fmla="val 6608"/>
+            </a:avLst>
+          </a:prstGeom>
+          <a:noFill/>
+          <a:ln>
+            <a:solidFill>
+              <a:schemeClr val="bg1"/>
+            </a:solidFill>
+          </a:ln>
+        </p:spPr>
+        <p:style>
+          <a:lnRef idx="2">
+            <a:schemeClr val="accent1">
+              <a:shade val="15000"/>
+            </a:schemeClr>
+          </a:lnRef>
+          <a:fillRef idx="1">
+            <a:schemeClr val="accent1"/>
+          </a:fillRef>
+          <a:effectRef idx="0">
+            <a:schemeClr val="accent1"/>
+          </a:effectRef>
+          <a:fontRef idx="minor">
+            <a:schemeClr val="lt1"/>
+          </a:fontRef>
+        </p:style>
+        <p:txBody>
+          <a:bodyPr rtlCol="0" anchor="ctr"/>
+          <a:lstStyle/>
+          <a:p>
+            <a:pPr algn="ctr"/>
+            <a:endParaRPr lang="en-US" dirty="0">
+              <a:solidFill>
+                <a:schemeClr val="bg1"/>
+              </a:solidFill>
+            </a:endParaRPr>
+          </a:p>
+        </p:txBody>
+      </p:sp>
+      <p:pic>
+        <p:nvPicPr>
+          <p:cNvPr id="10" name="Graphic 9" descr="Server outline">
+            <a:extLst>
+              <a:ext uri="{FF2B5EF4-FFF2-40B4-BE49-F238E27FC236}">
+                <a16:creationId xmlns:a16="http://schemas.microsoft.com/office/drawing/2014/main" id="{5A6ED260-3A10-9CE1-510E-B40C33D82146}"/>
+              </a:ext>
+            </a:extLst>
+          </p:cNvPr>
+          <p:cNvPicPr>
+            <a:picLocks noChangeAspect="1"/>
+          </p:cNvPicPr>
+          <p:nvPr/>
+        </p:nvPicPr>
+        <p:blipFill>
+          <a:blip r:embed="rId4">
+            <a:extLst>
+              <a:ext uri="{96DAC541-7B7A-43D3-8B79-37D633B846F1}">
+                <asvg:svgBlip xmlns:asvg="http://schemas.microsoft.com/office/drawing/2016/SVG/main" r:embed="rId5"/>
+              </a:ext>
+            </a:extLst>
+          </a:blip>
+          <a:stretch>
+            <a:fillRect/>
+          </a:stretch>
+        </p:blipFill>
+        <p:spPr>
+          <a:xfrm>
+            <a:off x="3116539" y="3977377"/>
+            <a:ext cx="795797" cy="795797"/>
+          </a:xfrm>
+          <a:prstGeom prst="rect">
+            <a:avLst/>
+          </a:prstGeom>
+        </p:spPr>
+      </p:pic>
+      <p:cxnSp>
+        <p:nvCxnSpPr>
+          <p:cNvPr id="13" name="Straight Arrow Connector 12">
+            <a:extLst>
+              <a:ext uri="{FF2B5EF4-FFF2-40B4-BE49-F238E27FC236}">
+                <a16:creationId xmlns:a16="http://schemas.microsoft.com/office/drawing/2014/main" id="{32B6B7E2-C291-5B57-9294-2D008236B976}"/>
+              </a:ext>
+            </a:extLst>
+          </p:cNvPr>
+          <p:cNvCxnSpPr>
+            <a:cxnSpLocks/>
+          </p:cNvCxnSpPr>
+          <p:nvPr/>
+        </p:nvCxnSpPr>
+        <p:spPr>
+          <a:xfrm>
+            <a:off x="4159592" y="4321269"/>
+            <a:ext cx="2900427" cy="0"/>
+          </a:xfrm>
+          <a:prstGeom prst="straightConnector1">
+            <a:avLst/>
+          </a:prstGeom>
+          <a:ln>
+            <a:solidFill>
+              <a:schemeClr val="bg1"/>
+            </a:solidFill>
+            <a:headEnd type="triangle"/>
+            <a:tailEnd type="triangle"/>
+          </a:ln>
+        </p:spPr>
+        <p:style>
+          <a:lnRef idx="2">
+            <a:schemeClr val="accent1"/>
+          </a:lnRef>
+          <a:fillRef idx="0">
+            <a:schemeClr val="accent1"/>
+          </a:fillRef>
+          <a:effectRef idx="1">
+            <a:schemeClr val="accent1"/>
+          </a:effectRef>
+          <a:fontRef idx="minor">
+            <a:schemeClr val="tx1"/>
+          </a:fontRef>
+        </p:style>
+      </p:cxnSp>
+      <p:cxnSp>
+        <p:nvCxnSpPr>
+          <p:cNvPr id="17" name="Straight Arrow Connector 16">
+            <a:extLst>
+              <a:ext uri="{FF2B5EF4-FFF2-40B4-BE49-F238E27FC236}">
+                <a16:creationId xmlns:a16="http://schemas.microsoft.com/office/drawing/2014/main" id="{4AC612DD-4889-37B2-57D4-9B4311612003}"/>
+              </a:ext>
+            </a:extLst>
+          </p:cNvPr>
+          <p:cNvCxnSpPr>
+            <a:cxnSpLocks/>
+          </p:cNvCxnSpPr>
+          <p:nvPr/>
+        </p:nvCxnSpPr>
+        <p:spPr>
+          <a:xfrm>
+            <a:off x="2048438" y="4337277"/>
+            <a:ext cx="968031" cy="0"/>
+          </a:xfrm>
+          <a:prstGeom prst="straightConnector1">
+            <a:avLst/>
+          </a:prstGeom>
+          <a:ln>
+            <a:solidFill>
+              <a:schemeClr val="bg1"/>
+            </a:solidFill>
+            <a:headEnd type="triangle"/>
+            <a:tailEnd type="triangle"/>
+          </a:ln>
+        </p:spPr>
+        <p:style>
+          <a:lnRef idx="2">
+            <a:schemeClr val="accent1"/>
+          </a:lnRef>
+          <a:fillRef idx="0">
+            <a:schemeClr val="accent1"/>
+          </a:fillRef>
+          <a:effectRef idx="1">
+            <a:schemeClr val="accent1"/>
+          </a:effectRef>
+          <a:fontRef idx="minor">
+            <a:schemeClr val="tx1"/>
+          </a:fontRef>
+        </p:style>
+      </p:cxnSp>
+      <p:pic>
+        <p:nvPicPr>
+          <p:cNvPr id="20" name="Graphic 19" descr="Ui Ux with solid fill">
+            <a:extLst>
+              <a:ext uri="{FF2B5EF4-FFF2-40B4-BE49-F238E27FC236}">
+                <a16:creationId xmlns:a16="http://schemas.microsoft.com/office/drawing/2014/main" id="{3F11FF5F-AE7F-CABE-C94C-3E6F2B9E95EE}"/>
+              </a:ext>
+            </a:extLst>
+          </p:cNvPr>
+          <p:cNvPicPr>
+            <a:picLocks noChangeAspect="1"/>
+          </p:cNvPicPr>
+          <p:nvPr/>
+        </p:nvPicPr>
+        <p:blipFill>
+          <a:blip r:embed="rId6">
+            <a:extLst>
+              <a:ext uri="{96DAC541-7B7A-43D3-8B79-37D633B846F1}">
+                <asvg:svgBlip xmlns:asvg="http://schemas.microsoft.com/office/drawing/2016/SVG/main" r:embed="rId7"/>
+              </a:ext>
+            </a:extLst>
+          </a:blip>
+          <a:stretch>
+            <a:fillRect/>
+          </a:stretch>
+        </p:blipFill>
+        <p:spPr>
+          <a:xfrm>
+            <a:off x="590705" y="3755853"/>
+            <a:ext cx="1237130" cy="1237130"/>
+          </a:xfrm>
+          <a:prstGeom prst="rect">
+            <a:avLst/>
+          </a:prstGeom>
+        </p:spPr>
+      </p:pic>
+      <p:sp>
+        <p:nvSpPr>
+          <p:cNvPr id="21" name="TextBox 20">
+            <a:extLst>
+              <a:ext uri="{FF2B5EF4-FFF2-40B4-BE49-F238E27FC236}">
+                <a16:creationId xmlns:a16="http://schemas.microsoft.com/office/drawing/2014/main" id="{6C6F876C-005B-D763-4012-B1B1866D10E4}"/>
+              </a:ext>
+            </a:extLst>
+          </p:cNvPr>
+          <p:cNvSpPr txBox="1"/>
+          <p:nvPr/>
+        </p:nvSpPr>
+        <p:spPr>
+          <a:xfrm>
+            <a:off x="241082" y="5071432"/>
+            <a:ext cx="1936376" cy="461665"/>
+          </a:xfrm>
+          <a:prstGeom prst="rect">
+            <a:avLst/>
+          </a:prstGeom>
+          <a:noFill/>
+        </p:spPr>
+        <p:txBody>
+          <a:bodyPr wrap="square" rtlCol="0">
+            <a:spAutoFit/>
+          </a:bodyPr>
+          <a:lstStyle/>
+          <a:p>
+            <a:pPr algn="ctr"/>
+            <a:r>
+              <a:rPr lang="en-US" sz="1200" dirty="0">
+                <a:solidFill>
+                  <a:schemeClr val="bg1"/>
+                </a:solidFill>
+                <a:latin typeface="Avenir Book" panose="02000503020000020003" pitchFamily="2" charset="0"/>
+              </a:rPr>
+              <a:t>Company C</a:t>
+            </a:r>
+          </a:p>
+          <a:p>
+            <a:pPr algn="ctr"/>
+            <a:r>
+              <a:rPr lang="en-US" sz="1200" dirty="0">
+                <a:solidFill>
+                  <a:schemeClr val="bg1"/>
+                </a:solidFill>
+                <a:latin typeface="Avenir Book" panose="02000503020000020003" pitchFamily="2" charset="0"/>
+              </a:rPr>
+              <a:t> Product UI</a:t>
+            </a:r>
+          </a:p>
+        </p:txBody>
+      </p:sp>
+      <p:sp>
+        <p:nvSpPr>
+          <p:cNvPr id="23" name="TextBox 22">
+            <a:extLst>
+              <a:ext uri="{FF2B5EF4-FFF2-40B4-BE49-F238E27FC236}">
+                <a16:creationId xmlns:a16="http://schemas.microsoft.com/office/drawing/2014/main" id="{F70AB05B-A716-67CE-64CA-18EE25A3E0EA}"/>
+              </a:ext>
+            </a:extLst>
+          </p:cNvPr>
+          <p:cNvSpPr txBox="1"/>
+          <p:nvPr/>
+        </p:nvSpPr>
+        <p:spPr>
+          <a:xfrm>
+            <a:off x="2532453" y="4778696"/>
+            <a:ext cx="1936376" cy="461665"/>
+          </a:xfrm>
+          <a:prstGeom prst="rect">
+            <a:avLst/>
+          </a:prstGeom>
+          <a:noFill/>
+        </p:spPr>
+        <p:txBody>
+          <a:bodyPr wrap="square" rtlCol="0">
+            <a:spAutoFit/>
+          </a:bodyPr>
+          <a:lstStyle/>
+          <a:p>
+            <a:pPr algn="ctr"/>
+            <a:r>
+              <a:rPr lang="en-US" sz="1200" dirty="0">
+                <a:solidFill>
+                  <a:schemeClr val="bg1"/>
+                </a:solidFill>
+                <a:latin typeface="Avenir Book" panose="02000503020000020003" pitchFamily="2" charset="0"/>
+              </a:rPr>
+              <a:t>Company C</a:t>
+            </a:r>
+          </a:p>
+          <a:p>
+            <a:pPr algn="ctr"/>
+            <a:r>
+              <a:rPr lang="en-US" sz="1200" dirty="0">
+                <a:solidFill>
+                  <a:schemeClr val="bg1"/>
+                </a:solidFill>
+                <a:latin typeface="Avenir Book" panose="02000503020000020003" pitchFamily="2" charset="0"/>
+              </a:rPr>
+              <a:t>Servers</a:t>
+            </a:r>
+          </a:p>
+        </p:txBody>
+      </p:sp>
+      <p:cxnSp>
+        <p:nvCxnSpPr>
+          <p:cNvPr id="27" name="Straight Arrow Connector 26">
+            <a:extLst>
+              <a:ext uri="{FF2B5EF4-FFF2-40B4-BE49-F238E27FC236}">
+                <a16:creationId xmlns:a16="http://schemas.microsoft.com/office/drawing/2014/main" id="{2FC353E1-F7FB-04F1-AC2F-3570B05B74AF}"/>
+              </a:ext>
+            </a:extLst>
+          </p:cNvPr>
+          <p:cNvCxnSpPr>
+            <a:cxnSpLocks/>
+          </p:cNvCxnSpPr>
+          <p:nvPr/>
+        </p:nvCxnSpPr>
+        <p:spPr>
+          <a:xfrm>
+            <a:off x="6331278" y="5709539"/>
+            <a:ext cx="691117" cy="0"/>
+          </a:xfrm>
+          <a:prstGeom prst="straightConnector1">
+            <a:avLst/>
+          </a:prstGeom>
+          <a:ln>
+            <a:solidFill>
+              <a:schemeClr val="bg1"/>
+            </a:solidFill>
+            <a:headEnd type="triangle"/>
+            <a:tailEnd type="triangle"/>
+          </a:ln>
+        </p:spPr>
+        <p:style>
+          <a:lnRef idx="2">
+            <a:schemeClr val="accent1"/>
+          </a:lnRef>
+          <a:fillRef idx="0">
+            <a:schemeClr val="accent1"/>
+          </a:fillRef>
+          <a:effectRef idx="1">
+            <a:schemeClr val="accent1"/>
+          </a:effectRef>
+          <a:fontRef idx="minor">
+            <a:schemeClr val="tx1"/>
+          </a:fontRef>
+        </p:style>
+      </p:cxnSp>
+      <p:pic>
+        <p:nvPicPr>
+          <p:cNvPr id="28" name="Graphic 27" descr="Artificial Intelligence with solid fill">
+            <a:extLst>
+              <a:ext uri="{FF2B5EF4-FFF2-40B4-BE49-F238E27FC236}">
+                <a16:creationId xmlns:a16="http://schemas.microsoft.com/office/drawing/2014/main" id="{04C7DAB7-5008-A22C-A3A2-E88557907E2B}"/>
+              </a:ext>
+            </a:extLst>
+          </p:cNvPr>
+          <p:cNvPicPr>
+            <a:picLocks noChangeAspect="1"/>
+          </p:cNvPicPr>
+          <p:nvPr/>
+        </p:nvPicPr>
+        <p:blipFill>
+          <a:blip r:embed="rId8">
+            <a:extLst>
+              <a:ext uri="{96DAC541-7B7A-43D3-8B79-37D633B846F1}">
+                <asvg:svgBlip xmlns:asvg="http://schemas.microsoft.com/office/drawing/2016/SVG/main" r:embed="rId9"/>
+              </a:ext>
+            </a:extLst>
+          </a:blip>
+          <a:stretch>
+            <a:fillRect/>
+          </a:stretch>
+        </p:blipFill>
+        <p:spPr>
+          <a:xfrm>
+            <a:off x="4755138" y="5129327"/>
+            <a:ext cx="549643" cy="549643"/>
+          </a:xfrm>
+          <a:prstGeom prst="rect">
+            <a:avLst/>
+          </a:prstGeom>
+        </p:spPr>
+      </p:pic>
+      <p:pic>
+        <p:nvPicPr>
+          <p:cNvPr id="30" name="Graphic 29" descr="Artificial Intelligence with solid fill">
+            <a:extLst>
+              <a:ext uri="{FF2B5EF4-FFF2-40B4-BE49-F238E27FC236}">
+                <a16:creationId xmlns:a16="http://schemas.microsoft.com/office/drawing/2014/main" id="{B2DB9B10-F92A-9548-5E78-CDA550ECA70E}"/>
+              </a:ext>
+            </a:extLst>
+          </p:cNvPr>
+          <p:cNvPicPr>
+            <a:picLocks noChangeAspect="1"/>
+          </p:cNvPicPr>
+          <p:nvPr/>
+        </p:nvPicPr>
+        <p:blipFill>
+          <a:blip r:embed="rId8">
+            <a:extLst>
+              <a:ext uri="{96DAC541-7B7A-43D3-8B79-37D633B846F1}">
+                <asvg:svgBlip xmlns:asvg="http://schemas.microsoft.com/office/drawing/2016/SVG/main" r:embed="rId9"/>
+              </a:ext>
+            </a:extLst>
+          </a:blip>
+          <a:stretch>
+            <a:fillRect/>
+          </a:stretch>
+        </p:blipFill>
+        <p:spPr>
+          <a:xfrm>
+            <a:off x="4907538" y="5281727"/>
+            <a:ext cx="549643" cy="549643"/>
+          </a:xfrm>
+          <a:prstGeom prst="rect">
+            <a:avLst/>
+          </a:prstGeom>
+        </p:spPr>
+      </p:pic>
+      <p:sp>
+        <p:nvSpPr>
+          <p:cNvPr id="33" name="TextBox 32">
+            <a:extLst>
+              <a:ext uri="{FF2B5EF4-FFF2-40B4-BE49-F238E27FC236}">
+                <a16:creationId xmlns:a16="http://schemas.microsoft.com/office/drawing/2014/main" id="{F516B651-8660-68BD-15C3-C1AE4B0F2272}"/>
+              </a:ext>
+            </a:extLst>
+          </p:cNvPr>
+          <p:cNvSpPr txBox="1"/>
+          <p:nvPr/>
+        </p:nvSpPr>
+        <p:spPr>
+          <a:xfrm>
+            <a:off x="4613642" y="5917802"/>
+            <a:ext cx="1248416" cy="461665"/>
+          </a:xfrm>
+          <a:prstGeom prst="rect">
+            <a:avLst/>
+          </a:prstGeom>
+          <a:noFill/>
+        </p:spPr>
+        <p:txBody>
+          <a:bodyPr wrap="square" rtlCol="0">
+            <a:spAutoFit/>
+          </a:bodyPr>
+          <a:lstStyle/>
+          <a:p>
+            <a:pPr algn="ctr"/>
+            <a:r>
+              <a:rPr lang="en-US" sz="1200" dirty="0">
+                <a:solidFill>
+                  <a:schemeClr val="bg1"/>
+                </a:solidFill>
+                <a:latin typeface="Avenir Book" panose="02000503020000020003" pitchFamily="2" charset="0"/>
+              </a:rPr>
+              <a:t>Company C</a:t>
+            </a:r>
+          </a:p>
+          <a:p>
+            <a:pPr algn="ctr"/>
+            <a:r>
+              <a:rPr lang="en-US" sz="1200" dirty="0">
+                <a:solidFill>
+                  <a:schemeClr val="bg1"/>
+                </a:solidFill>
+                <a:latin typeface="Avenir Book" panose="02000503020000020003" pitchFamily="2" charset="0"/>
+              </a:rPr>
+              <a:t> AI Agents</a:t>
+            </a:r>
+          </a:p>
+        </p:txBody>
+      </p:sp>
+      <p:sp>
+        <p:nvSpPr>
+          <p:cNvPr id="34" name="Rounded Rectangle 33">
+            <a:extLst>
+              <a:ext uri="{FF2B5EF4-FFF2-40B4-BE49-F238E27FC236}">
+                <a16:creationId xmlns:a16="http://schemas.microsoft.com/office/drawing/2014/main" id="{6AAF98F0-199A-7DF8-E7C1-89870E8A490E}"/>
+              </a:ext>
+            </a:extLst>
+          </p:cNvPr>
+          <p:cNvSpPr/>
+          <p:nvPr/>
+        </p:nvSpPr>
+        <p:spPr>
+          <a:xfrm rot="5400000">
+            <a:off x="5265093" y="5488152"/>
+            <a:ext cx="1514417" cy="410995"/>
+          </a:xfrm>
+          <a:prstGeom prst="roundRect">
+            <a:avLst/>
+          </a:prstGeom>
+          <a:noFill/>
+          <a:ln>
+            <a:solidFill>
+              <a:schemeClr val="bg1"/>
+            </a:solidFill>
+          </a:ln>
+        </p:spPr>
+        <p:style>
+          <a:lnRef idx="2">
+            <a:schemeClr val="accent1">
+              <a:shade val="15000"/>
+            </a:schemeClr>
+          </a:lnRef>
+          <a:fillRef idx="1">
+            <a:schemeClr val="accent1"/>
+          </a:fillRef>
+          <a:effectRef idx="0">
+            <a:schemeClr val="accent1"/>
+          </a:effectRef>
+          <a:fontRef idx="minor">
+            <a:schemeClr val="lt1"/>
+          </a:fontRef>
+        </p:style>
+        <p:txBody>
+          <a:bodyPr rtlCol="0" anchor="ctr"/>
+          <a:lstStyle/>
+          <a:p>
+            <a:pPr algn="ctr"/>
+            <a:r>
+              <a:rPr lang="en-US" dirty="0">
+                <a:solidFill>
+                  <a:schemeClr val="bg1"/>
+                </a:solidFill>
+              </a:rPr>
+              <a:t>Lib </a:t>
+            </a:r>
+          </a:p>
+        </p:txBody>
+      </p:sp>
+    </p:spTree>
+    <p:extLst>
+      <p:ext uri="{BB962C8B-B14F-4D97-AF65-F5344CB8AC3E}">
+        <p14:creationId xmlns:p14="http://schemas.microsoft.com/office/powerpoint/2010/main" val="2900182802"/>
+      </p:ext>
+    </p:extLst>
+  </p:cSld>
+  <p:clrMapOvr>
+    <a:masterClrMapping/>
+  </p:clrMapOvr>
+</p:sld>
+</file>
+
 <file path=ppt/theme/theme1.xml><?xml version="1.0" encoding="utf-8"?>
 <a:theme xmlns:a="http://schemas.openxmlformats.org/drawingml/2006/main" name="Office Theme">
   <a:themeElements>

</xml_diff>